<commit_message>
oops pgms session 3
</commit_message>
<xml_diff>
--- a/Objected Oriented Programming Concepts Using C++ & Data Structures/Session-2.pptx
+++ b/Objected Oriented Programming Concepts Using C++ & Data Structures/Session-2.pptx
@@ -333,9 +333,9 @@
           <a:lstStyle>
             <a:lvl1pPr algn="l">
               <a:defRPr sz="1200">
-                <a:latin typeface="Noto Sans Mono CJK JP" panose="020B0500000000000000" charset="-122"/>
-                <a:ea typeface="Noto Sans Mono CJK JP" panose="020B0500000000000000" charset="-122"/>
-                <a:cs typeface="Noto Sans Mono CJK JP" panose="020B0500000000000000" charset="-122"/>
+                <a:latin typeface="Noto Sans CJK JP Regular" panose="020B0500000000000000" charset="-122"/>
+                <a:ea typeface="Noto Sans CJK JP Regular" panose="020B0500000000000000" charset="-122"/>
+                <a:cs typeface="Noto Sans CJK JP Regular" panose="020B0500000000000000" charset="-122"/>
               </a:defRPr>
             </a:lvl1pPr>
           </a:lstStyle>
@@ -368,9 +368,9 @@
           <a:lstStyle>
             <a:lvl1pPr algn="r">
               <a:defRPr sz="1200">
-                <a:latin typeface="Noto Sans Mono CJK JP" panose="020B0500000000000000" charset="-122"/>
-                <a:ea typeface="Noto Sans Mono CJK JP" panose="020B0500000000000000" charset="-122"/>
-                <a:cs typeface="Noto Sans Mono CJK JP" panose="020B0500000000000000" charset="-122"/>
+                <a:latin typeface="Noto Sans CJK JP Regular" panose="020B0500000000000000" charset="-122"/>
+                <a:ea typeface="Noto Sans CJK JP Regular" panose="020B0500000000000000" charset="-122"/>
+                <a:cs typeface="Noto Sans CJK JP Regular" panose="020B0500000000000000" charset="-122"/>
               </a:defRPr>
             </a:lvl1pPr>
           </a:lstStyle>
@@ -503,9 +503,9 @@
           <a:lstStyle>
             <a:lvl1pPr algn="l">
               <a:defRPr sz="1200">
-                <a:latin typeface="Noto Sans Mono CJK JP" panose="020B0500000000000000" charset="-122"/>
-                <a:ea typeface="Noto Sans Mono CJK JP" panose="020B0500000000000000" charset="-122"/>
-                <a:cs typeface="Noto Sans Mono CJK JP" panose="020B0500000000000000" charset="-122"/>
+                <a:latin typeface="Noto Sans CJK JP Regular" panose="020B0500000000000000" charset="-122"/>
+                <a:ea typeface="Noto Sans CJK JP Regular" panose="020B0500000000000000" charset="-122"/>
+                <a:cs typeface="Noto Sans CJK JP Regular" panose="020B0500000000000000" charset="-122"/>
               </a:defRPr>
             </a:lvl1pPr>
           </a:lstStyle>
@@ -538,9 +538,9 @@
           <a:lstStyle>
             <a:lvl1pPr algn="r">
               <a:defRPr sz="1200">
-                <a:latin typeface="Noto Sans Mono CJK JP" panose="020B0500000000000000" charset="-122"/>
-                <a:ea typeface="Noto Sans Mono CJK JP" panose="020B0500000000000000" charset="-122"/>
-                <a:cs typeface="Noto Sans Mono CJK JP" panose="020B0500000000000000" charset="-122"/>
+                <a:latin typeface="Noto Sans CJK JP Regular" panose="020B0500000000000000" charset="-122"/>
+                <a:ea typeface="Noto Sans CJK JP Regular" panose="020B0500000000000000" charset="-122"/>
+                <a:cs typeface="Noto Sans CJK JP Regular" panose="020B0500000000000000" charset="-122"/>
               </a:defRPr>
             </a:lvl1pPr>
           </a:lstStyle>
@@ -561,9 +561,9 @@
         <a:solidFill>
           <a:schemeClr val="tx1"/>
         </a:solidFill>
-        <a:latin typeface="Noto Sans Mono CJK JP" panose="020B0500000000000000" charset="-122"/>
-        <a:ea typeface="Noto Sans Mono CJK JP" panose="020B0500000000000000" charset="-122"/>
-        <a:cs typeface="Noto Sans Mono CJK JP" panose="020B0500000000000000" charset="-122"/>
+        <a:latin typeface="Noto Sans CJK JP Regular" panose="020B0500000000000000" charset="-122"/>
+        <a:ea typeface="Noto Sans CJK JP Regular" panose="020B0500000000000000" charset="-122"/>
+        <a:cs typeface="Noto Sans CJK JP Regular" panose="020B0500000000000000" charset="-122"/>
       </a:defRPr>
     </a:lvl1pPr>
     <a:lvl2pPr marL="457200" algn="l" defTabSz="914400" rtl="0" eaLnBrk="1" latinLnBrk="0" hangingPunct="1">
@@ -571,9 +571,9 @@
         <a:solidFill>
           <a:schemeClr val="tx1"/>
         </a:solidFill>
-        <a:latin typeface="Noto Sans Mono CJK JP" panose="020B0500000000000000" charset="-122"/>
-        <a:ea typeface="Noto Sans Mono CJK JP" panose="020B0500000000000000" charset="-122"/>
-        <a:cs typeface="Noto Sans Mono CJK JP" panose="020B0500000000000000" charset="-122"/>
+        <a:latin typeface="Noto Sans CJK JP Regular" panose="020B0500000000000000" charset="-122"/>
+        <a:ea typeface="Noto Sans CJK JP Regular" panose="020B0500000000000000" charset="-122"/>
+        <a:cs typeface="Noto Sans CJK JP Regular" panose="020B0500000000000000" charset="-122"/>
       </a:defRPr>
     </a:lvl2pPr>
     <a:lvl3pPr marL="914400" algn="l" defTabSz="914400" rtl="0" eaLnBrk="1" latinLnBrk="0" hangingPunct="1">
@@ -581,9 +581,9 @@
         <a:solidFill>
           <a:schemeClr val="tx1"/>
         </a:solidFill>
-        <a:latin typeface="Noto Sans Mono CJK JP" panose="020B0500000000000000" charset="-122"/>
-        <a:ea typeface="Noto Sans Mono CJK JP" panose="020B0500000000000000" charset="-122"/>
-        <a:cs typeface="Noto Sans Mono CJK JP" panose="020B0500000000000000" charset="-122"/>
+        <a:latin typeface="Noto Sans CJK JP Regular" panose="020B0500000000000000" charset="-122"/>
+        <a:ea typeface="Noto Sans CJK JP Regular" panose="020B0500000000000000" charset="-122"/>
+        <a:cs typeface="Noto Sans CJK JP Regular" panose="020B0500000000000000" charset="-122"/>
       </a:defRPr>
     </a:lvl3pPr>
     <a:lvl4pPr marL="1371600" algn="l" defTabSz="914400" rtl="0" eaLnBrk="1" latinLnBrk="0" hangingPunct="1">
@@ -591,9 +591,9 @@
         <a:solidFill>
           <a:schemeClr val="tx1"/>
         </a:solidFill>
-        <a:latin typeface="Noto Sans Mono CJK JP" panose="020B0500000000000000" charset="-122"/>
-        <a:ea typeface="Noto Sans Mono CJK JP" panose="020B0500000000000000" charset="-122"/>
-        <a:cs typeface="Noto Sans Mono CJK JP" panose="020B0500000000000000" charset="-122"/>
+        <a:latin typeface="Noto Sans CJK JP Regular" panose="020B0500000000000000" charset="-122"/>
+        <a:ea typeface="Noto Sans CJK JP Regular" panose="020B0500000000000000" charset="-122"/>
+        <a:cs typeface="Noto Sans CJK JP Regular" panose="020B0500000000000000" charset="-122"/>
       </a:defRPr>
     </a:lvl4pPr>
     <a:lvl5pPr marL="1828800" algn="l" defTabSz="914400" rtl="0" eaLnBrk="1" latinLnBrk="0" hangingPunct="1">
@@ -601,9 +601,9 @@
         <a:solidFill>
           <a:schemeClr val="tx1"/>
         </a:solidFill>
-        <a:latin typeface="Noto Sans Mono CJK JP" panose="020B0500000000000000" charset="-122"/>
-        <a:ea typeface="Noto Sans Mono CJK JP" panose="020B0500000000000000" charset="-122"/>
-        <a:cs typeface="Noto Sans Mono CJK JP" panose="020B0500000000000000" charset="-122"/>
+        <a:latin typeface="Noto Sans CJK JP Regular" panose="020B0500000000000000" charset="-122"/>
+        <a:ea typeface="Noto Sans CJK JP Regular" panose="020B0500000000000000" charset="-122"/>
+        <a:cs typeface="Noto Sans CJK JP Regular" panose="020B0500000000000000" charset="-122"/>
       </a:defRPr>
     </a:lvl5pPr>
     <a:lvl6pPr marL="2286000" algn="l" defTabSz="914400" rtl="0" eaLnBrk="1" latinLnBrk="0" hangingPunct="1">
@@ -3031,9 +3031,9 @@
           <a:lstStyle>
             <a:lvl1pPr>
               <a:defRPr sz="1400">
-                <a:latin typeface="Noto Sans Mono CJK JP" panose="020B0500000000000000" charset="-122"/>
-                <a:ea typeface="Noto Sans Mono CJK JP" panose="020B0500000000000000" charset="-122"/>
-                <a:cs typeface="Noto Sans Mono CJK JP" panose="020B0500000000000000" charset="-122"/>
+                <a:latin typeface="Noto Sans CJK JP Regular" panose="020B0500000000000000" charset="-122"/>
+                <a:ea typeface="Noto Sans CJK JP Regular" panose="020B0500000000000000" charset="-122"/>
+                <a:cs typeface="Noto Sans CJK JP Regular" panose="020B0500000000000000" charset="-122"/>
               </a:defRPr>
             </a:lvl1pPr>
           </a:lstStyle>
@@ -3068,9 +3068,9 @@
           <a:lstStyle>
             <a:lvl1pPr algn="ctr">
               <a:defRPr sz="1400">
-                <a:latin typeface="Noto Sans Mono CJK JP" panose="020B0500000000000000" charset="-122"/>
-                <a:ea typeface="Noto Sans Mono CJK JP" panose="020B0500000000000000" charset="-122"/>
-                <a:cs typeface="Noto Sans Mono CJK JP" panose="020B0500000000000000" charset="-122"/>
+                <a:latin typeface="Noto Sans CJK JP Regular" panose="020B0500000000000000" charset="-122"/>
+                <a:ea typeface="Noto Sans CJK JP Regular" panose="020B0500000000000000" charset="-122"/>
+                <a:cs typeface="Noto Sans CJK JP Regular" panose="020B0500000000000000" charset="-122"/>
               </a:defRPr>
             </a:lvl1pPr>
           </a:lstStyle>
@@ -3105,9 +3105,9 @@
           <a:lstStyle>
             <a:lvl1pPr algn="r">
               <a:defRPr sz="1400">
-                <a:latin typeface="Noto Sans Mono CJK JP" panose="020B0500000000000000" charset="-122"/>
-                <a:ea typeface="Noto Sans Mono CJK JP" panose="020B0500000000000000" charset="-122"/>
-                <a:cs typeface="Noto Sans Mono CJK JP" panose="020B0500000000000000" charset="-122"/>
+                <a:latin typeface="Noto Sans CJK JP Regular" panose="020B0500000000000000" charset="-122"/>
+                <a:ea typeface="Noto Sans CJK JP Regular" panose="020B0500000000000000" charset="-122"/>
+                <a:cs typeface="Noto Sans CJK JP Regular" panose="020B0500000000000000" charset="-122"/>
               </a:defRPr>
             </a:lvl1pPr>
           </a:lstStyle>
@@ -3153,9 +3153,9 @@
           <a:solidFill>
             <a:schemeClr val="tx2"/>
           </a:solidFill>
-          <a:latin typeface="Noto Sans Mono CJK JP" panose="020B0500000000000000" charset="-122"/>
-          <a:ea typeface="Noto Sans Mono CJK JP" panose="020B0500000000000000" charset="-122"/>
-          <a:cs typeface="Noto Sans Mono CJK JP" panose="020B0500000000000000" charset="-122"/>
+          <a:latin typeface="Noto Sans CJK JP Regular" panose="020B0500000000000000" charset="-122"/>
+          <a:ea typeface="Noto Sans CJK JP Regular" panose="020B0500000000000000" charset="-122"/>
+          <a:cs typeface="Noto Sans CJK JP Regular" panose="020B0500000000000000" charset="-122"/>
         </a:defRPr>
       </a:lvl1pPr>
     </p:titleStyle>
@@ -3175,9 +3175,9 @@
           <a:solidFill>
             <a:schemeClr val="tx1"/>
           </a:solidFill>
-          <a:latin typeface="Noto Sans Mono CJK JP" panose="020B0500000000000000" charset="-122"/>
-          <a:ea typeface="Noto Sans Mono CJK JP" panose="020B0500000000000000" charset="-122"/>
-          <a:cs typeface="Noto Sans Mono CJK JP" panose="020B0500000000000000" charset="-122"/>
+          <a:latin typeface="Noto Sans CJK JP Regular" panose="020B0500000000000000" charset="-122"/>
+          <a:ea typeface="Noto Sans CJK JP Regular" panose="020B0500000000000000" charset="-122"/>
+          <a:cs typeface="Noto Sans CJK JP Regular" panose="020B0500000000000000" charset="-122"/>
         </a:defRPr>
       </a:lvl1pPr>
       <a:lvl2pPr marL="742950" lvl="1" indent="-285750" algn="l" defTabSz="914400" eaLnBrk="1" fontAlgn="base" latinLnBrk="0" hangingPunct="1">
@@ -3195,9 +3195,9 @@
           <a:solidFill>
             <a:schemeClr val="tx1"/>
           </a:solidFill>
-          <a:latin typeface="Noto Sans Mono CJK JP" panose="020B0500000000000000" charset="-122"/>
-          <a:ea typeface="Noto Sans Mono CJK JP" panose="020B0500000000000000" charset="-122"/>
-          <a:cs typeface="Noto Sans Mono CJK JP" panose="020B0500000000000000" charset="-122"/>
+          <a:latin typeface="Noto Sans CJK JP Regular" panose="020B0500000000000000" charset="-122"/>
+          <a:ea typeface="Noto Sans CJK JP Regular" panose="020B0500000000000000" charset="-122"/>
+          <a:cs typeface="Noto Sans CJK JP Regular" panose="020B0500000000000000" charset="-122"/>
         </a:defRPr>
       </a:lvl2pPr>
       <a:lvl3pPr marL="1143000" lvl="2" indent="-228600" algn="l" defTabSz="914400" eaLnBrk="1" fontAlgn="base" latinLnBrk="0" hangingPunct="1">
@@ -3215,9 +3215,9 @@
           <a:solidFill>
             <a:schemeClr val="tx1"/>
           </a:solidFill>
-          <a:latin typeface="Noto Sans Mono CJK JP" panose="020B0500000000000000" charset="-122"/>
-          <a:ea typeface="Noto Sans Mono CJK JP" panose="020B0500000000000000" charset="-122"/>
-          <a:cs typeface="Noto Sans Mono CJK JP" panose="020B0500000000000000" charset="-122"/>
+          <a:latin typeface="Noto Sans CJK JP Regular" panose="020B0500000000000000" charset="-122"/>
+          <a:ea typeface="Noto Sans CJK JP Regular" panose="020B0500000000000000" charset="-122"/>
+          <a:cs typeface="Noto Sans CJK JP Regular" panose="020B0500000000000000" charset="-122"/>
         </a:defRPr>
       </a:lvl3pPr>
       <a:lvl4pPr marL="1600200" lvl="3" indent="-228600" algn="l" defTabSz="914400" eaLnBrk="1" fontAlgn="base" latinLnBrk="0" hangingPunct="1">
@@ -3235,9 +3235,9 @@
           <a:solidFill>
             <a:schemeClr val="tx1"/>
           </a:solidFill>
-          <a:latin typeface="Noto Sans Mono CJK JP" panose="020B0500000000000000" charset="-122"/>
-          <a:ea typeface="Noto Sans Mono CJK JP" panose="020B0500000000000000" charset="-122"/>
-          <a:cs typeface="Noto Sans Mono CJK JP" panose="020B0500000000000000" charset="-122"/>
+          <a:latin typeface="Noto Sans CJK JP Regular" panose="020B0500000000000000" charset="-122"/>
+          <a:ea typeface="Noto Sans CJK JP Regular" panose="020B0500000000000000" charset="-122"/>
+          <a:cs typeface="Noto Sans CJK JP Regular" panose="020B0500000000000000" charset="-122"/>
         </a:defRPr>
       </a:lvl4pPr>
       <a:lvl5pPr marL="2057400" lvl="4" indent="-228600" algn="l" defTabSz="914400" eaLnBrk="1" fontAlgn="base" latinLnBrk="0" hangingPunct="1">
@@ -3255,9 +3255,9 @@
           <a:solidFill>
             <a:schemeClr val="tx1"/>
           </a:solidFill>
-          <a:latin typeface="Noto Sans Mono CJK JP" panose="020B0500000000000000" charset="-122"/>
-          <a:ea typeface="Noto Sans Mono CJK JP" panose="020B0500000000000000" charset="-122"/>
-          <a:cs typeface="Noto Sans Mono CJK JP" panose="020B0500000000000000" charset="-122"/>
+          <a:latin typeface="Noto Sans CJK JP Regular" panose="020B0500000000000000" charset="-122"/>
+          <a:ea typeface="Noto Sans CJK JP Regular" panose="020B0500000000000000" charset="-122"/>
+          <a:cs typeface="Noto Sans CJK JP Regular" panose="020B0500000000000000" charset="-122"/>
         </a:defRPr>
       </a:lvl5pPr>
       <a:lvl6pPr marL="2514600" lvl="5" indent="-228600" algn="l" defTabSz="914400" eaLnBrk="1" fontAlgn="base" latinLnBrk="0" hangingPunct="1">
@@ -3352,7 +3352,7 @@
         <a:spcAft>
           <a:spcPct val="0"/>
         </a:spcAft>
-        <a:buFont typeface="Arial" panose="02080604020202020204" pitchFamily="34" charset="0"/>
+        <a:buFont typeface="Arial" panose="020B0604020202020204" pitchFamily="34" charset="0"/>
         <a:buNone/>
         <a:defRPr sz="1800" b="0" i="0" u="none" kern="1200" baseline="0">
           <a:solidFill>
@@ -3373,13 +3373,13 @@
         <a:spcAft>
           <a:spcPct val="0"/>
         </a:spcAft>
-        <a:buFont typeface="Arial" panose="02080604020202020204" pitchFamily="34" charset="0"/>
+        <a:buFont typeface="Arial" panose="020B0604020202020204" pitchFamily="34" charset="0"/>
         <a:buNone/>
         <a:defRPr b="0" i="0" u="none" kern="1200" baseline="0">
           <a:solidFill>
             <a:schemeClr val="tx1"/>
           </a:solidFill>
-          <a:latin typeface="Arial" panose="02080604020202020204" pitchFamily="34" charset="0"/>
+          <a:latin typeface="Arial" panose="020B0604020202020204" pitchFamily="34" charset="0"/>
           <a:ea typeface="+mn-ea"/>
           <a:cs typeface="+mn-cs"/>
         </a:defRPr>
@@ -3394,13 +3394,13 @@
         <a:spcAft>
           <a:spcPct val="0"/>
         </a:spcAft>
-        <a:buFont typeface="Arial" panose="02080604020202020204" pitchFamily="34" charset="0"/>
+        <a:buFont typeface="Arial" panose="020B0604020202020204" pitchFamily="34" charset="0"/>
         <a:buNone/>
         <a:defRPr b="0" i="0" u="none" kern="1200" baseline="0">
           <a:solidFill>
             <a:schemeClr val="tx1"/>
           </a:solidFill>
-          <a:latin typeface="Arial" panose="02080604020202020204" pitchFamily="34" charset="0"/>
+          <a:latin typeface="Arial" panose="020B0604020202020204" pitchFamily="34" charset="0"/>
           <a:ea typeface="+mn-ea"/>
           <a:cs typeface="+mn-cs"/>
         </a:defRPr>
@@ -3415,13 +3415,13 @@
         <a:spcAft>
           <a:spcPct val="0"/>
         </a:spcAft>
-        <a:buFont typeface="Arial" panose="02080604020202020204" pitchFamily="34" charset="0"/>
+        <a:buFont typeface="Arial" panose="020B0604020202020204" pitchFamily="34" charset="0"/>
         <a:buNone/>
         <a:defRPr b="0" i="0" u="none" kern="1200" baseline="0">
           <a:solidFill>
             <a:schemeClr val="tx1"/>
           </a:solidFill>
-          <a:latin typeface="Arial" panose="02080604020202020204" pitchFamily="34" charset="0"/>
+          <a:latin typeface="Arial" panose="020B0604020202020204" pitchFamily="34" charset="0"/>
           <a:ea typeface="+mn-ea"/>
           <a:cs typeface="+mn-cs"/>
         </a:defRPr>
@@ -3436,13 +3436,13 @@
         <a:spcAft>
           <a:spcPct val="0"/>
         </a:spcAft>
-        <a:buFont typeface="Arial" panose="02080604020202020204" pitchFamily="34" charset="0"/>
+        <a:buFont typeface="Arial" panose="020B0604020202020204" pitchFamily="34" charset="0"/>
         <a:buNone/>
         <a:defRPr b="0" i="0" u="none" kern="1200" baseline="0">
           <a:solidFill>
             <a:schemeClr val="tx1"/>
           </a:solidFill>
-          <a:latin typeface="Arial" panose="02080604020202020204" pitchFamily="34" charset="0"/>
+          <a:latin typeface="Arial" panose="020B0604020202020204" pitchFamily="34" charset="0"/>
           <a:ea typeface="+mn-ea"/>
           <a:cs typeface="+mn-cs"/>
         </a:defRPr>
@@ -3457,13 +3457,13 @@
         <a:spcAft>
           <a:spcPct val="0"/>
         </a:spcAft>
-        <a:buFont typeface="Arial" panose="02080604020202020204" pitchFamily="34" charset="0"/>
+        <a:buFont typeface="Arial" panose="020B0604020202020204" pitchFamily="34" charset="0"/>
         <a:buNone/>
         <a:defRPr b="0" i="0" u="none" kern="1200" baseline="0">
           <a:solidFill>
             <a:schemeClr val="tx1"/>
           </a:solidFill>
-          <a:latin typeface="Arial" panose="02080604020202020204" pitchFamily="34" charset="0"/>
+          <a:latin typeface="Arial" panose="020B0604020202020204" pitchFamily="34" charset="0"/>
           <a:ea typeface="+mn-ea"/>
           <a:cs typeface="+mn-cs"/>
         </a:defRPr>
@@ -3478,13 +3478,13 @@
         <a:spcAft>
           <a:spcPct val="0"/>
         </a:spcAft>
-        <a:buFont typeface="Arial" panose="02080604020202020204" pitchFamily="34" charset="0"/>
+        <a:buFont typeface="Arial" panose="020B0604020202020204" pitchFamily="34" charset="0"/>
         <a:buNone/>
         <a:defRPr b="0" i="0" u="none" kern="1200" baseline="0">
           <a:solidFill>
             <a:schemeClr val="tx1"/>
           </a:solidFill>
-          <a:latin typeface="Arial" panose="02080604020202020204" pitchFamily="34" charset="0"/>
+          <a:latin typeface="Arial" panose="020B0604020202020204" pitchFamily="34" charset="0"/>
           <a:ea typeface="+mn-ea"/>
           <a:cs typeface="+mn-cs"/>
         </a:defRPr>
@@ -3499,13 +3499,13 @@
         <a:spcAft>
           <a:spcPct val="0"/>
         </a:spcAft>
-        <a:buFont typeface="Arial" panose="02080604020202020204" pitchFamily="34" charset="0"/>
+        <a:buFont typeface="Arial" panose="020B0604020202020204" pitchFamily="34" charset="0"/>
         <a:buNone/>
         <a:defRPr b="0" i="0" u="none" kern="1200" baseline="0">
           <a:solidFill>
             <a:schemeClr val="tx1"/>
           </a:solidFill>
-          <a:latin typeface="Arial" panose="02080604020202020204" pitchFamily="34" charset="0"/>
+          <a:latin typeface="Arial" panose="020B0604020202020204" pitchFamily="34" charset="0"/>
           <a:ea typeface="+mn-ea"/>
           <a:cs typeface="+mn-cs"/>
         </a:defRPr>
@@ -3520,13 +3520,13 @@
         <a:spcAft>
           <a:spcPct val="0"/>
         </a:spcAft>
-        <a:buFont typeface="Arial" panose="02080604020202020204" pitchFamily="34" charset="0"/>
+        <a:buFont typeface="Arial" panose="020B0604020202020204" pitchFamily="34" charset="0"/>
         <a:buNone/>
         <a:defRPr b="0" i="0" u="none" kern="1200" baseline="0">
           <a:solidFill>
             <a:schemeClr val="tx1"/>
           </a:solidFill>
-          <a:latin typeface="Arial" panose="02080604020202020204" pitchFamily="34" charset="0"/>
+          <a:latin typeface="Arial" panose="020B0604020202020204" pitchFamily="34" charset="0"/>
           <a:ea typeface="+mn-ea"/>
           <a:cs typeface="+mn-cs"/>
         </a:defRPr>
@@ -3574,41 +3574,23 @@
           <a:lstStyle/>
           <a:p>
             <a:r>
-              <a:rPr lang="en-IN" sz="2800" dirty="0">
-                <a:latin typeface="Noto Serif CJK JP" panose="02020400000000000000" charset="-122"/>
-                <a:ea typeface="Noto Serif CJK JP" panose="02020400000000000000" charset="-122"/>
-              </a:rPr>
+              <a:rPr lang="en-IN" sz="2800" dirty="0"/>
               <a:t>Objected Oriented Programming Concepts Using C++ &amp; Data Structures</a:t>
             </a:r>
             <a:br>
-              <a:rPr lang="en-IN" sz="2800" dirty="0">
-                <a:latin typeface="Noto Serif CJK JP" panose="02020400000000000000" charset="-122"/>
-                <a:ea typeface="Noto Serif CJK JP" panose="02020400000000000000" charset="-122"/>
-              </a:rPr>
+              <a:rPr lang="en-IN" sz="2800" dirty="0"/>
             </a:br>
             <a:br>
-              <a:rPr lang="en-IN" sz="2800" dirty="0">
-                <a:latin typeface="Noto Serif CJK JP" panose="02020400000000000000" charset="-122"/>
-                <a:ea typeface="Noto Serif CJK JP" panose="02020400000000000000" charset="-122"/>
-              </a:rPr>
+              <a:rPr lang="en-IN" sz="2800" dirty="0"/>
             </a:br>
             <a:br>
-              <a:rPr lang="en-IN" sz="2800" dirty="0">
-                <a:latin typeface="Noto Serif CJK JP" panose="02020400000000000000" charset="-122"/>
-                <a:ea typeface="Noto Serif CJK JP" panose="02020400000000000000" charset="-122"/>
-              </a:rPr>
+              <a:rPr lang="en-IN" sz="2800" dirty="0"/>
             </a:br>
             <a:r>
-              <a:rPr lang="en-US" altLang="en-IN" sz="2800" dirty="0">
-                <a:latin typeface="Noto Serif CJK JP" panose="02020400000000000000" charset="-122"/>
-                <a:ea typeface="Noto Serif CJK JP" panose="02020400000000000000" charset="-122"/>
-              </a:rPr>
+              <a:rPr lang="en-US" altLang="en-IN" sz="2800" dirty="0"/>
               <a:t>Session 2</a:t>
             </a:r>
-            <a:endParaRPr lang="en-US" altLang="en-IN" sz="2800" dirty="0">
-              <a:latin typeface="Noto Serif CJK JP" panose="02020400000000000000" charset="-122"/>
-              <a:ea typeface="Noto Serif CJK JP" panose="02020400000000000000" charset="-122"/>
-            </a:endParaRPr>
+            <a:endParaRPr lang="en-US" altLang="en-IN" sz="2800" dirty="0"/>
           </a:p>
         </p:txBody>
       </p:sp>
@@ -3658,15 +3640,11 @@
           <a:p>
             <a:r>
               <a:rPr lang="en-US" altLang="en-US" sz="3200">
-                <a:latin typeface="Noto Serif CJK JP" panose="02020400000000000000" charset="-122"/>
-                <a:ea typeface="Noto Serif CJK JP" panose="02020400000000000000" charset="-122"/>
                 <a:sym typeface="+mn-ea"/>
               </a:rPr>
               <a:t>Types of Constructors </a:t>
             </a:r>
             <a:endParaRPr lang="en-US" altLang="en-US" sz="3200">
-              <a:latin typeface="Noto Serif CJK JP" panose="02020400000000000000" charset="-122"/>
-              <a:ea typeface="Noto Serif CJK JP" panose="02020400000000000000" charset="-122"/>
               <a:sym typeface="+mn-ea"/>
             </a:endParaRPr>
           </a:p>
@@ -3697,16 +3675,10 @@
               </a:lnSpc>
             </a:pPr>
             <a:r>
-              <a:rPr sz="1800">
-                <a:latin typeface="Noto Serif CJK JP" panose="02020400000000000000" charset="-122"/>
-                <a:ea typeface="Noto Serif CJK JP" panose="02020400000000000000" charset="-122"/>
-              </a:rPr>
+              <a:rPr sz="1800"/>
               <a:t>Default Constructor</a:t>
             </a:r>
-            <a:endParaRPr sz="1800">
-              <a:latin typeface="Noto Serif CJK JP" panose="02020400000000000000" charset="-122"/>
-              <a:ea typeface="Noto Serif CJK JP" panose="02020400000000000000" charset="-122"/>
-            </a:endParaRPr>
+            <a:endParaRPr sz="1800"/>
           </a:p>
           <a:p>
             <a:pPr lvl="1">
@@ -3715,16 +3687,10 @@
               </a:lnSpc>
             </a:pPr>
             <a:r>
-              <a:rPr sz="1575">
-                <a:latin typeface="Noto Serif CJK JP" panose="02020400000000000000" charset="-122"/>
-                <a:ea typeface="Noto Serif CJK JP" panose="02020400000000000000" charset="-122"/>
-              </a:rPr>
+              <a:rPr sz="1575"/>
               <a:t>the constructor which doesn't take any argument. It has no parameter.</a:t>
             </a:r>
-            <a:endParaRPr sz="1575">
-              <a:latin typeface="Noto Serif CJK JP" panose="02020400000000000000" charset="-122"/>
-              <a:ea typeface="Noto Serif CJK JP" panose="02020400000000000000" charset="-122"/>
-            </a:endParaRPr>
+            <a:endParaRPr sz="1575"/>
           </a:p>
           <a:p>
             <a:pPr lvl="1">
@@ -3733,16 +3699,10 @@
               </a:lnSpc>
             </a:pPr>
             <a:r>
-              <a:rPr sz="1575">
-                <a:latin typeface="Noto Serif CJK JP" panose="02020400000000000000" charset="-122"/>
-                <a:ea typeface="Noto Serif CJK JP" panose="02020400000000000000" charset="-122"/>
-              </a:rPr>
+              <a:rPr sz="1575"/>
               <a:t>A default constructor is so important for initialization of object members, that even if we do not define a constructor explicitly, the compiler will provide a default constructor implicitly.</a:t>
             </a:r>
-            <a:endParaRPr sz="1575">
-              <a:latin typeface="Noto Serif CJK JP" panose="02020400000000000000" charset="-122"/>
-              <a:ea typeface="Noto Serif CJK JP" panose="02020400000000000000" charset="-122"/>
-            </a:endParaRPr>
+            <a:endParaRPr sz="1575"/>
           </a:p>
           <a:p>
             <a:pPr>
@@ -3751,16 +3711,10 @@
               </a:lnSpc>
             </a:pPr>
             <a:r>
-              <a:rPr sz="1800">
-                <a:latin typeface="Noto Serif CJK JP" panose="02020400000000000000" charset="-122"/>
-                <a:ea typeface="Noto Serif CJK JP" panose="02020400000000000000" charset="-122"/>
-              </a:rPr>
+              <a:rPr sz="1800"/>
               <a:t>Parametrized Constructor</a:t>
             </a:r>
-            <a:endParaRPr sz="1800">
-              <a:latin typeface="Noto Serif CJK JP" panose="02020400000000000000" charset="-122"/>
-              <a:ea typeface="Noto Serif CJK JP" panose="02020400000000000000" charset="-122"/>
-            </a:endParaRPr>
+            <a:endParaRPr sz="1800"/>
           </a:p>
           <a:p>
             <a:pPr lvl="1">
@@ -3769,16 +3723,10 @@
               </a:lnSpc>
             </a:pPr>
             <a:r>
-              <a:rPr sz="1575">
-                <a:latin typeface="Noto Serif CJK JP" panose="02020400000000000000" charset="-122"/>
-                <a:ea typeface="Noto Serif CJK JP" panose="02020400000000000000" charset="-122"/>
-              </a:rPr>
+              <a:rPr sz="1575"/>
               <a:t>constructors with parameter</a:t>
             </a:r>
-            <a:endParaRPr sz="1575">
-              <a:latin typeface="Noto Serif CJK JP" panose="02020400000000000000" charset="-122"/>
-              <a:ea typeface="Noto Serif CJK JP" panose="02020400000000000000" charset="-122"/>
-            </a:endParaRPr>
+            <a:endParaRPr sz="1575"/>
           </a:p>
           <a:p>
             <a:pPr lvl="1">
@@ -3787,16 +3735,10 @@
               </a:lnSpc>
             </a:pPr>
             <a:r>
-              <a:rPr sz="1575">
-                <a:latin typeface="Noto Serif CJK JP" panose="02020400000000000000" charset="-122"/>
-                <a:ea typeface="Noto Serif CJK JP" panose="02020400000000000000" charset="-122"/>
-              </a:rPr>
+              <a:rPr sz="1575"/>
               <a:t>can provide different values to data members of different objects, by passing the appropriate values as argument.</a:t>
             </a:r>
-            <a:endParaRPr sz="1575">
-              <a:latin typeface="Noto Serif CJK JP" panose="02020400000000000000" charset="-122"/>
-              <a:ea typeface="Noto Serif CJK JP" panose="02020400000000000000" charset="-122"/>
-            </a:endParaRPr>
+            <a:endParaRPr sz="1575"/>
           </a:p>
           <a:p>
             <a:pPr>
@@ -3805,30 +3747,18 @@
               </a:lnSpc>
             </a:pPr>
             <a:r>
-              <a:rPr sz="1800">
-                <a:latin typeface="Noto Serif CJK JP" panose="02020400000000000000" charset="-122"/>
-                <a:ea typeface="Noto Serif CJK JP" panose="02020400000000000000" charset="-122"/>
-              </a:rPr>
+              <a:rPr sz="1800"/>
               <a:t>Copy C</a:t>
             </a:r>
             <a:r>
-              <a:rPr lang="en-US" sz="1800">
-                <a:latin typeface="Noto Serif CJK JP" panose="02020400000000000000" charset="-122"/>
-                <a:ea typeface="Noto Serif CJK JP" panose="02020400000000000000" charset="-122"/>
-              </a:rPr>
+              <a:rPr lang="en-US" sz="1800"/>
               <a:t>o</a:t>
             </a:r>
             <a:r>
-              <a:rPr sz="1800">
-                <a:latin typeface="Noto Serif CJK JP" panose="02020400000000000000" charset="-122"/>
-                <a:ea typeface="Noto Serif CJK JP" panose="02020400000000000000" charset="-122"/>
-              </a:rPr>
+              <a:rPr sz="1800"/>
               <a:t>nstructor</a:t>
             </a:r>
-            <a:endParaRPr sz="1800">
-              <a:latin typeface="Noto Serif CJK JP" panose="02020400000000000000" charset="-122"/>
-              <a:ea typeface="Noto Serif CJK JP" panose="02020400000000000000" charset="-122"/>
-            </a:endParaRPr>
+            <a:endParaRPr sz="1800"/>
           </a:p>
           <a:p>
             <a:pPr lvl="1">
@@ -3837,16 +3767,10 @@
               </a:lnSpc>
             </a:pPr>
             <a:r>
-              <a:rPr sz="1575">
-                <a:latin typeface="Noto Serif CJK JP" panose="02020400000000000000" charset="-122"/>
-                <a:ea typeface="Noto Serif CJK JP" panose="02020400000000000000" charset="-122"/>
-              </a:rPr>
+              <a:rPr sz="1575"/>
               <a:t>which takes an object as argument, and is used to copy values of data members of one object into other object</a:t>
             </a:r>
-            <a:endParaRPr sz="1575">
-              <a:latin typeface="Noto Serif CJK JP" panose="02020400000000000000" charset="-122"/>
-              <a:ea typeface="Noto Serif CJK JP" panose="02020400000000000000" charset="-122"/>
-            </a:endParaRPr>
+            <a:endParaRPr sz="1575"/>
           </a:p>
         </p:txBody>
       </p:sp>
@@ -3889,16 +3813,11 @@
           <a:p>
             <a:r>
               <a:rPr lang="en-US" altLang="en-US" sz="3200">
-                <a:latin typeface="Noto Serif CJK JP" panose="02020400000000000000" charset="-122"/>
-                <a:ea typeface="Noto Serif CJK JP" panose="02020400000000000000" charset="-122"/>
                 <a:sym typeface="+mn-ea"/>
               </a:rPr>
               <a:t>Static Member</a:t>
             </a:r>
-            <a:endParaRPr lang="en-US" sz="3200">
-              <a:latin typeface="Noto Serif CJK JP" panose="02020400000000000000" charset="-122"/>
-              <a:ea typeface="Noto Serif CJK JP" panose="02020400000000000000" charset="-122"/>
-            </a:endParaRPr>
+            <a:endParaRPr lang="en-US" sz="3200"/>
           </a:p>
         </p:txBody>
       </p:sp>
@@ -3927,23 +3846,14 @@
               </a:lnSpc>
             </a:pPr>
             <a:r>
-              <a:rPr lang="en-US" sz="1800">
-                <a:latin typeface="Noto Serif CJK JP" panose="02020400000000000000" charset="-122"/>
-                <a:ea typeface="Noto Serif CJK JP" panose="02020400000000000000" charset="-122"/>
-              </a:rPr>
+              <a:rPr lang="en-US" sz="1800"/>
               <a:t>I</a:t>
             </a:r>
             <a:r>
-              <a:rPr sz="1800">
-                <a:latin typeface="Noto Serif CJK JP" panose="02020400000000000000" charset="-122"/>
-                <a:ea typeface="Noto Serif CJK JP" panose="02020400000000000000" charset="-122"/>
-              </a:rPr>
+              <a:rPr sz="1800"/>
               <a:t>t means no matter how many objects of the class are created, there is only one copy of the static member.</a:t>
             </a:r>
-            <a:endParaRPr sz="1800">
-              <a:latin typeface="Noto Serif CJK JP" panose="02020400000000000000" charset="-122"/>
-              <a:ea typeface="Noto Serif CJK JP" panose="02020400000000000000" charset="-122"/>
-            </a:endParaRPr>
+            <a:endParaRPr sz="1800"/>
           </a:p>
           <a:p>
             <a:pPr>
@@ -3952,23 +3862,14 @@
               </a:lnSpc>
             </a:pPr>
             <a:r>
-              <a:rPr lang="en-US" sz="1800">
-                <a:latin typeface="Noto Serif CJK JP" panose="02020400000000000000" charset="-122"/>
-                <a:ea typeface="Noto Serif CJK JP" panose="02020400000000000000" charset="-122"/>
-              </a:rPr>
+              <a:rPr lang="en-US" sz="1800"/>
               <a:t>S</a:t>
             </a:r>
             <a:r>
-              <a:rPr sz="1800">
-                <a:latin typeface="Noto Serif CJK JP" panose="02020400000000000000" charset="-122"/>
-                <a:ea typeface="Noto Serif CJK JP" panose="02020400000000000000" charset="-122"/>
-              </a:rPr>
+              <a:rPr sz="1800"/>
               <a:t>tatic member is shared by all objects of the class.</a:t>
             </a:r>
-            <a:endParaRPr sz="1800">
-              <a:latin typeface="Noto Serif CJK JP" panose="02020400000000000000" charset="-122"/>
-              <a:ea typeface="Noto Serif CJK JP" panose="02020400000000000000" charset="-122"/>
-            </a:endParaRPr>
+            <a:endParaRPr sz="1800"/>
           </a:p>
           <a:p>
             <a:pPr>
@@ -3977,23 +3878,14 @@
               </a:lnSpc>
             </a:pPr>
             <a:r>
-              <a:rPr sz="1800">
-                <a:latin typeface="Noto Serif CJK JP" panose="02020400000000000000" charset="-122"/>
-                <a:ea typeface="Noto Serif CJK JP" panose="02020400000000000000" charset="-122"/>
-              </a:rPr>
+              <a:rPr sz="1800"/>
               <a:t>Static Function Members </a:t>
             </a:r>
             <a:r>
-              <a:rPr lang="en-US" sz="1800">
-                <a:latin typeface="Noto Serif CJK JP" panose="02020400000000000000" charset="-122"/>
-                <a:ea typeface="Noto Serif CJK JP" panose="02020400000000000000" charset="-122"/>
-              </a:rPr>
+              <a:rPr lang="en-US" sz="1800"/>
               <a:t>: </a:t>
             </a:r>
-            <a:endParaRPr lang="en-US" sz="1800">
-              <a:latin typeface="Noto Serif CJK JP" panose="02020400000000000000" charset="-122"/>
-              <a:ea typeface="Noto Serif CJK JP" panose="02020400000000000000" charset="-122"/>
-            </a:endParaRPr>
+            <a:endParaRPr lang="en-US" sz="1800"/>
           </a:p>
           <a:p>
             <a:pPr lvl="1">
@@ -4002,16 +3894,10 @@
               </a:lnSpc>
             </a:pPr>
             <a:r>
-              <a:rPr lang="en-US" sz="1575">
-                <a:latin typeface="Noto Serif CJK JP" panose="02020400000000000000" charset="-122"/>
-                <a:ea typeface="Noto Serif CJK JP" panose="02020400000000000000" charset="-122"/>
-              </a:rPr>
+              <a:rPr lang="en-US" sz="1575"/>
               <a:t>Independent of any particular object of the class. </a:t>
             </a:r>
-            <a:endParaRPr lang="en-US" sz="1575">
-              <a:latin typeface="Noto Serif CJK JP" panose="02020400000000000000" charset="-122"/>
-              <a:ea typeface="Noto Serif CJK JP" panose="02020400000000000000" charset="-122"/>
-            </a:endParaRPr>
+            <a:endParaRPr lang="en-US" sz="1575"/>
           </a:p>
           <a:p>
             <a:pPr lvl="1">
@@ -4020,16 +3906,10 @@
               </a:lnSpc>
             </a:pPr>
             <a:r>
-              <a:rPr lang="en-US" sz="1575">
-                <a:latin typeface="Noto Serif CJK JP" panose="02020400000000000000" charset="-122"/>
-                <a:ea typeface="Noto Serif CJK JP" panose="02020400000000000000" charset="-122"/>
-              </a:rPr>
+              <a:rPr lang="en-US" sz="1575"/>
               <a:t>Can be called even if no objects of the class exist </a:t>
             </a:r>
-            <a:endParaRPr lang="en-US" sz="1575">
-              <a:latin typeface="Noto Serif CJK JP" panose="02020400000000000000" charset="-122"/>
-              <a:ea typeface="Noto Serif CJK JP" panose="02020400000000000000" charset="-122"/>
-            </a:endParaRPr>
+            <a:endParaRPr lang="en-US" sz="1575"/>
           </a:p>
           <a:p>
             <a:pPr lvl="1">
@@ -4038,16 +3918,10 @@
               </a:lnSpc>
             </a:pPr>
             <a:r>
-              <a:rPr lang="en-US" sz="1575">
-                <a:latin typeface="Noto Serif CJK JP" panose="02020400000000000000" charset="-122"/>
-                <a:ea typeface="Noto Serif CJK JP" panose="02020400000000000000" charset="-122"/>
-              </a:rPr>
+              <a:rPr lang="en-US" sz="1575"/>
               <a:t>Accessed using only the class name and the scope resolution operator ::</a:t>
             </a:r>
-            <a:endParaRPr lang="en-US" sz="1575">
-              <a:latin typeface="Noto Serif CJK JP" panose="02020400000000000000" charset="-122"/>
-              <a:ea typeface="Noto Serif CJK JP" panose="02020400000000000000" charset="-122"/>
-            </a:endParaRPr>
+            <a:endParaRPr lang="en-US" sz="1575"/>
           </a:p>
           <a:p>
             <a:pPr lvl="1">
@@ -4056,16 +3930,10 @@
               </a:lnSpc>
             </a:pPr>
             <a:r>
-              <a:rPr lang="en-US" sz="1575">
-                <a:latin typeface="Noto Serif CJK JP" panose="02020400000000000000" charset="-122"/>
-                <a:ea typeface="Noto Serif CJK JP" panose="02020400000000000000" charset="-122"/>
-              </a:rPr>
+              <a:rPr lang="en-US" sz="1575"/>
               <a:t>Static member function can only access static data member, other static member functions and any other functions from outside the class.</a:t>
             </a:r>
-            <a:endParaRPr lang="en-US" sz="1575">
-              <a:latin typeface="Noto Serif CJK JP" panose="02020400000000000000" charset="-122"/>
-              <a:ea typeface="Noto Serif CJK JP" panose="02020400000000000000" charset="-122"/>
-            </a:endParaRPr>
+            <a:endParaRPr lang="en-US" sz="1575"/>
           </a:p>
         </p:txBody>
       </p:sp>
@@ -4108,15 +3976,11 @@
           <a:p>
             <a:r>
               <a:rPr lang="en-US" altLang="en-US" sz="3200">
-                <a:latin typeface="Noto Serif CJK JP" panose="02020400000000000000" charset="-122"/>
-                <a:ea typeface="Noto Serif CJK JP" panose="02020400000000000000" charset="-122"/>
                 <a:sym typeface="+mn-ea"/>
               </a:rPr>
               <a:t>Inline Function</a:t>
             </a:r>
             <a:endParaRPr lang="en-US" altLang="en-US" sz="3200">
-              <a:latin typeface="Noto Serif CJK JP" panose="02020400000000000000" charset="-122"/>
-              <a:ea typeface="Noto Serif CJK JP" panose="02020400000000000000" charset="-122"/>
               <a:sym typeface="+mn-ea"/>
             </a:endParaRPr>
           </a:p>
@@ -4147,23 +4011,14 @@
               </a:lnSpc>
             </a:pPr>
             <a:r>
-              <a:rPr lang="" altLang="en-US" sz="1800">
-                <a:latin typeface="Noto Serif CJK JP" panose="02020400000000000000" charset="-122"/>
-                <a:ea typeface="Noto Serif CJK JP" panose="02020400000000000000" charset="-122"/>
-              </a:rPr>
+              <a:rPr lang="en-US" altLang="en-US" sz="1800"/>
               <a:t>T</a:t>
             </a:r>
             <a:r>
-              <a:rPr lang="en-US" sz="1800">
-                <a:latin typeface="Noto Serif CJK JP" panose="02020400000000000000" charset="-122"/>
-                <a:ea typeface="Noto Serif CJK JP" panose="02020400000000000000" charset="-122"/>
-              </a:rPr>
+              <a:rPr lang="en-US" sz="1800"/>
               <a:t>o reduce the function call overhead</a:t>
             </a:r>
-            <a:endParaRPr lang="en-US" sz="1800">
-              <a:latin typeface="Noto Serif CJK JP" panose="02020400000000000000" charset="-122"/>
-              <a:ea typeface="Noto Serif CJK JP" panose="02020400000000000000" charset="-122"/>
-            </a:endParaRPr>
+            <a:endParaRPr lang="en-US" sz="1800"/>
           </a:p>
           <a:p>
             <a:pPr>
@@ -4172,16 +4027,10 @@
               </a:lnSpc>
             </a:pPr>
             <a:r>
-              <a:rPr lang="en-US" sz="1800">
-                <a:latin typeface="Noto Serif CJK JP" panose="02020400000000000000" charset="-122"/>
-                <a:ea typeface="Noto Serif CJK JP" panose="02020400000000000000" charset="-122"/>
-              </a:rPr>
+              <a:rPr lang="en-US" sz="1800"/>
               <a:t>When the inline function is called whole code of the inline function gets inserted or substituted at the point of inline function call. </a:t>
             </a:r>
-            <a:endParaRPr lang="en-US" sz="1800">
-              <a:latin typeface="Noto Serif CJK JP" panose="02020400000000000000" charset="-122"/>
-              <a:ea typeface="Noto Serif CJK JP" panose="02020400000000000000" charset="-122"/>
-            </a:endParaRPr>
+            <a:endParaRPr lang="en-US" sz="1800"/>
           </a:p>
           <a:p>
             <a:pPr>
@@ -4190,16 +4039,10 @@
               </a:lnSpc>
             </a:pPr>
             <a:r>
-              <a:rPr lang="en-US" sz="1800">
-                <a:latin typeface="Noto Serif CJK JP" panose="02020400000000000000" charset="-122"/>
-                <a:ea typeface="Noto Serif CJK JP" panose="02020400000000000000" charset="-122"/>
-              </a:rPr>
+              <a:rPr lang="en-US" sz="1800"/>
               <a:t>This substitution is performed by the C++ compiler at compile time. Inline function may increase efficiency if it is small.</a:t>
             </a:r>
-            <a:endParaRPr lang="en-US" sz="1800">
-              <a:latin typeface="Noto Serif CJK JP" panose="02020400000000000000" charset="-122"/>
-              <a:ea typeface="Noto Serif CJK JP" panose="02020400000000000000" charset="-122"/>
-            </a:endParaRPr>
+            <a:endParaRPr lang="en-US" sz="1800"/>
           </a:p>
         </p:txBody>
       </p:sp>
@@ -4242,15 +4085,11 @@
           <a:p>
             <a:r>
               <a:rPr lang="en-US" altLang="en-US" sz="3200">
-                <a:latin typeface="Noto Serif CJK JP" panose="02020400000000000000" charset="-122"/>
-                <a:ea typeface="Noto Serif CJK JP" panose="02020400000000000000" charset="-122"/>
                 <a:sym typeface="+mn-ea"/>
               </a:rPr>
               <a:t>Inheritance</a:t>
             </a:r>
             <a:endParaRPr lang="en-US" altLang="en-US" sz="3200">
-              <a:latin typeface="Noto Serif CJK JP" panose="02020400000000000000" charset="-122"/>
-              <a:ea typeface="Noto Serif CJK JP" panose="02020400000000000000" charset="-122"/>
               <a:sym typeface="+mn-ea"/>
             </a:endParaRPr>
           </a:p>
@@ -4281,41 +4120,30 @@
               </a:lnSpc>
             </a:pPr>
             <a:r>
-              <a:rPr lang="" altLang="en-US" sz="1800">
-                <a:latin typeface="Noto Serif CJK JP" panose="02020400000000000000" charset="-122"/>
-                <a:ea typeface="Noto Serif CJK JP" panose="02020400000000000000" charset="-122"/>
+              <a:rPr lang="en-US" altLang="en-US" sz="1800">
                 <a:sym typeface="+mn-ea"/>
               </a:rPr>
               <a:t>A</a:t>
             </a:r>
             <a:r>
               <a:rPr lang="en-US" sz="1800">
-                <a:latin typeface="Noto Serif CJK JP" panose="02020400000000000000" charset="-122"/>
-                <a:ea typeface="Noto Serif CJK JP" panose="02020400000000000000" charset="-122"/>
                 <a:sym typeface="+mn-ea"/>
               </a:rPr>
               <a:t>n object of class acquires the properties of </a:t>
             </a:r>
             <a:r>
               <a:rPr lang="en-US" altLang="en-US" sz="1800">
-                <a:latin typeface="Noto Serif CJK JP" panose="02020400000000000000" charset="-122"/>
-                <a:ea typeface="Noto Serif CJK JP" panose="02020400000000000000" charset="-122"/>
                 <a:sym typeface="+mn-ea"/>
               </a:rPr>
               <a:t>another </a:t>
             </a:r>
             <a:r>
               <a:rPr lang="en-US" sz="1800">
-                <a:latin typeface="Noto Serif CJK JP" panose="02020400000000000000" charset="-122"/>
-                <a:ea typeface="Noto Serif CJK JP" panose="02020400000000000000" charset="-122"/>
                 <a:sym typeface="+mn-ea"/>
               </a:rPr>
               <a:t>class.</a:t>
             </a:r>
-            <a:endParaRPr lang="en-US" sz="1800">
-              <a:latin typeface="Noto Serif CJK JP" panose="02020400000000000000" charset="-122"/>
-              <a:ea typeface="Noto Serif CJK JP" panose="02020400000000000000" charset="-122"/>
-            </a:endParaRPr>
+            <a:endParaRPr lang="en-US" sz="1800"/>
           </a:p>
           <a:p>
             <a:pPr>
@@ -4325,16 +4153,11 @@
             </a:pPr>
             <a:r>
               <a:rPr lang="en-US" altLang="en-US" sz="1800">
-                <a:latin typeface="Noto Serif CJK JP" panose="02020400000000000000" charset="-122"/>
-                <a:ea typeface="Noto Serif CJK JP" panose="02020400000000000000" charset="-122"/>
                 <a:sym typeface="+mn-ea"/>
               </a:rPr>
               <a:t>Parent / Super class - whose properties can be inherited</a:t>
             </a:r>
-            <a:endParaRPr lang="en-US" altLang="en-US" sz="1800">
-              <a:latin typeface="Noto Serif CJK JP" panose="02020400000000000000" charset="-122"/>
-              <a:ea typeface="Noto Serif CJK JP" panose="02020400000000000000" charset="-122"/>
-            </a:endParaRPr>
+            <a:endParaRPr lang="en-US" altLang="en-US" sz="1800"/>
           </a:p>
           <a:p>
             <a:pPr>
@@ -4344,16 +4167,11 @@
             </a:pPr>
             <a:r>
               <a:rPr lang="en-US" altLang="en-US" sz="1800">
-                <a:latin typeface="Noto Serif CJK JP" panose="02020400000000000000" charset="-122"/>
-                <a:ea typeface="Noto Serif CJK JP" panose="02020400000000000000" charset="-122"/>
                 <a:sym typeface="+mn-ea"/>
               </a:rPr>
               <a:t>Child / Sub class - who inherts the properties of class</a:t>
             </a:r>
-            <a:endParaRPr lang="en-US" sz="1800">
-              <a:latin typeface="Noto Serif CJK JP" panose="02020400000000000000" charset="-122"/>
-              <a:ea typeface="Noto Serif CJK JP" panose="02020400000000000000" charset="-122"/>
-            </a:endParaRPr>
+            <a:endParaRPr lang="en-US" sz="1800"/>
           </a:p>
           <a:p>
             <a:pPr>
@@ -4363,16 +4181,11 @@
             </a:pPr>
             <a:r>
               <a:rPr lang="en-US" altLang="en-US" sz="1800">
-                <a:latin typeface="Noto Serif CJK JP" panose="02020400000000000000" charset="-122"/>
-                <a:ea typeface="Noto Serif CJK JP" panose="02020400000000000000" charset="-122"/>
                 <a:sym typeface="+mn-ea"/>
               </a:rPr>
               <a:t>achieves reusability</a:t>
             </a:r>
-            <a:endParaRPr lang="en-US" altLang="en-US" sz="1800">
-              <a:latin typeface="Noto Serif CJK JP" panose="02020400000000000000" charset="-122"/>
-              <a:ea typeface="Noto Serif CJK JP" panose="02020400000000000000" charset="-122"/>
-            </a:endParaRPr>
+            <a:endParaRPr lang="en-US" altLang="en-US" sz="1800"/>
           </a:p>
           <a:p>
             <a:pPr>
@@ -4381,31 +4194,15 @@
               </a:lnSpc>
             </a:pPr>
             <a:r>
-              <a:rPr lang="" altLang="en-US" sz="1800">
-                <a:latin typeface="Noto Serif CJK JP" panose="02020400000000000000" charset="-122"/>
-                <a:ea typeface="Noto Serif CJK JP" panose="02020400000000000000" charset="-122"/>
+              <a:rPr lang="en-US" altLang="en-US" sz="1800">
                 <a:sym typeface="+mn-ea"/>
               </a:rPr>
-              <a:t>I</a:t>
-            </a:r>
-            <a:r>
-              <a:rPr lang="en-US" altLang="en-US" sz="1800">
-                <a:latin typeface="Noto Serif CJK JP" panose="02020400000000000000" charset="-122"/>
-                <a:ea typeface="Noto Serif CJK JP" panose="02020400000000000000" charset="-122"/>
-                <a:sym typeface="+mn-ea"/>
-              </a:rPr>
-              <a:t>mplemented using operator ':' with access modifers [private , protected, public]</a:t>
-            </a:r>
-            <a:endParaRPr lang="en-US" altLang="en-US" sz="1800">
-              <a:latin typeface="Noto Serif CJK JP" panose="02020400000000000000" charset="-122"/>
-              <a:ea typeface="Noto Serif CJK JP" panose="02020400000000000000" charset="-122"/>
-            </a:endParaRPr>
-          </a:p>
-          <a:p>
-            <a:endParaRPr sz="1800">
-              <a:latin typeface="Noto Serif CJK JP" panose="02020400000000000000" charset="-122"/>
-              <a:ea typeface="Noto Serif CJK JP" panose="02020400000000000000" charset="-122"/>
-            </a:endParaRPr>
+              <a:t>Implemented using operator ':' with access modifers [private , protected, public]</a:t>
+            </a:r>
+            <a:endParaRPr lang="en-US" altLang="en-US" sz="1800"/>
+          </a:p>
+          <a:p>
+            <a:endParaRPr sz="1800"/>
           </a:p>
         </p:txBody>
       </p:sp>
@@ -4447,16 +4244,10 @@
           <a:bodyPr/>
           <a:p>
             <a:r>
-              <a:rPr lang="en-US" altLang="en-US">
-                <a:latin typeface="Noto Serif CJK JP" panose="02020400000000000000" charset="-122"/>
-                <a:ea typeface="Noto Serif CJK JP" panose="02020400000000000000" charset="-122"/>
-              </a:rPr>
+              <a:rPr lang="en-US" altLang="en-US"/>
               <a:t>Example</a:t>
             </a:r>
-            <a:endParaRPr lang="en-US" altLang="en-US">
-              <a:latin typeface="Noto Serif CJK JP" panose="02020400000000000000" charset="-122"/>
-              <a:ea typeface="Noto Serif CJK JP" panose="02020400000000000000" charset="-122"/>
-            </a:endParaRPr>
+            <a:endParaRPr lang="en-US" altLang="en-US"/>
           </a:p>
         </p:txBody>
       </p:sp>
@@ -4498,28 +4289,28 @@
             </a:pPr>
             <a:r>
               <a:rPr lang="en-US" altLang="en-US" sz="1800">
-                <a:latin typeface="FreeMono" panose="020F0409020205020404" charset="0"/>
-                <a:ea typeface="FreeMono" panose="020F0409020205020404" charset="0"/>
+                <a:latin typeface="Segoe UI Symbol" panose="020B0502040204020203" charset="0"/>
+                <a:ea typeface="Segoe UI Symbol" panose="020B0502040204020203" charset="0"/>
               </a:rPr>
               <a:t>class </a:t>
             </a:r>
             <a:r>
               <a:rPr lang="en-US" altLang="en-US" sz="1800" b="1">
-                <a:latin typeface="FreeMono" panose="020F0409020205020404" charset="0"/>
-                <a:ea typeface="FreeMono" panose="020F0409020205020404" charset="0"/>
+                <a:latin typeface="Segoe UI Symbol" panose="020B0502040204020203" charset="0"/>
+                <a:ea typeface="Segoe UI Symbol" panose="020B0502040204020203" charset="0"/>
               </a:rPr>
               <a:t>Student : public Person </a:t>
             </a:r>
             <a:r>
               <a:rPr lang="en-US" altLang="en-US" sz="1800">
-                <a:latin typeface="FreeMono" panose="020F0409020205020404" charset="0"/>
-                <a:ea typeface="FreeMono" panose="020F0409020205020404" charset="0"/>
+                <a:latin typeface="Segoe UI Symbol" panose="020B0502040204020203" charset="0"/>
+                <a:ea typeface="Segoe UI Symbol" panose="020B0502040204020203" charset="0"/>
               </a:rPr>
               <a:t>{</a:t>
             </a:r>
             <a:endParaRPr lang="en-US" altLang="en-US" sz="1800">
-              <a:latin typeface="FreeMono" panose="020F0409020205020404" charset="0"/>
-              <a:ea typeface="FreeMono" panose="020F0409020205020404" charset="0"/>
+              <a:latin typeface="Segoe UI Symbol" panose="020B0502040204020203" charset="0"/>
+              <a:ea typeface="Segoe UI Symbol" panose="020B0502040204020203" charset="0"/>
             </a:endParaRPr>
           </a:p>
           <a:p>
@@ -4528,14 +4319,14 @@
             </a:pPr>
             <a:r>
               <a:rPr lang="en-US" altLang="en-US" sz="1800">
-                <a:latin typeface="FreeMono" panose="020F0409020205020404" charset="0"/>
-                <a:ea typeface="FreeMono" panose="020F0409020205020404" charset="0"/>
+                <a:latin typeface="Segoe UI Symbol" panose="020B0502040204020203" charset="0"/>
+                <a:ea typeface="Segoe UI Symbol" panose="020B0502040204020203" charset="0"/>
               </a:rPr>
               <a:t> private int rollNo ;</a:t>
             </a:r>
             <a:endParaRPr lang="en-US" altLang="en-US" sz="1800">
-              <a:latin typeface="FreeMono" panose="020F0409020205020404" charset="0"/>
-              <a:ea typeface="FreeMono" panose="020F0409020205020404" charset="0"/>
+              <a:latin typeface="Segoe UI Symbol" panose="020B0502040204020203" charset="0"/>
+              <a:ea typeface="Segoe UI Symbol" panose="020B0502040204020203" charset="0"/>
             </a:endParaRPr>
           </a:p>
           <a:p>
@@ -4544,29 +4335,29 @@
             </a:pPr>
             <a:r>
               <a:rPr lang="en-US" altLang="en-US" sz="1800">
-                <a:latin typeface="FreeMono" panose="020F0409020205020404" charset="0"/>
-                <a:ea typeface="FreeMono" panose="020F0409020205020404" charset="0"/>
+                <a:latin typeface="Segoe UI Symbol" panose="020B0502040204020203" charset="0"/>
+                <a:ea typeface="Segoe UI Symbol" panose="020B0502040204020203" charset="0"/>
               </a:rPr>
               <a:t> </a:t>
             </a:r>
             <a:r>
               <a:rPr lang="en-US" altLang="en-US" sz="1800">
-                <a:latin typeface="FreeMono" panose="020F0409020205020404" charset="0"/>
-                <a:ea typeface="FreeMono" panose="020F0409020205020404" charset="0"/>
+                <a:latin typeface="Segoe UI Symbol" panose="020B0502040204020203" charset="0"/>
+                <a:ea typeface="Segoe UI Symbol" panose="020B0502040204020203" charset="0"/>
                 <a:sym typeface="+mn-ea"/>
               </a:rPr>
               <a:t>private char [] </a:t>
             </a:r>
             <a:r>
               <a:rPr lang="en-US" altLang="en-US" sz="1800">
-                <a:latin typeface="FreeMono" panose="020F0409020205020404" charset="0"/>
-                <a:ea typeface="FreeMono" panose="020F0409020205020404" charset="0"/>
+                <a:latin typeface="Segoe UI Symbol" panose="020B0502040204020203" charset="0"/>
+                <a:ea typeface="Segoe UI Symbol" panose="020B0502040204020203" charset="0"/>
               </a:rPr>
               <a:t>marks; </a:t>
             </a:r>
             <a:endParaRPr lang="en-US" altLang="en-US" sz="1800">
-              <a:latin typeface="FreeMono" panose="020F0409020205020404" charset="0"/>
-              <a:ea typeface="FreeMono" panose="020F0409020205020404" charset="0"/>
+              <a:latin typeface="Segoe UI Symbol" panose="020B0502040204020203" charset="0"/>
+              <a:ea typeface="Segoe UI Symbol" panose="020B0502040204020203" charset="0"/>
             </a:endParaRPr>
           </a:p>
           <a:p>
@@ -4575,29 +4366,29 @@
             </a:pPr>
             <a:r>
               <a:rPr lang="en-US" altLang="en-US" sz="1800">
-                <a:latin typeface="FreeMono" panose="020F0409020205020404" charset="0"/>
-                <a:ea typeface="FreeMono" panose="020F0409020205020404" charset="0"/>
+                <a:latin typeface="Segoe UI Symbol" panose="020B0502040204020203" charset="0"/>
+                <a:ea typeface="Segoe UI Symbol" panose="020B0502040204020203" charset="0"/>
               </a:rPr>
               <a:t> </a:t>
             </a:r>
             <a:r>
               <a:rPr lang="en-US" altLang="en-US" sz="1800">
-                <a:latin typeface="FreeMono" panose="020F0409020205020404" charset="0"/>
-                <a:ea typeface="FreeMono" panose="020F0409020205020404" charset="0"/>
+                <a:latin typeface="Segoe UI Symbol" panose="020B0502040204020203" charset="0"/>
+                <a:ea typeface="Segoe UI Symbol" panose="020B0502040204020203" charset="0"/>
                 <a:sym typeface="+mn-ea"/>
               </a:rPr>
               <a:t>private </a:t>
             </a:r>
             <a:r>
               <a:rPr lang="en-US" altLang="en-US" sz="1800">
-                <a:latin typeface="FreeMono" panose="020F0409020205020404" charset="0"/>
-                <a:ea typeface="FreeMono" panose="020F0409020205020404" charset="0"/>
+                <a:latin typeface="Segoe UI Symbol" panose="020B0502040204020203" charset="0"/>
+                <a:ea typeface="Segoe UI Symbol" panose="020B0502040204020203" charset="0"/>
               </a:rPr>
               <a:t>float height;</a:t>
             </a:r>
             <a:endParaRPr lang="en-US" altLang="en-US" sz="1800">
-              <a:latin typeface="FreeMono" panose="020F0409020205020404" charset="0"/>
-              <a:ea typeface="FreeMono" panose="020F0409020205020404" charset="0"/>
+              <a:latin typeface="Segoe UI Symbol" panose="020B0502040204020203" charset="0"/>
+              <a:ea typeface="Segoe UI Symbol" panose="020B0502040204020203" charset="0"/>
             </a:endParaRPr>
           </a:p>
           <a:p>
@@ -4606,29 +4397,29 @@
             </a:pPr>
             <a:r>
               <a:rPr lang="en-US" altLang="en-US" sz="1800">
-                <a:latin typeface="FreeMono" panose="020F0409020205020404" charset="0"/>
-                <a:ea typeface="FreeMono" panose="020F0409020205020404" charset="0"/>
+                <a:latin typeface="Segoe UI Symbol" panose="020B0502040204020203" charset="0"/>
+                <a:ea typeface="Segoe UI Symbol" panose="020B0502040204020203" charset="0"/>
               </a:rPr>
               <a:t> </a:t>
             </a:r>
             <a:r>
               <a:rPr lang="en-US" altLang="en-US" sz="1800">
-                <a:latin typeface="FreeMono" panose="020F0409020205020404" charset="0"/>
-                <a:ea typeface="FreeMono" panose="020F0409020205020404" charset="0"/>
+                <a:latin typeface="Segoe UI Symbol" panose="020B0502040204020203" charset="0"/>
+                <a:ea typeface="Segoe UI Symbol" panose="020B0502040204020203" charset="0"/>
                 <a:sym typeface="+mn-ea"/>
               </a:rPr>
               <a:t>private </a:t>
             </a:r>
             <a:r>
               <a:rPr lang="en-US" altLang="en-US" sz="1800">
-                <a:latin typeface="FreeMono" panose="020F0409020205020404" charset="0"/>
-                <a:ea typeface="FreeMono" panose="020F0409020205020404" charset="0"/>
+                <a:latin typeface="Segoe UI Symbol" panose="020B0502040204020203" charset="0"/>
+                <a:ea typeface="Segoe UI Symbol" panose="020B0502040204020203" charset="0"/>
               </a:rPr>
               <a:t>Attendences attendences; </a:t>
             </a:r>
             <a:endParaRPr lang="en-US" altLang="en-US" sz="1800">
-              <a:latin typeface="FreeMono" panose="020F0409020205020404" charset="0"/>
-              <a:ea typeface="FreeMono" panose="020F0409020205020404" charset="0"/>
+              <a:latin typeface="Segoe UI Symbol" panose="020B0502040204020203" charset="0"/>
+              <a:ea typeface="Segoe UI Symbol" panose="020B0502040204020203" charset="0"/>
             </a:endParaRPr>
           </a:p>
           <a:p>
@@ -4637,14 +4428,14 @@
             </a:pPr>
             <a:r>
               <a:rPr lang="en-US" altLang="en-US" sz="1800">
-                <a:latin typeface="FreeMono" panose="020F0409020205020404" charset="0"/>
-                <a:ea typeface="FreeMono" panose="020F0409020205020404" charset="0"/>
+                <a:latin typeface="Segoe UI Symbol" panose="020B0502040204020203" charset="0"/>
+                <a:ea typeface="Segoe UI Symbol" panose="020B0502040204020203" charset="0"/>
               </a:rPr>
               <a:t>  </a:t>
             </a:r>
             <a:endParaRPr lang="en-US" altLang="en-US" sz="1800">
-              <a:latin typeface="FreeMono" panose="020F0409020205020404" charset="0"/>
-              <a:ea typeface="FreeMono" panose="020F0409020205020404" charset="0"/>
+              <a:latin typeface="Segoe UI Symbol" panose="020B0502040204020203" charset="0"/>
+              <a:ea typeface="Segoe UI Symbol" panose="020B0502040204020203" charset="0"/>
             </a:endParaRPr>
           </a:p>
           <a:p>
@@ -4653,21 +4444,21 @@
             </a:pPr>
             <a:r>
               <a:rPr lang="en-US" altLang="en-US" sz="1800">
-                <a:latin typeface="FreeMono" panose="020F0409020205020404" charset="0"/>
-                <a:ea typeface="FreeMono" panose="020F0409020205020404" charset="0"/>
+                <a:latin typeface="Segoe UI Symbol" panose="020B0502040204020203" charset="0"/>
+                <a:ea typeface="Segoe UI Symbol" panose="020B0502040204020203" charset="0"/>
               </a:rPr>
               <a:t> public float </a:t>
             </a:r>
             <a:r>
               <a:rPr lang="en-US" altLang="en-US" sz="1795">
-                <a:latin typeface="FreeMono" panose="020F0409020205020404" charset="0"/>
-                <a:ea typeface="FreeMono" panose="020F0409020205020404" charset="0"/>
+                <a:latin typeface="Segoe UI Symbol" panose="020B0502040204020203" charset="0"/>
+                <a:ea typeface="Segoe UI Symbol" panose="020B0502040204020203" charset="0"/>
               </a:rPr>
               <a:t>calculatePercentage()</a:t>
             </a:r>
             <a:endParaRPr lang="en-US" altLang="en-US" sz="1795">
-              <a:latin typeface="FreeMono" panose="020F0409020205020404" charset="0"/>
-              <a:ea typeface="FreeMono" panose="020F0409020205020404" charset="0"/>
+              <a:latin typeface="Segoe UI Symbol" panose="020B0502040204020203" charset="0"/>
+              <a:ea typeface="Segoe UI Symbol" panose="020B0502040204020203" charset="0"/>
             </a:endParaRPr>
           </a:p>
           <a:p>
@@ -4676,14 +4467,14 @@
             </a:pPr>
             <a:r>
               <a:rPr lang="en-US" altLang="en-US" sz="1795">
-                <a:latin typeface="FreeMono" panose="020F0409020205020404" charset="0"/>
-                <a:ea typeface="FreeMono" panose="020F0409020205020404" charset="0"/>
+                <a:latin typeface="Segoe UI Symbol" panose="020B0502040204020203" charset="0"/>
+                <a:ea typeface="Segoe UI Symbol" panose="020B0502040204020203" charset="0"/>
               </a:rPr>
               <a:t> public int getAttendOfMonth(Month)</a:t>
             </a:r>
             <a:endParaRPr lang="en-US" altLang="en-US" sz="1795">
-              <a:latin typeface="FreeMono" panose="020F0409020205020404" charset="0"/>
-              <a:ea typeface="FreeMono" panose="020F0409020205020404" charset="0"/>
+              <a:latin typeface="Segoe UI Symbol" panose="020B0502040204020203" charset="0"/>
+              <a:ea typeface="Segoe UI Symbol" panose="020B0502040204020203" charset="0"/>
             </a:endParaRPr>
           </a:p>
           <a:p>
@@ -4692,14 +4483,14 @@
             </a:pPr>
             <a:r>
               <a:rPr lang="en-US" altLang="en-US" sz="1795">
-                <a:latin typeface="FreeMono" panose="020F0409020205020404" charset="0"/>
-                <a:ea typeface="FreeMono" panose="020F0409020205020404" charset="0"/>
+                <a:latin typeface="Segoe UI Symbol" panose="020B0502040204020203" charset="0"/>
+                <a:ea typeface="Segoe UI Symbol" panose="020B0502040204020203" charset="0"/>
               </a:rPr>
               <a:t>}</a:t>
             </a:r>
             <a:endParaRPr lang="en-US" altLang="en-US" sz="1795">
-              <a:latin typeface="FreeMono" panose="020F0409020205020404" charset="0"/>
-              <a:ea typeface="FreeMono" panose="020F0409020205020404" charset="0"/>
+              <a:latin typeface="Segoe UI Symbol" panose="020B0502040204020203" charset="0"/>
+              <a:ea typeface="Segoe UI Symbol" panose="020B0502040204020203" charset="0"/>
             </a:endParaRPr>
           </a:p>
           <a:p>
@@ -4707,8 +4498,8 @@
               <a:buNone/>
             </a:pPr>
             <a:endParaRPr lang="en-US" altLang="en-US" sz="1800">
-              <a:latin typeface="FreeMono" panose="020F0409020205020404" charset="0"/>
-              <a:ea typeface="FreeMono" panose="020F0409020205020404" charset="0"/>
+              <a:latin typeface="Segoe UI Symbol" panose="020B0502040204020203" charset="0"/>
+              <a:ea typeface="Segoe UI Symbol" panose="020B0502040204020203" charset="0"/>
             </a:endParaRPr>
           </a:p>
           <a:p>
@@ -4716,8 +4507,8 @@
               <a:buNone/>
             </a:pPr>
             <a:endParaRPr lang="en-US" altLang="en-US" sz="1800">
-              <a:latin typeface="FreeMono" panose="020F0409020205020404" charset="0"/>
-              <a:ea typeface="FreeMono" panose="020F0409020205020404" charset="0"/>
+              <a:latin typeface="Segoe UI Symbol" panose="020B0502040204020203" charset="0"/>
+              <a:ea typeface="Segoe UI Symbol" panose="020B0502040204020203" charset="0"/>
             </a:endParaRPr>
           </a:p>
           <a:p>
@@ -4725,8 +4516,8 @@
               <a:buNone/>
             </a:pPr>
             <a:endParaRPr lang="en-US" altLang="en-US" sz="1800">
-              <a:latin typeface="FreeMono" panose="020F0409020205020404" charset="0"/>
-              <a:ea typeface="FreeMono" panose="020F0409020205020404" charset="0"/>
+              <a:latin typeface="Segoe UI Symbol" panose="020B0502040204020203" charset="0"/>
+              <a:ea typeface="Segoe UI Symbol" panose="020B0502040204020203" charset="0"/>
             </a:endParaRPr>
           </a:p>
         </p:txBody>
@@ -4770,31 +4561,31 @@
             </a:pPr>
             <a:r>
               <a:rPr lang="en-US" altLang="en-US">
-                <a:latin typeface="FreeMono" panose="020F0409020205020404" charset="0"/>
-                <a:ea typeface="FreeMono" panose="020F0409020205020404" charset="0"/>
+                <a:latin typeface="Segoe UI Symbol" panose="020B0502040204020203" charset="0"/>
+                <a:ea typeface="Segoe UI Symbol" panose="020B0502040204020203" charset="0"/>
                 <a:sym typeface="+mn-ea"/>
               </a:rPr>
               <a:t>class </a:t>
             </a:r>
             <a:r>
               <a:rPr lang="en-US" altLang="en-US" b="1">
-                <a:latin typeface="FreeMono" panose="020F0409020205020404" charset="0"/>
-                <a:ea typeface="FreeMono" panose="020F0409020205020404" charset="0"/>
+                <a:latin typeface="Segoe UI Symbol" panose="020B0502040204020203" charset="0"/>
+                <a:ea typeface="Segoe UI Symbol" panose="020B0502040204020203" charset="0"/>
                 <a:sym typeface="+mn-ea"/>
               </a:rPr>
               <a:t>Person </a:t>
             </a:r>
             <a:r>
               <a:rPr lang="en-US" altLang="en-US">
-                <a:latin typeface="FreeMono" panose="020F0409020205020404" charset="0"/>
-                <a:ea typeface="FreeMono" panose="020F0409020205020404" charset="0"/>
+                <a:latin typeface="Segoe UI Symbol" panose="020B0502040204020203" charset="0"/>
+                <a:ea typeface="Segoe UI Symbol" panose="020B0502040204020203" charset="0"/>
                 <a:sym typeface="+mn-ea"/>
               </a:rPr>
               <a:t>{</a:t>
             </a:r>
             <a:endParaRPr lang="en-US" altLang="en-US">
-              <a:latin typeface="FreeMono" panose="020F0409020205020404" charset="0"/>
-              <a:ea typeface="FreeMono" panose="020F0409020205020404" charset="0"/>
+              <a:latin typeface="Segoe UI Symbol" panose="020B0502040204020203" charset="0"/>
+              <a:ea typeface="Segoe UI Symbol" panose="020B0502040204020203" charset="0"/>
             </a:endParaRPr>
           </a:p>
           <a:p>
@@ -4803,15 +4594,15 @@
             </a:pPr>
             <a:r>
               <a:rPr lang="en-US" altLang="en-US">
-                <a:latin typeface="FreeMono" panose="020F0409020205020404" charset="0"/>
-                <a:ea typeface="FreeMono" panose="020F0409020205020404" charset="0"/>
+                <a:latin typeface="Segoe UI Symbol" panose="020B0502040204020203" charset="0"/>
+                <a:ea typeface="Segoe UI Symbol" panose="020B0502040204020203" charset="0"/>
                 <a:sym typeface="+mn-ea"/>
               </a:rPr>
               <a:t> private int aadharNo;</a:t>
             </a:r>
             <a:endParaRPr lang="en-US" altLang="en-US">
-              <a:latin typeface="FreeMono" panose="020F0409020205020404" charset="0"/>
-              <a:ea typeface="FreeMono" panose="020F0409020205020404" charset="0"/>
+              <a:latin typeface="Segoe UI Symbol" panose="020B0502040204020203" charset="0"/>
+              <a:ea typeface="Segoe UI Symbol" panose="020B0502040204020203" charset="0"/>
               <a:sym typeface="+mn-ea"/>
             </a:endParaRPr>
           </a:p>
@@ -4821,15 +4612,15 @@
             </a:pPr>
             <a:r>
               <a:rPr lang="en-US" altLang="en-US">
-                <a:latin typeface="FreeMono" panose="020F0409020205020404" charset="0"/>
-                <a:ea typeface="FreeMono" panose="020F0409020205020404" charset="0"/>
+                <a:latin typeface="Segoe UI Symbol" panose="020B0502040204020203" charset="0"/>
+                <a:ea typeface="Segoe UI Symbol" panose="020B0502040204020203" charset="0"/>
                 <a:sym typeface="+mn-ea"/>
               </a:rPr>
               <a:t> protected char[] name;</a:t>
             </a:r>
             <a:endParaRPr lang="en-US" altLang="en-US">
-              <a:latin typeface="FreeMono" panose="020F0409020205020404" charset="0"/>
-              <a:ea typeface="FreeMono" panose="020F0409020205020404" charset="0"/>
+              <a:latin typeface="Segoe UI Symbol" panose="020B0502040204020203" charset="0"/>
+              <a:ea typeface="Segoe UI Symbol" panose="020B0502040204020203" charset="0"/>
               <a:sym typeface="+mn-ea"/>
             </a:endParaRPr>
           </a:p>
@@ -4839,14 +4630,14 @@
             </a:pPr>
             <a:r>
               <a:rPr lang="en-US" altLang="en-US">
-                <a:latin typeface="FreeMono" panose="020F0409020205020404" charset="0"/>
-                <a:ea typeface="FreeMono" panose="020F0409020205020404" charset="0"/>
+                <a:latin typeface="Segoe UI Symbol" panose="020B0502040204020203" charset="0"/>
+                <a:ea typeface="Segoe UI Symbol" panose="020B0502040204020203" charset="0"/>
               </a:rPr>
               <a:t> protected char[] address;</a:t>
             </a:r>
             <a:endParaRPr lang="en-US" altLang="en-US">
-              <a:latin typeface="FreeMono" panose="020F0409020205020404" charset="0"/>
-              <a:ea typeface="FreeMono" panose="020F0409020205020404" charset="0"/>
+              <a:latin typeface="Segoe UI Symbol" panose="020B0502040204020203" charset="0"/>
+              <a:ea typeface="Segoe UI Symbol" panose="020B0502040204020203" charset="0"/>
             </a:endParaRPr>
           </a:p>
           <a:p>
@@ -4854,8 +4645,8 @@
               <a:buNone/>
             </a:pPr>
             <a:endParaRPr lang="en-US" altLang="en-US">
-              <a:latin typeface="FreeMono" panose="020F0409020205020404" charset="0"/>
-              <a:ea typeface="FreeMono" panose="020F0409020205020404" charset="0"/>
+              <a:latin typeface="Segoe UI Symbol" panose="020B0502040204020203" charset="0"/>
+              <a:ea typeface="Segoe UI Symbol" panose="020B0502040204020203" charset="0"/>
             </a:endParaRPr>
           </a:p>
           <a:p>
@@ -4864,15 +4655,15 @@
             </a:pPr>
             <a:r>
               <a:rPr lang="en-US" altLang="en-US">
-                <a:latin typeface="FreeMono" panose="020F0409020205020404" charset="0"/>
-                <a:ea typeface="FreeMono" panose="020F0409020205020404" charset="0"/>
+                <a:latin typeface="Segoe UI Symbol" panose="020B0502040204020203" charset="0"/>
+                <a:ea typeface="Segoe UI Symbol" panose="020B0502040204020203" charset="0"/>
                 <a:sym typeface="+mn-ea"/>
               </a:rPr>
               <a:t>public void showID()</a:t>
             </a:r>
             <a:endParaRPr lang="en-US" altLang="en-US">
-              <a:latin typeface="FreeMono" panose="020F0409020205020404" charset="0"/>
-              <a:ea typeface="FreeMono" panose="020F0409020205020404" charset="0"/>
+              <a:latin typeface="Segoe UI Symbol" panose="020B0502040204020203" charset="0"/>
+              <a:ea typeface="Segoe UI Symbol" panose="020B0502040204020203" charset="0"/>
               <a:sym typeface="+mn-ea"/>
             </a:endParaRPr>
           </a:p>
@@ -4882,15 +4673,15 @@
             </a:pPr>
             <a:r>
               <a:rPr lang="en-US" altLang="en-US">
-                <a:latin typeface="FreeMono" panose="020F0409020205020404" charset="0"/>
-                <a:ea typeface="FreeMono" panose="020F0409020205020404" charset="0"/>
+                <a:latin typeface="Segoe UI Symbol" panose="020B0502040204020203" charset="0"/>
+                <a:ea typeface="Segoe UI Symbol" panose="020B0502040204020203" charset="0"/>
                 <a:sym typeface="+mn-ea"/>
               </a:rPr>
               <a:t>}</a:t>
             </a:r>
             <a:endParaRPr lang="en-US" altLang="en-US">
-              <a:latin typeface="FreeMono" panose="020F0409020205020404" charset="0"/>
-              <a:ea typeface="FreeMono" panose="020F0409020205020404" charset="0"/>
+              <a:latin typeface="Segoe UI Symbol" panose="020B0502040204020203" charset="0"/>
+              <a:ea typeface="Segoe UI Symbol" panose="020B0502040204020203" charset="0"/>
               <a:sym typeface="+mn-ea"/>
             </a:endParaRPr>
           </a:p>
@@ -4941,31 +4732,31 @@
             </a:pPr>
             <a:r>
               <a:rPr lang="en-US" altLang="en-US">
-                <a:latin typeface="FreeMono" panose="020F0409020205020404" charset="0"/>
-                <a:ea typeface="FreeMono" panose="020F0409020205020404" charset="0"/>
+                <a:latin typeface="Segoe UI Symbol" panose="020B0502040204020203" charset="0"/>
+                <a:ea typeface="Segoe UI Symbol" panose="020B0502040204020203" charset="0"/>
                 <a:sym typeface="+mn-ea"/>
               </a:rPr>
               <a:t>class </a:t>
             </a:r>
             <a:r>
               <a:rPr lang="en-US" altLang="en-US" b="1">
-                <a:latin typeface="FreeMono" panose="020F0409020205020404" charset="0"/>
-                <a:ea typeface="FreeMono" panose="020F0409020205020404" charset="0"/>
+                <a:latin typeface="Segoe UI Symbol" panose="020B0502040204020203" charset="0"/>
+                <a:ea typeface="Segoe UI Symbol" panose="020B0502040204020203" charset="0"/>
                 <a:sym typeface="+mn-ea"/>
               </a:rPr>
               <a:t>Teacher : public Person </a:t>
             </a:r>
             <a:r>
               <a:rPr lang="en-US" altLang="en-US">
-                <a:latin typeface="FreeMono" panose="020F0409020205020404" charset="0"/>
-                <a:ea typeface="FreeMono" panose="020F0409020205020404" charset="0"/>
+                <a:latin typeface="Segoe UI Symbol" panose="020B0502040204020203" charset="0"/>
+                <a:ea typeface="Segoe UI Symbol" panose="020B0502040204020203" charset="0"/>
                 <a:sym typeface="+mn-ea"/>
               </a:rPr>
               <a:t>{</a:t>
             </a:r>
             <a:endParaRPr lang="en-US" altLang="en-US">
-              <a:latin typeface="FreeMono" panose="020F0409020205020404" charset="0"/>
-              <a:ea typeface="FreeMono" panose="020F0409020205020404" charset="0"/>
+              <a:latin typeface="Segoe UI Symbol" panose="020B0502040204020203" charset="0"/>
+              <a:ea typeface="Segoe UI Symbol" panose="020B0502040204020203" charset="0"/>
             </a:endParaRPr>
           </a:p>
           <a:p>
@@ -4974,15 +4765,15 @@
             </a:pPr>
             <a:r>
               <a:rPr lang="en-US" altLang="en-US">
-                <a:latin typeface="FreeMono" panose="020F0409020205020404" charset="0"/>
-                <a:ea typeface="FreeMono" panose="020F0409020205020404" charset="0"/>
+                <a:latin typeface="Segoe UI Symbol" panose="020B0502040204020203" charset="0"/>
+                <a:ea typeface="Segoe UI Symbol" panose="020B0502040204020203" charset="0"/>
                 <a:sym typeface="+mn-ea"/>
               </a:rPr>
               <a:t>  private int employeeNo ;</a:t>
             </a:r>
             <a:endParaRPr lang="en-US" altLang="en-US">
-              <a:latin typeface="FreeMono" panose="020F0409020205020404" charset="0"/>
-              <a:ea typeface="FreeMono" panose="020F0409020205020404" charset="0"/>
+              <a:latin typeface="Segoe UI Symbol" panose="020B0502040204020203" charset="0"/>
+              <a:ea typeface="Segoe UI Symbol" panose="020B0502040204020203" charset="0"/>
               <a:sym typeface="+mn-ea"/>
             </a:endParaRPr>
           </a:p>
@@ -4992,8 +4783,8 @@
             </a:pPr>
             <a:r>
               <a:rPr lang="en-US" altLang="en-US">
-                <a:latin typeface="FreeMono" panose="020F0409020205020404" charset="0"/>
-                <a:ea typeface="FreeMono" panose="020F0409020205020404" charset="0"/>
+                <a:latin typeface="Segoe UI Symbol" panose="020B0502040204020203" charset="0"/>
+                <a:ea typeface="Segoe UI Symbol" panose="020B0502040204020203" charset="0"/>
                 <a:sym typeface="+mn-ea"/>
               </a:rPr>
               <a:t>  </a:t>
@@ -5010,21 +4801,21 @@
                     </a:schemeClr>
                   </a:outerShdw>
                 </a:effectLst>
-                <a:latin typeface="FreeMono" panose="020F0409020205020404" charset="0"/>
-                <a:ea typeface="FreeMono" panose="020F0409020205020404" charset="0"/>
+                <a:latin typeface="Segoe UI Symbol" panose="020B0502040204020203" charset="0"/>
+                <a:ea typeface="Segoe UI Symbol" panose="020B0502040204020203" charset="0"/>
               </a:rPr>
               <a:t>private </a:t>
             </a:r>
             <a:r>
               <a:rPr lang="en-US" altLang="en-US">
-                <a:latin typeface="FreeMono" panose="020F0409020205020404" charset="0"/>
-                <a:ea typeface="FreeMono" panose="020F0409020205020404" charset="0"/>
+                <a:latin typeface="Segoe UI Symbol" panose="020B0502040204020203" charset="0"/>
+                <a:ea typeface="Segoe UI Symbol" panose="020B0502040204020203" charset="0"/>
               </a:rPr>
               <a:t>char[] subjectsTaken;</a:t>
             </a:r>
             <a:endParaRPr lang="en-US" altLang="en-US">
-              <a:latin typeface="FreeMono" panose="020F0409020205020404" charset="0"/>
-              <a:ea typeface="FreeMono" panose="020F0409020205020404" charset="0"/>
+              <a:latin typeface="Segoe UI Symbol" panose="020B0502040204020203" charset="0"/>
+              <a:ea typeface="Segoe UI Symbol" panose="020B0502040204020203" charset="0"/>
             </a:endParaRPr>
           </a:p>
           <a:p>
@@ -5033,14 +4824,14 @@
             </a:pPr>
             <a:r>
               <a:rPr lang="en-US" altLang="en-US">
-                <a:latin typeface="FreeMono" panose="020F0409020205020404" charset="0"/>
-                <a:ea typeface="FreeMono" panose="020F0409020205020404" charset="0"/>
+                <a:latin typeface="Segoe UI Symbol" panose="020B0502040204020203" charset="0"/>
+                <a:ea typeface="Segoe UI Symbol" panose="020B0502040204020203" charset="0"/>
               </a:rPr>
               <a:t>  private int experience;</a:t>
             </a:r>
             <a:endParaRPr lang="en-US" altLang="en-US">
-              <a:latin typeface="FreeMono" panose="020F0409020205020404" charset="0"/>
-              <a:ea typeface="FreeMono" panose="020F0409020205020404" charset="0"/>
+              <a:latin typeface="Segoe UI Symbol" panose="020B0502040204020203" charset="0"/>
+              <a:ea typeface="Segoe UI Symbol" panose="020B0502040204020203" charset="0"/>
             </a:endParaRPr>
           </a:p>
           <a:p>
@@ -5048,8 +4839,8 @@
               <a:buNone/>
             </a:pPr>
             <a:endParaRPr lang="en-US" altLang="en-US">
-              <a:latin typeface="FreeMono" panose="020F0409020205020404" charset="0"/>
-              <a:ea typeface="FreeMono" panose="020F0409020205020404" charset="0"/>
+              <a:latin typeface="Segoe UI Symbol" panose="020B0502040204020203" charset="0"/>
+              <a:ea typeface="Segoe UI Symbol" panose="020B0502040204020203" charset="0"/>
               <a:sym typeface="+mn-ea"/>
             </a:endParaRPr>
           </a:p>
@@ -5059,22 +4850,22 @@
             </a:pPr>
             <a:r>
               <a:rPr lang="en-US" altLang="en-US">
-                <a:latin typeface="FreeMono" panose="020F0409020205020404" charset="0"/>
-                <a:ea typeface="FreeMono" panose="020F0409020205020404" charset="0"/>
+                <a:latin typeface="Segoe UI Symbol" panose="020B0502040204020203" charset="0"/>
+                <a:ea typeface="Segoe UI Symbol" panose="020B0502040204020203" charset="0"/>
               </a:rPr>
               <a:t> </a:t>
             </a:r>
             <a:r>
               <a:rPr lang="en-US" altLang="en-US">
-                <a:latin typeface="FreeMono" panose="020F0409020205020404" charset="0"/>
-                <a:ea typeface="FreeMono" panose="020F0409020205020404" charset="0"/>
+                <a:latin typeface="Segoe UI Symbol" panose="020B0502040204020203" charset="0"/>
+                <a:ea typeface="Segoe UI Symbol" panose="020B0502040204020203" charset="0"/>
                 <a:sym typeface="+mn-ea"/>
               </a:rPr>
               <a:t>public int getexpertiseSubject();</a:t>
             </a:r>
             <a:endParaRPr lang="en-US" altLang="en-US">
-              <a:latin typeface="FreeMono" panose="020F0409020205020404" charset="0"/>
-              <a:ea typeface="FreeMono" panose="020F0409020205020404" charset="0"/>
+              <a:latin typeface="Segoe UI Symbol" panose="020B0502040204020203" charset="0"/>
+              <a:ea typeface="Segoe UI Symbol" panose="020B0502040204020203" charset="0"/>
             </a:endParaRPr>
           </a:p>
           <a:p>
@@ -5083,15 +4874,15 @@
             </a:pPr>
             <a:r>
               <a:rPr lang="en-US" altLang="en-US">
-                <a:latin typeface="FreeMono" panose="020F0409020205020404" charset="0"/>
-                <a:ea typeface="FreeMono" panose="020F0409020205020404" charset="0"/>
+                <a:latin typeface="Segoe UI Symbol" panose="020B0502040204020203" charset="0"/>
+                <a:ea typeface="Segoe UI Symbol" panose="020B0502040204020203" charset="0"/>
                 <a:sym typeface="+mn-ea"/>
               </a:rPr>
               <a:t>}</a:t>
             </a:r>
             <a:endParaRPr lang="en-US" altLang="en-US">
-              <a:latin typeface="FreeMono" panose="020F0409020205020404" charset="0"/>
-              <a:ea typeface="FreeMono" panose="020F0409020205020404" charset="0"/>
+              <a:latin typeface="Segoe UI Symbol" panose="020B0502040204020203" charset="0"/>
+              <a:ea typeface="Segoe UI Symbol" panose="020B0502040204020203" charset="0"/>
             </a:endParaRPr>
           </a:p>
           <a:p>
@@ -5137,24 +4928,12 @@
           <a:bodyPr/>
           <a:p>
             <a:r>
-              <a:rPr lang="" altLang="en-US" sz="3200">
-                <a:latin typeface="Noto Serif CJK JP" panose="02020400000000000000" charset="-122"/>
-                <a:ea typeface="Noto Serif CJK JP" panose="02020400000000000000" charset="-122"/>
+              <a:rPr lang="en-US" altLang="en-US" sz="3200">
                 <a:sym typeface="+mn-ea"/>
               </a:rPr>
-              <a:t>Mode </a:t>
-            </a:r>
-            <a:r>
-              <a:rPr lang="en-US" altLang="en-US" sz="3200">
-                <a:latin typeface="Noto Serif CJK JP" panose="02020400000000000000" charset="-122"/>
-                <a:ea typeface="Noto Serif CJK JP" panose="02020400000000000000" charset="-122"/>
-                <a:sym typeface="+mn-ea"/>
-              </a:rPr>
-              <a:t>of Inheritance </a:t>
+              <a:t>Mode of Inheritance </a:t>
             </a:r>
             <a:endParaRPr lang="en-US" altLang="en-US" sz="3200">
-              <a:latin typeface="Noto Serif CJK JP" panose="02020400000000000000" charset="-122"/>
-              <a:ea typeface="Noto Serif CJK JP" panose="02020400000000000000" charset="-122"/>
               <a:sym typeface="+mn-ea"/>
             </a:endParaRPr>
           </a:p>
@@ -5193,15 +4972,15 @@
                         <a:buNone/>
                       </a:pPr>
                       <a:r>
-                        <a:rPr lang="" altLang="en-US">
-                          <a:latin typeface="Noto Serif CJK JP" panose="02020400000000000000" charset="-122"/>
-                          <a:ea typeface="Noto Serif CJK JP" panose="02020400000000000000" charset="-122"/>
+                        <a:rPr lang="en-US" altLang="en-US">
+                          <a:latin typeface="Noto Sans CJK JP Regular" panose="020B0500000000000000" charset="-122"/>
+                          <a:ea typeface="Noto Sans CJK JP Regular" panose="020B0500000000000000" charset="-122"/>
                         </a:rPr>
                         <a:t>Base class member Access Specifier</a:t>
                       </a:r>
-                      <a:endParaRPr lang="" altLang="en-US">
-                        <a:latin typeface="Noto Serif CJK JP" panose="02020400000000000000" charset="-122"/>
-                        <a:ea typeface="Noto Serif CJK JP" panose="02020400000000000000" charset="-122"/>
+                      <a:endParaRPr lang="en-US" altLang="en-US">
+                        <a:latin typeface="Noto Sans CJK JP Regular" panose="020B0500000000000000" charset="-122"/>
+                        <a:ea typeface="Noto Sans CJK JP Regular" panose="020B0500000000000000" charset="-122"/>
                       </a:endParaRPr>
                     </a:p>
                   </a:txBody>
@@ -5215,15 +4994,15 @@
                         <a:buNone/>
                       </a:pPr>
                       <a:r>
-                        <a:rPr lang="" altLang="en-US">
-                          <a:latin typeface="Noto Serif CJK JP" panose="02020400000000000000" charset="-122"/>
-                          <a:ea typeface="Noto Serif CJK JP" panose="02020400000000000000" charset="-122"/>
+                        <a:rPr lang="en-US" altLang="en-US">
+                          <a:latin typeface="Noto Sans CJK JP Regular" panose="020B0500000000000000" charset="-122"/>
+                          <a:ea typeface="Noto Sans CJK JP Regular" panose="020B0500000000000000" charset="-122"/>
                         </a:rPr>
                         <a:t>Private</a:t>
                       </a:r>
-                      <a:endParaRPr lang="" altLang="en-US">
-                        <a:latin typeface="Noto Serif CJK JP" panose="02020400000000000000" charset="-122"/>
-                        <a:ea typeface="Noto Serif CJK JP" panose="02020400000000000000" charset="-122"/>
+                      <a:endParaRPr lang="en-US" altLang="en-US">
+                        <a:latin typeface="Noto Sans CJK JP Regular" panose="020B0500000000000000" charset="-122"/>
+                        <a:ea typeface="Noto Sans CJK JP Regular" panose="020B0500000000000000" charset="-122"/>
                       </a:endParaRPr>
                     </a:p>
                   </a:txBody>
@@ -5237,15 +5016,15 @@
                         <a:buNone/>
                       </a:pPr>
                       <a:r>
-                        <a:rPr lang="" altLang="en-US">
-                          <a:latin typeface="Noto Serif CJK JP" panose="02020400000000000000" charset="-122"/>
-                          <a:ea typeface="Noto Serif CJK JP" panose="02020400000000000000" charset="-122"/>
+                        <a:rPr lang="en-US" altLang="en-US">
+                          <a:latin typeface="Noto Sans CJK JP Regular" panose="020B0500000000000000" charset="-122"/>
+                          <a:ea typeface="Noto Sans CJK JP Regular" panose="020B0500000000000000" charset="-122"/>
                         </a:rPr>
                         <a:t>Protected</a:t>
                       </a:r>
-                      <a:endParaRPr lang="" altLang="en-US">
-                        <a:latin typeface="Noto Serif CJK JP" panose="02020400000000000000" charset="-122"/>
-                        <a:ea typeface="Noto Serif CJK JP" panose="02020400000000000000" charset="-122"/>
+                      <a:endParaRPr lang="en-US" altLang="en-US">
+                        <a:latin typeface="Noto Sans CJK JP Regular" panose="020B0500000000000000" charset="-122"/>
+                        <a:ea typeface="Noto Sans CJK JP Regular" panose="020B0500000000000000" charset="-122"/>
                       </a:endParaRPr>
                     </a:p>
                   </a:txBody>
@@ -5259,15 +5038,15 @@
                         <a:buNone/>
                       </a:pPr>
                       <a:r>
-                        <a:rPr lang="" altLang="en-US">
-                          <a:latin typeface="Noto Serif CJK JP" panose="02020400000000000000" charset="-122"/>
-                          <a:ea typeface="Noto Serif CJK JP" panose="02020400000000000000" charset="-122"/>
+                        <a:rPr lang="en-US" altLang="en-US">
+                          <a:latin typeface="Noto Sans CJK JP Regular" panose="020B0500000000000000" charset="-122"/>
+                          <a:ea typeface="Noto Sans CJK JP Regular" panose="020B0500000000000000" charset="-122"/>
                         </a:rPr>
                         <a:t>Public</a:t>
                       </a:r>
-                      <a:endParaRPr lang="" altLang="en-US">
-                        <a:latin typeface="Noto Serif CJK JP" panose="02020400000000000000" charset="-122"/>
-                        <a:ea typeface="Noto Serif CJK JP" panose="02020400000000000000" charset="-122"/>
+                      <a:endParaRPr lang="en-US" altLang="en-US">
+                        <a:latin typeface="Noto Sans CJK JP Regular" panose="020B0500000000000000" charset="-122"/>
+                        <a:ea typeface="Noto Sans CJK JP Regular" panose="020B0500000000000000" charset="-122"/>
                       </a:endParaRPr>
                     </a:p>
                   </a:txBody>
@@ -5283,15 +5062,15 @@
                         <a:buNone/>
                       </a:pPr>
                       <a:r>
-                        <a:rPr lang="" altLang="en-US">
-                          <a:latin typeface="Noto Serif CJK JP" panose="02020400000000000000" charset="-122"/>
-                          <a:ea typeface="Noto Serif CJK JP" panose="02020400000000000000" charset="-122"/>
+                        <a:rPr lang="en-US" altLang="en-US">
+                          <a:latin typeface="Noto Sans CJK JP Regular" panose="020B0500000000000000" charset="-122"/>
+                          <a:ea typeface="Noto Sans CJK JP Regular" panose="020B0500000000000000" charset="-122"/>
                         </a:rPr>
                         <a:t>private</a:t>
                       </a:r>
-                      <a:endParaRPr lang="" altLang="en-US">
-                        <a:latin typeface="Noto Serif CJK JP" panose="02020400000000000000" charset="-122"/>
-                        <a:ea typeface="Noto Serif CJK JP" panose="02020400000000000000" charset="-122"/>
+                      <a:endParaRPr lang="en-US" altLang="en-US">
+                        <a:latin typeface="Noto Sans CJK JP Regular" panose="020B0500000000000000" charset="-122"/>
+                        <a:ea typeface="Noto Sans CJK JP Regular" panose="020B0500000000000000" charset="-122"/>
                       </a:endParaRPr>
                     </a:p>
                   </a:txBody>
@@ -5305,15 +5084,15 @@
                         <a:buNone/>
                       </a:pPr>
                       <a:r>
-                        <a:rPr lang="" altLang="en-US">
-                          <a:latin typeface="Noto Serif CJK JP" panose="02020400000000000000" charset="-122"/>
-                          <a:ea typeface="Noto Serif CJK JP" panose="02020400000000000000" charset="-122"/>
+                        <a:rPr lang="en-US" altLang="en-US">
+                          <a:latin typeface="Noto Sans CJK JP Regular" panose="020B0500000000000000" charset="-122"/>
+                          <a:ea typeface="Noto Sans CJK JP Regular" panose="020B0500000000000000" charset="-122"/>
                         </a:rPr>
                         <a:t>Not Accessible</a:t>
                       </a:r>
-                      <a:endParaRPr lang="" altLang="en-US">
-                        <a:latin typeface="Noto Serif CJK JP" panose="02020400000000000000" charset="-122"/>
-                        <a:ea typeface="Noto Serif CJK JP" panose="02020400000000000000" charset="-122"/>
+                      <a:endParaRPr lang="en-US" altLang="en-US">
+                        <a:latin typeface="Noto Sans CJK JP Regular" panose="020B0500000000000000" charset="-122"/>
+                        <a:ea typeface="Noto Sans CJK JP Regular" panose="020B0500000000000000" charset="-122"/>
                       </a:endParaRPr>
                     </a:p>
                   </a:txBody>
@@ -5328,15 +5107,15 @@
                       </a:pPr>
                       <a:r>
                         <a:rPr lang="en-US" altLang="en-US" sz="1800">
-                          <a:latin typeface="Noto Serif CJK JP" panose="02020400000000000000" charset="-122"/>
-                          <a:ea typeface="Noto Serif CJK JP" panose="02020400000000000000" charset="-122"/>
+                          <a:latin typeface="Noto Sans CJK JP Regular" panose="020B0500000000000000" charset="-122"/>
+                          <a:ea typeface="Noto Sans CJK JP Regular" panose="020B0500000000000000" charset="-122"/>
                           <a:sym typeface="+mn-ea"/>
                         </a:rPr>
                         <a:t>Not Accessible</a:t>
                       </a:r>
                       <a:endParaRPr lang="en-US" altLang="en-US" sz="1800">
-                        <a:latin typeface="Noto Serif CJK JP" panose="02020400000000000000" charset="-122"/>
-                        <a:ea typeface="Noto Serif CJK JP" panose="02020400000000000000" charset="-122"/>
+                        <a:latin typeface="Noto Sans CJK JP Regular" panose="020B0500000000000000" charset="-122"/>
+                        <a:ea typeface="Noto Sans CJK JP Regular" panose="020B0500000000000000" charset="-122"/>
                         <a:sym typeface="+mn-ea"/>
                       </a:endParaRPr>
                     </a:p>
@@ -5345,8 +5124,8 @@
                         <a:buNone/>
                       </a:pPr>
                       <a:endParaRPr lang="en-US">
-                        <a:latin typeface="Noto Serif CJK JP" panose="02020400000000000000" charset="-122"/>
-                        <a:ea typeface="Noto Serif CJK JP" panose="02020400000000000000" charset="-122"/>
+                        <a:latin typeface="Noto Sans CJK JP Regular" panose="020B0500000000000000" charset="-122"/>
+                        <a:ea typeface="Noto Sans CJK JP Regular" panose="020B0500000000000000" charset="-122"/>
                       </a:endParaRPr>
                     </a:p>
                   </a:txBody>
@@ -5361,15 +5140,15 @@
                       </a:pPr>
                       <a:r>
                         <a:rPr lang="en-US" altLang="en-US" sz="1800">
-                          <a:latin typeface="Noto Serif CJK JP" panose="02020400000000000000" charset="-122"/>
-                          <a:ea typeface="Noto Serif CJK JP" panose="02020400000000000000" charset="-122"/>
+                          <a:latin typeface="Noto Sans CJK JP Regular" panose="020B0500000000000000" charset="-122"/>
+                          <a:ea typeface="Noto Sans CJK JP Regular" panose="020B0500000000000000" charset="-122"/>
                           <a:sym typeface="+mn-ea"/>
                         </a:rPr>
                         <a:t>Not Accessible</a:t>
                       </a:r>
                       <a:endParaRPr lang="en-US" altLang="en-US" sz="1800">
-                        <a:latin typeface="Noto Serif CJK JP" panose="02020400000000000000" charset="-122"/>
-                        <a:ea typeface="Noto Serif CJK JP" panose="02020400000000000000" charset="-122"/>
+                        <a:latin typeface="Noto Sans CJK JP Regular" panose="020B0500000000000000" charset="-122"/>
+                        <a:ea typeface="Noto Sans CJK JP Regular" panose="020B0500000000000000" charset="-122"/>
                         <a:sym typeface="+mn-ea"/>
                       </a:endParaRPr>
                     </a:p>
@@ -5378,8 +5157,8 @@
                         <a:buNone/>
                       </a:pPr>
                       <a:endParaRPr lang="en-US">
-                        <a:latin typeface="Noto Serif CJK JP" panose="02020400000000000000" charset="-122"/>
-                        <a:ea typeface="Noto Serif CJK JP" panose="02020400000000000000" charset="-122"/>
+                        <a:latin typeface="Noto Sans CJK JP Regular" panose="020B0500000000000000" charset="-122"/>
+                        <a:ea typeface="Noto Sans CJK JP Regular" panose="020B0500000000000000" charset="-122"/>
                       </a:endParaRPr>
                     </a:p>
                   </a:txBody>
@@ -5395,15 +5174,15 @@
                         <a:buNone/>
                       </a:pPr>
                       <a:r>
-                        <a:rPr lang="" altLang="en-US">
-                          <a:latin typeface="Noto Serif CJK JP" panose="02020400000000000000" charset="-122"/>
-                          <a:ea typeface="Noto Serif CJK JP" panose="02020400000000000000" charset="-122"/>
+                        <a:rPr lang="en-US" altLang="en-US">
+                          <a:latin typeface="Noto Sans CJK JP Regular" panose="020B0500000000000000" charset="-122"/>
+                          <a:ea typeface="Noto Sans CJK JP Regular" panose="020B0500000000000000" charset="-122"/>
                         </a:rPr>
                         <a:t>protected</a:t>
                       </a:r>
-                      <a:endParaRPr lang="" altLang="en-US">
-                        <a:latin typeface="Noto Serif CJK JP" panose="02020400000000000000" charset="-122"/>
-                        <a:ea typeface="Noto Serif CJK JP" panose="02020400000000000000" charset="-122"/>
+                      <a:endParaRPr lang="en-US" altLang="en-US">
+                        <a:latin typeface="Noto Sans CJK JP Regular" panose="020B0500000000000000" charset="-122"/>
+                        <a:ea typeface="Noto Sans CJK JP Regular" panose="020B0500000000000000" charset="-122"/>
                       </a:endParaRPr>
                     </a:p>
                   </a:txBody>
@@ -5417,15 +5196,15 @@
                         <a:buNone/>
                       </a:pPr>
                       <a:r>
-                        <a:rPr lang="" altLang="en-US">
-                          <a:latin typeface="Noto Serif CJK JP" panose="02020400000000000000" charset="-122"/>
-                          <a:ea typeface="Noto Serif CJK JP" panose="02020400000000000000" charset="-122"/>
+                        <a:rPr lang="en-US" altLang="en-US">
+                          <a:latin typeface="Noto Sans CJK JP Regular" panose="020B0500000000000000" charset="-122"/>
+                          <a:ea typeface="Noto Sans CJK JP Regular" panose="020B0500000000000000" charset="-122"/>
                         </a:rPr>
                         <a:t>private</a:t>
                       </a:r>
-                      <a:endParaRPr lang="" altLang="en-US">
-                        <a:latin typeface="Noto Serif CJK JP" panose="02020400000000000000" charset="-122"/>
-                        <a:ea typeface="Noto Serif CJK JP" panose="02020400000000000000" charset="-122"/>
+                      <a:endParaRPr lang="en-US" altLang="en-US">
+                        <a:latin typeface="Noto Sans CJK JP Regular" panose="020B0500000000000000" charset="-122"/>
+                        <a:ea typeface="Noto Sans CJK JP Regular" panose="020B0500000000000000" charset="-122"/>
                       </a:endParaRPr>
                     </a:p>
                   </a:txBody>
@@ -5439,15 +5218,15 @@
                         <a:buNone/>
                       </a:pPr>
                       <a:r>
-                        <a:rPr lang="" altLang="en-US">
-                          <a:latin typeface="Noto Serif CJK JP" panose="02020400000000000000" charset="-122"/>
-                          <a:ea typeface="Noto Serif CJK JP" panose="02020400000000000000" charset="-122"/>
+                        <a:rPr lang="en-US" altLang="en-US">
+                          <a:latin typeface="Noto Sans CJK JP Regular" panose="020B0500000000000000" charset="-122"/>
+                          <a:ea typeface="Noto Sans CJK JP Regular" panose="020B0500000000000000" charset="-122"/>
                         </a:rPr>
                         <a:t>protected</a:t>
                       </a:r>
-                      <a:endParaRPr lang="" altLang="en-US">
-                        <a:latin typeface="Noto Serif CJK JP" panose="02020400000000000000" charset="-122"/>
-                        <a:ea typeface="Noto Serif CJK JP" panose="02020400000000000000" charset="-122"/>
+                      <a:endParaRPr lang="en-US" altLang="en-US">
+                        <a:latin typeface="Noto Sans CJK JP Regular" panose="020B0500000000000000" charset="-122"/>
+                        <a:ea typeface="Noto Sans CJK JP Regular" panose="020B0500000000000000" charset="-122"/>
                       </a:endParaRPr>
                     </a:p>
                   </a:txBody>
@@ -5461,24 +5240,24 @@
                         <a:buNone/>
                       </a:pPr>
                       <a:r>
-                        <a:rPr lang="" altLang="en-US">
-                          <a:latin typeface="Noto Serif CJK JP" panose="02020400000000000000" charset="-122"/>
-                          <a:ea typeface="Noto Serif CJK JP" panose="02020400000000000000" charset="-122"/>
+                        <a:rPr lang="en-US" altLang="en-US">
+                          <a:latin typeface="Noto Sans CJK JP Regular" panose="020B0500000000000000" charset="-122"/>
+                          <a:ea typeface="Noto Sans CJK JP Regular" panose="020B0500000000000000" charset="-122"/>
                         </a:rPr>
                         <a:t>protected</a:t>
                       </a:r>
-                      <a:endParaRPr lang="" altLang="en-US">
-                        <a:latin typeface="Noto Serif CJK JP" panose="02020400000000000000" charset="-122"/>
-                        <a:ea typeface="Noto Serif CJK JP" panose="02020400000000000000" charset="-122"/>
+                      <a:endParaRPr lang="en-US" altLang="en-US">
+                        <a:latin typeface="Noto Sans CJK JP Regular" panose="020B0500000000000000" charset="-122"/>
+                        <a:ea typeface="Noto Sans CJK JP Regular" panose="020B0500000000000000" charset="-122"/>
                       </a:endParaRPr>
                     </a:p>
                     <a:p>
                       <a:pPr>
                         <a:buNone/>
                       </a:pPr>
-                      <a:endParaRPr lang="" altLang="en-US">
-                        <a:latin typeface="Noto Serif CJK JP" panose="02020400000000000000" charset="-122"/>
-                        <a:ea typeface="Noto Serif CJK JP" panose="02020400000000000000" charset="-122"/>
+                      <a:endParaRPr lang="en-US" altLang="en-US">
+                        <a:latin typeface="Noto Sans CJK JP Regular" panose="020B0500000000000000" charset="-122"/>
+                        <a:ea typeface="Noto Sans CJK JP Regular" panose="020B0500000000000000" charset="-122"/>
                       </a:endParaRPr>
                     </a:p>
                   </a:txBody>
@@ -5494,15 +5273,15 @@
                         <a:buNone/>
                       </a:pPr>
                       <a:r>
-                        <a:rPr lang="" altLang="en-US">
-                          <a:latin typeface="Noto Serif CJK JP" panose="02020400000000000000" charset="-122"/>
-                          <a:ea typeface="Noto Serif CJK JP" panose="02020400000000000000" charset="-122"/>
+                        <a:rPr lang="en-US" altLang="en-US">
+                          <a:latin typeface="Noto Sans CJK JP Regular" panose="020B0500000000000000" charset="-122"/>
+                          <a:ea typeface="Noto Sans CJK JP Regular" panose="020B0500000000000000" charset="-122"/>
                         </a:rPr>
                         <a:t>public</a:t>
                       </a:r>
-                      <a:endParaRPr lang="" altLang="en-US">
-                        <a:latin typeface="Noto Serif CJK JP" panose="02020400000000000000" charset="-122"/>
-                        <a:ea typeface="Noto Serif CJK JP" panose="02020400000000000000" charset="-122"/>
+                      <a:endParaRPr lang="en-US" altLang="en-US">
+                        <a:latin typeface="Noto Sans CJK JP Regular" panose="020B0500000000000000" charset="-122"/>
+                        <a:ea typeface="Noto Sans CJK JP Regular" panose="020B0500000000000000" charset="-122"/>
                       </a:endParaRPr>
                     </a:p>
                   </a:txBody>
@@ -5516,15 +5295,15 @@
                         <a:buNone/>
                       </a:pPr>
                       <a:r>
-                        <a:rPr lang="" altLang="en-US">
-                          <a:latin typeface="Noto Serif CJK JP" panose="02020400000000000000" charset="-122"/>
-                          <a:ea typeface="Noto Serif CJK JP" panose="02020400000000000000" charset="-122"/>
+                        <a:rPr lang="en-US" altLang="en-US">
+                          <a:latin typeface="Noto Sans CJK JP Regular" panose="020B0500000000000000" charset="-122"/>
+                          <a:ea typeface="Noto Sans CJK JP Regular" panose="020B0500000000000000" charset="-122"/>
                         </a:rPr>
                         <a:t>private</a:t>
                       </a:r>
-                      <a:endParaRPr lang="" altLang="en-US">
-                        <a:latin typeface="Noto Serif CJK JP" panose="02020400000000000000" charset="-122"/>
-                        <a:ea typeface="Noto Serif CJK JP" panose="02020400000000000000" charset="-122"/>
+                      <a:endParaRPr lang="en-US" altLang="en-US">
+                        <a:latin typeface="Noto Sans CJK JP Regular" panose="020B0500000000000000" charset="-122"/>
+                        <a:ea typeface="Noto Sans CJK JP Regular" panose="020B0500000000000000" charset="-122"/>
                       </a:endParaRPr>
                     </a:p>
                   </a:txBody>
@@ -5538,15 +5317,15 @@
                         <a:buNone/>
                       </a:pPr>
                       <a:r>
-                        <a:rPr lang="" altLang="en-US">
-                          <a:latin typeface="Noto Serif CJK JP" panose="02020400000000000000" charset="-122"/>
-                          <a:ea typeface="Noto Serif CJK JP" panose="02020400000000000000" charset="-122"/>
+                        <a:rPr lang="en-US" altLang="en-US">
+                          <a:latin typeface="Noto Sans CJK JP Regular" panose="020B0500000000000000" charset="-122"/>
+                          <a:ea typeface="Noto Sans CJK JP Regular" panose="020B0500000000000000" charset="-122"/>
                         </a:rPr>
                         <a:t>protected</a:t>
                       </a:r>
-                      <a:endParaRPr lang="" altLang="en-US">
-                        <a:latin typeface="Noto Serif CJK JP" panose="02020400000000000000" charset="-122"/>
-                        <a:ea typeface="Noto Serif CJK JP" panose="02020400000000000000" charset="-122"/>
+                      <a:endParaRPr lang="en-US" altLang="en-US">
+                        <a:latin typeface="Noto Sans CJK JP Regular" panose="020B0500000000000000" charset="-122"/>
+                        <a:ea typeface="Noto Sans CJK JP Regular" panose="020B0500000000000000" charset="-122"/>
                       </a:endParaRPr>
                     </a:p>
                   </a:txBody>
@@ -5560,24 +5339,24 @@
                         <a:buNone/>
                       </a:pPr>
                       <a:r>
-                        <a:rPr lang="" altLang="en-US">
-                          <a:latin typeface="Noto Serif CJK JP" panose="02020400000000000000" charset="-122"/>
-                          <a:ea typeface="Noto Serif CJK JP" panose="02020400000000000000" charset="-122"/>
+                        <a:rPr lang="en-US" altLang="en-US">
+                          <a:latin typeface="Noto Sans CJK JP Regular" panose="020B0500000000000000" charset="-122"/>
+                          <a:ea typeface="Noto Sans CJK JP Regular" panose="020B0500000000000000" charset="-122"/>
                         </a:rPr>
                         <a:t>public</a:t>
                       </a:r>
-                      <a:endParaRPr lang="" altLang="en-US">
-                        <a:latin typeface="Noto Serif CJK JP" panose="02020400000000000000" charset="-122"/>
-                        <a:ea typeface="Noto Serif CJK JP" panose="02020400000000000000" charset="-122"/>
+                      <a:endParaRPr lang="en-US" altLang="en-US">
+                        <a:latin typeface="Noto Sans CJK JP Regular" panose="020B0500000000000000" charset="-122"/>
+                        <a:ea typeface="Noto Sans CJK JP Regular" panose="020B0500000000000000" charset="-122"/>
                       </a:endParaRPr>
                     </a:p>
                     <a:p>
                       <a:pPr>
                         <a:buNone/>
                       </a:pPr>
-                      <a:endParaRPr lang="" altLang="en-US">
-                        <a:latin typeface="Noto Serif CJK JP" panose="02020400000000000000" charset="-122"/>
-                        <a:ea typeface="Noto Serif CJK JP" panose="02020400000000000000" charset="-122"/>
+                      <a:endParaRPr lang="en-US" altLang="en-US">
+                        <a:latin typeface="Noto Sans CJK JP Regular" panose="020B0500000000000000" charset="-122"/>
+                        <a:ea typeface="Noto Sans CJK JP Regular" panose="020B0500000000000000" charset="-122"/>
                       </a:endParaRPr>
                     </a:p>
                   </a:txBody>
@@ -5627,15 +5406,11 @@
           <a:p>
             <a:r>
               <a:rPr lang="en-US" altLang="en-US" sz="3200">
-                <a:latin typeface="Noto Serif CJK JP" panose="02020400000000000000" charset="-122"/>
-                <a:ea typeface="Noto Serif CJK JP" panose="02020400000000000000" charset="-122"/>
                 <a:sym typeface="+mn-ea"/>
               </a:rPr>
               <a:t>Types of Inheritance </a:t>
             </a:r>
             <a:endParaRPr lang="en-US" altLang="en-US" sz="3200">
-              <a:latin typeface="Noto Serif CJK JP" panose="02020400000000000000" charset="-122"/>
-              <a:ea typeface="Noto Serif CJK JP" panose="02020400000000000000" charset="-122"/>
               <a:sym typeface="+mn-ea"/>
             </a:endParaRPr>
           </a:p>
@@ -5666,16 +5441,10 @@
               </a:lnSpc>
             </a:pPr>
             <a:r>
-              <a:rPr lang="en-US" sz="1800">
-                <a:latin typeface="Noto Serif CJK JP" panose="02020400000000000000" charset="-122"/>
-                <a:ea typeface="Noto Serif CJK JP" panose="02020400000000000000" charset="-122"/>
-              </a:rPr>
+              <a:rPr lang="en-US" sz="1800"/>
               <a:t>Single Inheritance</a:t>
             </a:r>
-            <a:endParaRPr lang="en-US" sz="1800">
-              <a:latin typeface="Noto Serif CJK JP" panose="02020400000000000000" charset="-122"/>
-              <a:ea typeface="Noto Serif CJK JP" panose="02020400000000000000" charset="-122"/>
-            </a:endParaRPr>
+            <a:endParaRPr lang="en-US" sz="1800"/>
           </a:p>
           <a:p>
             <a:pPr lvl="1">
@@ -5684,16 +5453,10 @@
               </a:lnSpc>
             </a:pPr>
             <a:r>
-              <a:rPr lang="en-US" sz="1575">
-                <a:latin typeface="Noto Serif CJK JP" panose="02020400000000000000" charset="-122"/>
-                <a:ea typeface="Noto Serif CJK JP" panose="02020400000000000000" charset="-122"/>
-              </a:rPr>
+              <a:rPr lang="en-US" sz="1575"/>
               <a:t>one derived class inherits from only one base class. </a:t>
             </a:r>
-            <a:endParaRPr lang="en-US" sz="1575">
-              <a:latin typeface="Noto Serif CJK JP" panose="02020400000000000000" charset="-122"/>
-              <a:ea typeface="Noto Serif CJK JP" panose="02020400000000000000" charset="-122"/>
-            </a:endParaRPr>
+            <a:endParaRPr lang="en-US" sz="1575"/>
           </a:p>
           <a:p>
             <a:pPr>
@@ -5702,16 +5465,10 @@
               </a:lnSpc>
             </a:pPr>
             <a:r>
-              <a:rPr lang="en-US" sz="1800">
-                <a:latin typeface="Noto Serif CJK JP" panose="02020400000000000000" charset="-122"/>
-                <a:ea typeface="Noto Serif CJK JP" panose="02020400000000000000" charset="-122"/>
-              </a:rPr>
+              <a:rPr lang="en-US" sz="1800"/>
               <a:t>Multiple Inheritance</a:t>
             </a:r>
-            <a:endParaRPr lang="en-US" sz="1800">
-              <a:latin typeface="Noto Serif CJK JP" panose="02020400000000000000" charset="-122"/>
-              <a:ea typeface="Noto Serif CJK JP" panose="02020400000000000000" charset="-122"/>
-            </a:endParaRPr>
+            <a:endParaRPr lang="en-US" sz="1800"/>
           </a:p>
           <a:p>
             <a:pPr lvl="1">
@@ -5720,16 +5477,10 @@
               </a:lnSpc>
             </a:pPr>
             <a:r>
-              <a:rPr lang="en-US" sz="1575">
-                <a:latin typeface="Noto Serif CJK JP" panose="02020400000000000000" charset="-122"/>
-                <a:ea typeface="Noto Serif CJK JP" panose="02020400000000000000" charset="-122"/>
-              </a:rPr>
+              <a:rPr lang="en-US" sz="1575"/>
               <a:t>single derived class may inherit from two or more than two base classes.</a:t>
             </a:r>
-            <a:endParaRPr lang="en-US" sz="1575">
-              <a:latin typeface="Noto Serif CJK JP" panose="02020400000000000000" charset="-122"/>
-              <a:ea typeface="Noto Serif CJK JP" panose="02020400000000000000" charset="-122"/>
-            </a:endParaRPr>
+            <a:endParaRPr lang="en-US" sz="1575"/>
           </a:p>
           <a:p>
             <a:pPr>
@@ -5738,16 +5489,10 @@
               </a:lnSpc>
             </a:pPr>
             <a:r>
-              <a:rPr lang="en-US" sz="1800">
-                <a:latin typeface="Noto Serif CJK JP" panose="02020400000000000000" charset="-122"/>
-                <a:ea typeface="Noto Serif CJK JP" panose="02020400000000000000" charset="-122"/>
-              </a:rPr>
+              <a:rPr lang="en-US" sz="1800"/>
               <a:t>Hierarchical Inheritance</a:t>
             </a:r>
-            <a:endParaRPr lang="en-US" sz="1800">
-              <a:latin typeface="Noto Serif CJK JP" panose="02020400000000000000" charset="-122"/>
-              <a:ea typeface="Noto Serif CJK JP" panose="02020400000000000000" charset="-122"/>
-            </a:endParaRPr>
+            <a:endParaRPr lang="en-US" sz="1800"/>
           </a:p>
           <a:p>
             <a:pPr lvl="1">
@@ -5756,16 +5501,10 @@
               </a:lnSpc>
             </a:pPr>
             <a:r>
-              <a:rPr lang="en-US" sz="1575">
-                <a:latin typeface="Noto Serif CJK JP" panose="02020400000000000000" charset="-122"/>
-                <a:ea typeface="Noto Serif CJK JP" panose="02020400000000000000" charset="-122"/>
-              </a:rPr>
+              <a:rPr lang="en-US" sz="1575"/>
               <a:t>multiple derived classes inherits from a single base class.</a:t>
             </a:r>
-            <a:endParaRPr lang="en-US" sz="1575">
-              <a:latin typeface="Noto Serif CJK JP" panose="02020400000000000000" charset="-122"/>
-              <a:ea typeface="Noto Serif CJK JP" panose="02020400000000000000" charset="-122"/>
-            </a:endParaRPr>
+            <a:endParaRPr lang="en-US" sz="1575"/>
           </a:p>
           <a:p>
             <a:pPr>
@@ -5774,16 +5513,10 @@
               </a:lnSpc>
             </a:pPr>
             <a:r>
-              <a:rPr lang="en-US" sz="1800">
-                <a:latin typeface="Noto Serif CJK JP" panose="02020400000000000000" charset="-122"/>
-                <a:ea typeface="Noto Serif CJK JP" panose="02020400000000000000" charset="-122"/>
-              </a:rPr>
+              <a:rPr lang="en-US" sz="1800"/>
               <a:t>Multilevel Inheritance</a:t>
             </a:r>
-            <a:endParaRPr lang="en-US" sz="1800">
-              <a:latin typeface="Noto Serif CJK JP" panose="02020400000000000000" charset="-122"/>
-              <a:ea typeface="Noto Serif CJK JP" panose="02020400000000000000" charset="-122"/>
-            </a:endParaRPr>
+            <a:endParaRPr lang="en-US" sz="1800"/>
           </a:p>
           <a:p>
             <a:pPr lvl="1">
@@ -5792,16 +5525,10 @@
               </a:lnSpc>
             </a:pPr>
             <a:r>
-              <a:rPr lang="en-US" sz="1575">
-                <a:latin typeface="Noto Serif CJK JP" panose="02020400000000000000" charset="-122"/>
-                <a:ea typeface="Noto Serif CJK JP" panose="02020400000000000000" charset="-122"/>
-              </a:rPr>
+              <a:rPr lang="en-US" sz="1575"/>
               <a:t>derived class inherits from a class, which in turn inherits from some other class. The Super class for one, is sub class for the other.</a:t>
             </a:r>
-            <a:endParaRPr lang="en-US" sz="1575">
-              <a:latin typeface="Noto Serif CJK JP" panose="02020400000000000000" charset="-122"/>
-              <a:ea typeface="Noto Serif CJK JP" panose="02020400000000000000" charset="-122"/>
-            </a:endParaRPr>
+            <a:endParaRPr lang="en-US" sz="1575"/>
           </a:p>
           <a:p>
             <a:pPr>
@@ -5810,16 +5537,10 @@
               </a:lnSpc>
             </a:pPr>
             <a:r>
-              <a:rPr lang="en-US" sz="1800">
-                <a:latin typeface="Noto Serif CJK JP" panose="02020400000000000000" charset="-122"/>
-                <a:ea typeface="Noto Serif CJK JP" panose="02020400000000000000" charset="-122"/>
-              </a:rPr>
+              <a:rPr lang="en-US" sz="1800"/>
               <a:t>Hybrid Inheritance (also known as Virtual Inheritance)</a:t>
             </a:r>
-            <a:endParaRPr lang="en-US" sz="1800">
-              <a:latin typeface="Noto Serif CJK JP" panose="02020400000000000000" charset="-122"/>
-              <a:ea typeface="Noto Serif CJK JP" panose="02020400000000000000" charset="-122"/>
-            </a:endParaRPr>
+            <a:endParaRPr lang="en-US" sz="1800"/>
           </a:p>
           <a:p>
             <a:pPr lvl="1">
@@ -5828,16 +5549,10 @@
               </a:lnSpc>
             </a:pPr>
             <a:r>
-              <a:rPr lang="en-US" sz="1575">
-                <a:latin typeface="Noto Serif CJK JP" panose="02020400000000000000" charset="-122"/>
-                <a:ea typeface="Noto Serif CJK JP" panose="02020400000000000000" charset="-122"/>
-              </a:rPr>
+              <a:rPr lang="en-US" sz="1575"/>
               <a:t>combination of Hierarchical and Mutilevel Inheritance.</a:t>
             </a:r>
-            <a:endParaRPr lang="en-US" sz="1575">
-              <a:latin typeface="Noto Serif CJK JP" panose="02020400000000000000" charset="-122"/>
-              <a:ea typeface="Noto Serif CJK JP" panose="02020400000000000000" charset="-122"/>
-            </a:endParaRPr>
+            <a:endParaRPr lang="en-US" sz="1575"/>
           </a:p>
         </p:txBody>
       </p:sp>
@@ -5880,15 +5595,11 @@
           <a:p>
             <a:r>
               <a:rPr lang="en-US" altLang="en-US" sz="3200">
-                <a:latin typeface="Noto Serif CJK JP" panose="02020400000000000000" charset="-122"/>
-                <a:ea typeface="Noto Serif CJK JP" panose="02020400000000000000" charset="-122"/>
                 <a:sym typeface="+mn-ea"/>
               </a:rPr>
               <a:t>Types of Inheritance </a:t>
             </a:r>
             <a:endParaRPr lang="en-US" altLang="en-US" sz="3200">
-              <a:latin typeface="Noto Serif CJK JP" panose="02020400000000000000" charset="-122"/>
-              <a:ea typeface="Noto Serif CJK JP" panose="02020400000000000000" charset="-122"/>
               <a:sym typeface="+mn-ea"/>
             </a:endParaRPr>
           </a:p>
@@ -6048,15 +5759,15 @@
           <a:p>
             <a:pPr algn="ctr"/>
             <a:r>
-              <a:rPr lang="" altLang="en-US">
-                <a:latin typeface="Noto Serif CJK JP" panose="02020400000000000000" charset="-122"/>
-                <a:ea typeface="Noto Serif CJK JP" panose="02020400000000000000" charset="-122"/>
+              <a:rPr lang="en-US" altLang="en-US">
+                <a:latin typeface="Noto Sans CJK JP Regular" panose="020B0500000000000000" charset="-122"/>
+                <a:ea typeface="Noto Sans CJK JP Regular" panose="020B0500000000000000" charset="-122"/>
               </a:rPr>
               <a:t>Single</a:t>
             </a:r>
-            <a:endParaRPr lang="" altLang="en-US">
-              <a:latin typeface="Noto Serif CJK JP" panose="02020400000000000000" charset="-122"/>
-              <a:ea typeface="Noto Serif CJK JP" panose="02020400000000000000" charset="-122"/>
+            <a:endParaRPr lang="en-US" altLang="en-US">
+              <a:latin typeface="Noto Sans CJK JP Regular" panose="020B0500000000000000" charset="-122"/>
+              <a:ea typeface="Noto Sans CJK JP Regular" panose="020B0500000000000000" charset="-122"/>
             </a:endParaRPr>
           </a:p>
         </p:txBody>
@@ -6091,15 +5802,15 @@
           <a:p>
             <a:pPr algn="ctr"/>
             <a:r>
-              <a:rPr lang="" altLang="en-US">
-                <a:latin typeface="Noto Serif CJK JP" panose="02020400000000000000" charset="-122"/>
-                <a:ea typeface="Noto Serif CJK JP" panose="02020400000000000000" charset="-122"/>
+              <a:rPr lang="en-US" altLang="en-US">
+                <a:latin typeface="Noto Sans CJK JP Regular" panose="020B0500000000000000" charset="-122"/>
+                <a:ea typeface="Noto Sans CJK JP Regular" panose="020B0500000000000000" charset="-122"/>
               </a:rPr>
               <a:t>Multiple</a:t>
             </a:r>
-            <a:endParaRPr lang="" altLang="en-US">
-              <a:latin typeface="Noto Serif CJK JP" panose="02020400000000000000" charset="-122"/>
-              <a:ea typeface="Noto Serif CJK JP" panose="02020400000000000000" charset="-122"/>
+            <a:endParaRPr lang="en-US" altLang="en-US">
+              <a:latin typeface="Noto Sans CJK JP Regular" panose="020B0500000000000000" charset="-122"/>
+              <a:ea typeface="Noto Sans CJK JP Regular" panose="020B0500000000000000" charset="-122"/>
             </a:endParaRPr>
           </a:p>
         </p:txBody>
@@ -6134,15 +5845,15 @@
           <a:p>
             <a:pPr algn="ctr"/>
             <a:r>
-              <a:rPr lang="" altLang="en-US">
-                <a:latin typeface="Noto Serif CJK JP" panose="02020400000000000000" charset="-122"/>
-                <a:ea typeface="Noto Serif CJK JP" panose="02020400000000000000" charset="-122"/>
+              <a:rPr lang="en-US" altLang="en-US">
+                <a:latin typeface="Noto Sans CJK JP Regular" panose="020B0500000000000000" charset="-122"/>
+                <a:ea typeface="Noto Sans CJK JP Regular" panose="020B0500000000000000" charset="-122"/>
               </a:rPr>
               <a:t>Multilevel</a:t>
             </a:r>
-            <a:endParaRPr lang="" altLang="en-US">
-              <a:latin typeface="Noto Serif CJK JP" panose="02020400000000000000" charset="-122"/>
-              <a:ea typeface="Noto Serif CJK JP" panose="02020400000000000000" charset="-122"/>
+            <a:endParaRPr lang="en-US" altLang="en-US">
+              <a:latin typeface="Noto Sans CJK JP Regular" panose="020B0500000000000000" charset="-122"/>
+              <a:ea typeface="Noto Sans CJK JP Regular" panose="020B0500000000000000" charset="-122"/>
             </a:endParaRPr>
           </a:p>
         </p:txBody>
@@ -6178,15 +5889,15 @@
             <a:pPr algn="ctr"/>
             <a:r>
               <a:rPr lang="en-US">
-                <a:latin typeface="Noto Serif CJK JP" panose="02020400000000000000" charset="-122"/>
-                <a:ea typeface="Noto Serif CJK JP" panose="02020400000000000000" charset="-122"/>
+                <a:latin typeface="Noto Sans CJK JP Regular" panose="020B0500000000000000" charset="-122"/>
+                <a:ea typeface="Noto Sans CJK JP Regular" panose="020B0500000000000000" charset="-122"/>
                 <a:sym typeface="+mn-ea"/>
               </a:rPr>
               <a:t>Hierarchical </a:t>
             </a:r>
             <a:endParaRPr lang="en-US">
-              <a:latin typeface="Noto Serif CJK JP" panose="02020400000000000000" charset="-122"/>
-              <a:ea typeface="Noto Serif CJK JP" panose="02020400000000000000" charset="-122"/>
+              <a:latin typeface="Noto Sans CJK JP Regular" panose="020B0500000000000000" charset="-122"/>
+              <a:ea typeface="Noto Sans CJK JP Regular" panose="020B0500000000000000" charset="-122"/>
             </a:endParaRPr>
           </a:p>
         </p:txBody>
@@ -6222,15 +5933,15 @@
             <a:pPr algn="ctr"/>
             <a:r>
               <a:rPr lang="en-US">
-                <a:latin typeface="Noto Serif CJK JP" panose="02020400000000000000" charset="-122"/>
-                <a:ea typeface="Noto Serif CJK JP" panose="02020400000000000000" charset="-122"/>
+                <a:latin typeface="Noto Sans CJK JP Regular" panose="020B0500000000000000" charset="-122"/>
+                <a:ea typeface="Noto Sans CJK JP Regular" panose="020B0500000000000000" charset="-122"/>
                 <a:sym typeface="+mn-ea"/>
               </a:rPr>
               <a:t>Hybrid </a:t>
             </a:r>
             <a:endParaRPr lang="en-US">
-              <a:latin typeface="Noto Serif CJK JP" panose="02020400000000000000" charset="-122"/>
-              <a:ea typeface="Noto Serif CJK JP" panose="02020400000000000000" charset="-122"/>
+              <a:latin typeface="Noto Sans CJK JP Regular" panose="020B0500000000000000" charset="-122"/>
+              <a:ea typeface="Noto Sans CJK JP Regular" panose="020B0500000000000000" charset="-122"/>
             </a:endParaRPr>
           </a:p>
         </p:txBody>
@@ -6273,16 +5984,10 @@
           <a:bodyPr/>
           <a:p>
             <a:r>
-              <a:rPr lang="en-US" altLang="en-US" sz="3200">
-                <a:latin typeface="Noto Serif CJK JP" panose="02020400000000000000" charset="-122"/>
-                <a:ea typeface="Noto Serif CJK JP" panose="02020400000000000000" charset="-122"/>
-              </a:rPr>
+              <a:rPr lang="en-US" altLang="en-US" sz="3200"/>
               <a:t>Intro</a:t>
             </a:r>
-            <a:endParaRPr lang="en-US" altLang="en-US" sz="3200">
-              <a:latin typeface="Noto Serif CJK JP" panose="02020400000000000000" charset="-122"/>
-              <a:ea typeface="Noto Serif CJK JP" panose="02020400000000000000" charset="-122"/>
-            </a:endParaRPr>
+            <a:endParaRPr lang="en-US" altLang="en-US" sz="3200"/>
           </a:p>
         </p:txBody>
       </p:sp>
@@ -6312,15 +6017,11 @@
             </a:pPr>
             <a:r>
               <a:rPr lang="en-US" altLang="en-US" sz="2000">
-                <a:latin typeface="Noto Serif CJK JP" panose="02020400000000000000" charset="-122"/>
-                <a:ea typeface="Noto Serif CJK JP" panose="02020400000000000000" charset="-122"/>
                 <a:sym typeface="+mn-ea"/>
               </a:rPr>
               <a:t>Programming : giving instructions</a:t>
             </a:r>
             <a:endParaRPr lang="en-US" altLang="en-US" sz="2000">
-              <a:latin typeface="Noto Serif CJK JP" panose="02020400000000000000" charset="-122"/>
-              <a:ea typeface="Noto Serif CJK JP" panose="02020400000000000000" charset="-122"/>
               <a:sym typeface="+mn-ea"/>
             </a:endParaRPr>
           </a:p>
@@ -6332,15 +6033,11 @@
             </a:pPr>
             <a:r>
               <a:rPr lang="en-US" altLang="en-US" sz="2000">
-                <a:latin typeface="Noto Serif CJK JP" panose="02020400000000000000" charset="-122"/>
-                <a:ea typeface="Noto Serif CJK JP" panose="02020400000000000000" charset="-122"/>
                 <a:sym typeface="+mn-ea"/>
               </a:rPr>
               <a:t>Programming Paradigm : Way of Thinking</a:t>
             </a:r>
             <a:endParaRPr lang="en-US" altLang="en-US" sz="2000">
-              <a:latin typeface="Noto Serif CJK JP" panose="02020400000000000000" charset="-122"/>
-              <a:ea typeface="Noto Serif CJK JP" panose="02020400000000000000" charset="-122"/>
               <a:sym typeface="+mn-ea"/>
             </a:endParaRPr>
           </a:p>
@@ -6351,16 +6048,10 @@
               </a:lnSpc>
             </a:pPr>
             <a:r>
-              <a:rPr lang="en-US" altLang="en-US" sz="2000">
-                <a:latin typeface="Noto Serif CJK JP" panose="02020400000000000000" charset="-122"/>
-                <a:ea typeface="Noto Serif CJK JP" panose="02020400000000000000" charset="-122"/>
-              </a:rPr>
+              <a:rPr lang="en-US" altLang="en-US" sz="2000"/>
               <a:t>C++ :  Programming Language that supports procedural and object-oriented. </a:t>
             </a:r>
-            <a:endParaRPr lang="en-US" altLang="en-US" sz="2000">
-              <a:latin typeface="Noto Serif CJK JP" panose="02020400000000000000" charset="-122"/>
-              <a:ea typeface="Noto Serif CJK JP" panose="02020400000000000000" charset="-122"/>
-            </a:endParaRPr>
+            <a:endParaRPr lang="en-US" altLang="en-US" sz="2000"/>
           </a:p>
           <a:p>
             <a:pPr>
@@ -6369,32 +6060,22 @@
               </a:lnSpc>
             </a:pPr>
             <a:r>
+              <a:rPr lang="en-US" altLang="en-US" sz="2000"/>
+              <a:t>Data Structures : </a:t>
+            </a:r>
+            <a:r>
               <a:rPr lang="en-US" altLang="en-US" sz="2000">
-                <a:latin typeface="Noto Serif CJK JP" panose="02020400000000000000" charset="-122"/>
-                <a:ea typeface="Noto Serif CJK JP" panose="02020400000000000000" charset="-122"/>
-              </a:rPr>
-              <a:t>Data Structures : </a:t>
-            </a:r>
-            <a:r>
-              <a:rPr lang="en-US" altLang="en-US" sz="2000">
-                <a:latin typeface="Noto Serif CJK JP" panose="02020400000000000000" charset="-122"/>
-                <a:ea typeface="Noto Serif CJK JP" panose="02020400000000000000" charset="-122"/>
                 <a:sym typeface="+mn-ea"/>
               </a:rPr>
               <a:t>W</a:t>
             </a:r>
             <a:r>
               <a:rPr lang="en-US" sz="2000">
-                <a:latin typeface="Noto Serif CJK JP" panose="02020400000000000000" charset="-122"/>
-                <a:ea typeface="Noto Serif CJK JP" panose="02020400000000000000" charset="-122"/>
                 <a:sym typeface="+mn-ea"/>
               </a:rPr>
               <a:t>ay of organizing data</a:t>
             </a:r>
-            <a:endParaRPr lang="en-US" sz="2000">
-              <a:latin typeface="Noto Serif CJK JP" panose="02020400000000000000" charset="-122"/>
-              <a:ea typeface="Noto Serif CJK JP" panose="02020400000000000000" charset="-122"/>
-            </a:endParaRPr>
+            <a:endParaRPr lang="en-US" sz="2000"/>
           </a:p>
           <a:p>
             <a:pPr>
@@ -6402,10 +6083,7 @@
                 <a:spcPct val="120000"/>
               </a:lnSpc>
             </a:pPr>
-            <a:endParaRPr lang="en-US" altLang="en-US" sz="2000">
-              <a:latin typeface="Noto Serif CJK JP" panose="02020400000000000000" charset="-122"/>
-              <a:ea typeface="Noto Serif CJK JP" panose="02020400000000000000" charset="-122"/>
-            </a:endParaRPr>
+            <a:endParaRPr lang="en-US" altLang="en-US" sz="2000"/>
           </a:p>
           <a:p>
             <a:pPr>
@@ -6414,8 +6092,6 @@
               </a:lnSpc>
             </a:pPr>
             <a:endParaRPr lang="en-US" altLang="en-US" sz="2000">
-              <a:latin typeface="Noto Serif CJK JP" panose="02020400000000000000" charset="-122"/>
-              <a:ea typeface="Noto Serif CJK JP" panose="02020400000000000000" charset="-122"/>
               <a:sym typeface="+mn-ea"/>
             </a:endParaRPr>
           </a:p>
@@ -6425,10 +6101,7 @@
                 <a:spcPct val="120000"/>
               </a:lnSpc>
             </a:pPr>
-            <a:endParaRPr lang="en-US" sz="2000">
-              <a:latin typeface="Noto Serif CJK JP" panose="02020400000000000000" charset="-122"/>
-              <a:ea typeface="Noto Serif CJK JP" panose="02020400000000000000" charset="-122"/>
-            </a:endParaRPr>
+            <a:endParaRPr lang="en-US" sz="2000"/>
           </a:p>
           <a:p>
             <a:pPr>
@@ -6436,10 +6109,7 @@
                 <a:spcPct val="120000"/>
               </a:lnSpc>
             </a:pPr>
-            <a:endParaRPr lang="en-US" sz="2000">
-              <a:latin typeface="Noto Serif CJK JP" panose="02020400000000000000" charset="-122"/>
-              <a:ea typeface="Noto Serif CJK JP" panose="02020400000000000000" charset="-122"/>
-            </a:endParaRPr>
+            <a:endParaRPr lang="en-US" sz="2000"/>
           </a:p>
         </p:txBody>
       </p:sp>
@@ -6481,16 +6151,10 @@
           <a:bodyPr/>
           <a:p>
             <a:r>
-              <a:rPr lang="en-US" altLang="en-US" sz="3200">
-                <a:latin typeface="Noto Serif CJK JP" panose="02020400000000000000" charset="-122"/>
-                <a:ea typeface="Noto Serif CJK JP" panose="02020400000000000000" charset="-122"/>
-              </a:rPr>
+              <a:rPr lang="en-US" altLang="en-US" sz="3200"/>
               <a:t>Topics covered</a:t>
             </a:r>
-            <a:endParaRPr lang="en-US" altLang="en-US" sz="3200">
-              <a:latin typeface="Noto Serif CJK JP" panose="02020400000000000000" charset="-122"/>
-              <a:ea typeface="Noto Serif CJK JP" panose="02020400000000000000" charset="-122"/>
-            </a:endParaRPr>
+            <a:endParaRPr lang="en-US" altLang="en-US" sz="3200"/>
           </a:p>
         </p:txBody>
       </p:sp>
@@ -6517,20 +6181,16 @@
               <a:lnSpc>
                 <a:spcPct val="150000"/>
               </a:lnSpc>
-              <a:buFont typeface="Arial" panose="02080604020202020204" pitchFamily="34" charset="0"/>
+              <a:buFont typeface="Arial" panose="020B0604020202020204" pitchFamily="34" charset="0"/>
               <a:buAutoNum type="arabicPeriod"/>
             </a:pPr>
             <a:r>
-              <a:rPr lang="" altLang="en-US" sz="1800">
-                <a:latin typeface="Noto Serif CJK JP" panose="02020400000000000000" charset="-122"/>
-                <a:ea typeface="Noto Serif CJK JP" panose="02020400000000000000" charset="-122"/>
+              <a:rPr lang="en-US" altLang="en-US" sz="1800">
                 <a:sym typeface="+mn-ea"/>
               </a:rPr>
               <a:t>Array</a:t>
             </a:r>
             <a:endParaRPr lang="en-US" altLang="en-US" sz="1800">
-              <a:latin typeface="Noto Serif CJK JP" panose="02020400000000000000" charset="-122"/>
-              <a:ea typeface="Noto Serif CJK JP" panose="02020400000000000000" charset="-122"/>
               <a:sym typeface="+mn-ea"/>
             </a:endParaRPr>
           </a:p>
@@ -6539,20 +6199,16 @@
               <a:lnSpc>
                 <a:spcPct val="150000"/>
               </a:lnSpc>
-              <a:buFont typeface="Arial" panose="02080604020202020204" pitchFamily="34" charset="0"/>
+              <a:buFont typeface="Arial" panose="020B0604020202020204" pitchFamily="34" charset="0"/>
               <a:buAutoNum type="arabicPeriod"/>
             </a:pPr>
             <a:r>
               <a:rPr lang="en-US" altLang="en-US" sz="1800">
-                <a:latin typeface="Noto Serif CJK JP" panose="02020400000000000000" charset="-122"/>
-                <a:ea typeface="Noto Serif CJK JP" panose="02020400000000000000" charset="-122"/>
                 <a:sym typeface="+mn-ea"/>
               </a:rPr>
               <a:t>String &amp; Streams</a:t>
             </a:r>
             <a:endParaRPr lang="en-US" altLang="en-US" sz="1800">
-              <a:latin typeface="Noto Serif CJK JP" panose="02020400000000000000" charset="-122"/>
-              <a:ea typeface="Noto Serif CJK JP" panose="02020400000000000000" charset="-122"/>
               <a:sym typeface="+mn-ea"/>
             </a:endParaRPr>
           </a:p>
@@ -6561,20 +6217,16 @@
               <a:lnSpc>
                 <a:spcPct val="150000"/>
               </a:lnSpc>
-              <a:buFont typeface="Arial" panose="02080604020202020204" pitchFamily="34" charset="0"/>
+              <a:buFont typeface="Arial" panose="020B0604020202020204" pitchFamily="34" charset="0"/>
               <a:buAutoNum type="arabicPeriod"/>
             </a:pPr>
             <a:r>
               <a:rPr lang="en-US" altLang="en-US" sz="1800">
-                <a:latin typeface="Noto Serif CJK JP" panose="02020400000000000000" charset="-122"/>
-                <a:ea typeface="Noto Serif CJK JP" panose="02020400000000000000" charset="-122"/>
                 <a:sym typeface="+mn-ea"/>
               </a:rPr>
               <a:t>Properties</a:t>
             </a:r>
             <a:endParaRPr lang="en-US" altLang="en-US" sz="1800">
-              <a:latin typeface="Noto Serif CJK JP" panose="02020400000000000000" charset="-122"/>
-              <a:ea typeface="Noto Serif CJK JP" panose="02020400000000000000" charset="-122"/>
               <a:sym typeface="+mn-ea"/>
             </a:endParaRPr>
           </a:p>
@@ -6583,20 +6235,16 @@
               <a:lnSpc>
                 <a:spcPct val="150000"/>
               </a:lnSpc>
-              <a:buFont typeface="Arial" panose="02080604020202020204" pitchFamily="34" charset="0"/>
+              <a:buFont typeface="Arial" panose="020B0604020202020204" pitchFamily="34" charset="0"/>
               <a:buAutoNum type="arabicPeriod"/>
             </a:pPr>
             <a:r>
               <a:rPr lang="en-US" altLang="en-US" sz="1800">
-                <a:latin typeface="Noto Serif CJK JP" panose="02020400000000000000" charset="-122"/>
-                <a:ea typeface="Noto Serif CJK JP" panose="02020400000000000000" charset="-122"/>
                 <a:sym typeface="+mn-ea"/>
               </a:rPr>
               <a:t>Access specifiers</a:t>
             </a:r>
             <a:endParaRPr lang="en-US" altLang="en-US" sz="1800">
-              <a:latin typeface="Noto Serif CJK JP" panose="02020400000000000000" charset="-122"/>
-              <a:ea typeface="Noto Serif CJK JP" panose="02020400000000000000" charset="-122"/>
               <a:sym typeface="+mn-ea"/>
             </a:endParaRPr>
           </a:p>
@@ -6605,20 +6253,16 @@
               <a:lnSpc>
                 <a:spcPct val="150000"/>
               </a:lnSpc>
-              <a:buFont typeface="Arial" panose="02080604020202020204" pitchFamily="34" charset="0"/>
+              <a:buFont typeface="Arial" panose="020B0604020202020204" pitchFamily="34" charset="0"/>
               <a:buAutoNum type="arabicPeriod"/>
             </a:pPr>
             <a:r>
               <a:rPr lang="en-US" altLang="en-US" sz="1800">
-                <a:latin typeface="Noto Serif CJK JP" panose="02020400000000000000" charset="-122"/>
-                <a:ea typeface="Noto Serif CJK JP" panose="02020400000000000000" charset="-122"/>
                 <a:sym typeface="+mn-ea"/>
               </a:rPr>
               <a:t>Constructors and Destructors</a:t>
             </a:r>
             <a:endParaRPr lang="en-US" altLang="en-US" sz="1800">
-              <a:latin typeface="Noto Serif CJK JP" panose="02020400000000000000" charset="-122"/>
-              <a:ea typeface="Noto Serif CJK JP" panose="02020400000000000000" charset="-122"/>
               <a:sym typeface="+mn-ea"/>
             </a:endParaRPr>
           </a:p>
@@ -6627,20 +6271,16 @@
               <a:lnSpc>
                 <a:spcPct val="150000"/>
               </a:lnSpc>
-              <a:buFont typeface="Arial" panose="02080604020202020204" pitchFamily="34" charset="0"/>
+              <a:buFont typeface="Arial" panose="020B0604020202020204" pitchFamily="34" charset="0"/>
               <a:buAutoNum type="arabicPeriod"/>
             </a:pPr>
             <a:r>
               <a:rPr lang="en-US" altLang="en-US" sz="1800">
-                <a:latin typeface="Noto Serif CJK JP" panose="02020400000000000000" charset="-122"/>
-                <a:ea typeface="Noto Serif CJK JP" panose="02020400000000000000" charset="-122"/>
                 <a:sym typeface="+mn-ea"/>
               </a:rPr>
               <a:t>Types of constructors &amp; destructors</a:t>
             </a:r>
             <a:endParaRPr lang="en-US" altLang="en-US" sz="1800">
-              <a:latin typeface="Noto Serif CJK JP" panose="02020400000000000000" charset="-122"/>
-              <a:ea typeface="Noto Serif CJK JP" panose="02020400000000000000" charset="-122"/>
               <a:sym typeface="+mn-ea"/>
             </a:endParaRPr>
           </a:p>
@@ -6649,20 +6289,16 @@
               <a:lnSpc>
                 <a:spcPct val="150000"/>
               </a:lnSpc>
-              <a:buFont typeface="Arial" panose="02080604020202020204" pitchFamily="34" charset="0"/>
+              <a:buFont typeface="Arial" panose="020B0604020202020204" pitchFamily="34" charset="0"/>
               <a:buAutoNum type="arabicPeriod"/>
             </a:pPr>
             <a:r>
               <a:rPr lang="en-US" altLang="en-US" sz="1800">
-                <a:latin typeface="Noto Serif CJK JP" panose="02020400000000000000" charset="-122"/>
-                <a:ea typeface="Noto Serif CJK JP" panose="02020400000000000000" charset="-122"/>
                 <a:sym typeface="+mn-ea"/>
               </a:rPr>
               <a:t>Static Member</a:t>
             </a:r>
             <a:endParaRPr lang="en-US" altLang="en-US" sz="1800">
-              <a:latin typeface="Noto Serif CJK JP" panose="02020400000000000000" charset="-122"/>
-              <a:ea typeface="Noto Serif CJK JP" panose="02020400000000000000" charset="-122"/>
               <a:sym typeface="+mn-ea"/>
             </a:endParaRPr>
           </a:p>
@@ -6671,20 +6307,16 @@
               <a:lnSpc>
                 <a:spcPct val="150000"/>
               </a:lnSpc>
-              <a:buFont typeface="Arial" panose="02080604020202020204" pitchFamily="34" charset="0"/>
+              <a:buFont typeface="Arial" panose="020B0604020202020204" pitchFamily="34" charset="0"/>
               <a:buAutoNum type="arabicPeriod"/>
             </a:pPr>
             <a:r>
               <a:rPr lang="en-US" altLang="en-US" sz="1800">
-                <a:latin typeface="Noto Serif CJK JP" panose="02020400000000000000" charset="-122"/>
-                <a:ea typeface="Noto Serif CJK JP" panose="02020400000000000000" charset="-122"/>
                 <a:sym typeface="+mn-ea"/>
               </a:rPr>
               <a:t>Inline Function</a:t>
             </a:r>
             <a:endParaRPr lang="en-US" altLang="en-US" sz="1800">
-              <a:latin typeface="Noto Serif CJK JP" panose="02020400000000000000" charset="-122"/>
-              <a:ea typeface="Noto Serif CJK JP" panose="02020400000000000000" charset="-122"/>
               <a:sym typeface="+mn-ea"/>
             </a:endParaRPr>
           </a:p>
@@ -6693,20 +6325,16 @@
               <a:lnSpc>
                 <a:spcPct val="150000"/>
               </a:lnSpc>
-              <a:buFont typeface="Arial" panose="02080604020202020204" pitchFamily="34" charset="0"/>
+              <a:buFont typeface="Arial" panose="020B0604020202020204" pitchFamily="34" charset="0"/>
               <a:buAutoNum type="arabicPeriod"/>
             </a:pPr>
             <a:r>
               <a:rPr lang="en-US" altLang="en-US" sz="1800">
-                <a:latin typeface="Noto Serif CJK JP" panose="02020400000000000000" charset="-122"/>
-                <a:ea typeface="Noto Serif CJK JP" panose="02020400000000000000" charset="-122"/>
                 <a:sym typeface="+mn-ea"/>
               </a:rPr>
               <a:t>Inheritance</a:t>
             </a:r>
             <a:endParaRPr lang="en-US" altLang="en-US" sz="1800">
-              <a:latin typeface="Noto Serif CJK JP" panose="02020400000000000000" charset="-122"/>
-              <a:ea typeface="Noto Serif CJK JP" panose="02020400000000000000" charset="-122"/>
               <a:sym typeface="+mn-ea"/>
             </a:endParaRPr>
           </a:p>
@@ -6715,20 +6343,16 @@
               <a:lnSpc>
                 <a:spcPct val="150000"/>
               </a:lnSpc>
-              <a:buFont typeface="Arial" panose="02080604020202020204" pitchFamily="34" charset="0"/>
+              <a:buFont typeface="Arial" panose="020B0604020202020204" pitchFamily="34" charset="0"/>
               <a:buAutoNum type="arabicPeriod"/>
             </a:pPr>
             <a:r>
               <a:rPr lang="en-US" altLang="en-US" sz="1800">
-                <a:latin typeface="Noto Serif CJK JP" panose="02020400000000000000" charset="-122"/>
-                <a:ea typeface="Noto Serif CJK JP" panose="02020400000000000000" charset="-122"/>
                 <a:sym typeface="+mn-ea"/>
               </a:rPr>
               <a:t>Types of inheritance </a:t>
             </a:r>
             <a:endParaRPr lang="en-US" altLang="en-US" sz="1800">
-              <a:latin typeface="Noto Serif CJK JP" panose="02020400000000000000" charset="-122"/>
-              <a:ea typeface="Noto Serif CJK JP" panose="02020400000000000000" charset="-122"/>
               <a:sym typeface="+mn-ea"/>
             </a:endParaRPr>
           </a:p>
@@ -6772,16 +6396,10 @@
           <a:bodyPr/>
           <a:p>
             <a:r>
-              <a:rPr lang="en-US" altLang="en-US" sz="2800">
-                <a:latin typeface="Noto Serif CJK JP" panose="02020400000000000000" charset="-122"/>
-                <a:ea typeface="Noto Serif CJK JP" panose="02020400000000000000" charset="-122"/>
-              </a:rPr>
+              <a:rPr lang="en-US" altLang="en-US" sz="2800"/>
               <a:t>Array</a:t>
             </a:r>
-            <a:endParaRPr lang="en-US" altLang="en-US" sz="2800">
-              <a:latin typeface="Noto Serif CJK JP" panose="02020400000000000000" charset="-122"/>
-              <a:ea typeface="Noto Serif CJK JP" panose="02020400000000000000" charset="-122"/>
-            </a:endParaRPr>
+            <a:endParaRPr lang="en-US" altLang="en-US" sz="2800"/>
           </a:p>
         </p:txBody>
       </p:sp>
@@ -6805,287 +6423,140 @@
           <a:bodyPr/>
           <a:p>
             <a:r>
+              <a:rPr lang="en-US" altLang="en-US" sz="1800"/>
+              <a:t>L</a:t>
+            </a:r>
+            <a:r>
+              <a:rPr lang="en-US" sz="1800"/>
+              <a:t>inear data structure</a:t>
+            </a:r>
+            <a:endParaRPr lang="en-US" sz="1800"/>
+          </a:p>
+          <a:p>
+            <a:r>
+              <a:rPr lang="en-US" altLang="en-US" sz="1800"/>
+              <a:t>E</a:t>
+            </a:r>
+            <a:r>
+              <a:rPr lang="en-US" sz="1800"/>
+              <a:t>lements are stored at contiguous memory locations.</a:t>
+            </a:r>
+            <a:endParaRPr lang="en-US" altLang="en-US" sz="1800"/>
+          </a:p>
+          <a:p>
+            <a:r>
+              <a:rPr lang="en-US" altLang="en-US" sz="1800"/>
+              <a:t>Store multiple items of the same type together</a:t>
+            </a:r>
+            <a:endParaRPr lang="en-US" altLang="en-US" sz="1800"/>
+          </a:p>
+          <a:p>
+            <a:endParaRPr lang="en-US" altLang="en-US" sz="1800"/>
+          </a:p>
+          <a:p>
+            <a:endParaRPr lang="en-US" altLang="en-US" sz="1800"/>
+          </a:p>
+          <a:p>
+            <a:endParaRPr lang="en-US" altLang="en-US" sz="1800"/>
+          </a:p>
+          <a:p>
+            <a:endParaRPr lang="en-US" altLang="en-US" sz="1800"/>
+          </a:p>
+          <a:p>
+            <a:endParaRPr lang="en-US" altLang="en-US" sz="1800"/>
+          </a:p>
+          <a:p>
+            <a:r>
+              <a:rPr lang="en-US" altLang="en-US" sz="1800"/>
+              <a:t>Implementation :</a:t>
+            </a:r>
+            <a:endParaRPr lang="en-US" altLang="en-US" sz="1800"/>
+          </a:p>
+          <a:p>
+            <a:pPr marL="0" indent="0">
+              <a:buNone/>
+            </a:pPr>
+            <a:r>
+              <a:rPr lang="en-US" altLang="en-US" sz="1800"/>
+              <a:t> 	int a[3 ];</a:t>
+            </a:r>
+            <a:endParaRPr lang="en-US" altLang="en-US" sz="1800"/>
+          </a:p>
+          <a:p>
+            <a:pPr marL="0" indent="0">
+              <a:buNone/>
+            </a:pPr>
+            <a:r>
+              <a:rPr lang="en-US" altLang="en-US" sz="1800"/>
+              <a:t>	a[0] = 2; 		cout&lt;&lt;”Value is”&lt;&lt;a[0];  // </a:t>
+            </a:r>
+            <a:r>
               <a:rPr lang="en-US" altLang="en-US" sz="1800">
-                <a:latin typeface="Noto Serif CJK JP" panose="02020400000000000000" charset="-122"/>
-                <a:ea typeface="Noto Serif CJK JP" panose="02020400000000000000" charset="-122"/>
-              </a:rPr>
-              <a:t>L</a:t>
-            </a:r>
-            <a:r>
-              <a:rPr lang="en-US" sz="1800">
-                <a:latin typeface="Noto Serif CJK JP" panose="02020400000000000000" charset="-122"/>
-                <a:ea typeface="Noto Serif CJK JP" panose="02020400000000000000" charset="-122"/>
-              </a:rPr>
-              <a:t>inear data structure</a:t>
-            </a:r>
-            <a:endParaRPr lang="en-US" sz="1800">
-              <a:latin typeface="Noto Serif CJK JP" panose="02020400000000000000" charset="-122"/>
-              <a:ea typeface="Noto Serif CJK JP" panose="02020400000000000000" charset="-122"/>
-            </a:endParaRPr>
-          </a:p>
-          <a:p>
-            <a:r>
-              <a:rPr lang="en-US" altLang="en-US" sz="1800">
-                <a:latin typeface="Noto Serif CJK JP" panose="02020400000000000000" charset="-122"/>
-                <a:ea typeface="Noto Serif CJK JP" panose="02020400000000000000" charset="-122"/>
-              </a:rPr>
-              <a:t>E</a:t>
-            </a:r>
-            <a:r>
-              <a:rPr lang="en-US" sz="1800">
-                <a:latin typeface="Noto Serif CJK JP" panose="02020400000000000000" charset="-122"/>
-                <a:ea typeface="Noto Serif CJK JP" panose="02020400000000000000" charset="-122"/>
-              </a:rPr>
-              <a:t>lements are stored at contiguous memory locations.</a:t>
-            </a:r>
-            <a:endParaRPr lang="en-US" altLang="en-US" sz="1800">
-              <a:latin typeface="Noto Serif CJK JP" panose="02020400000000000000" charset="-122"/>
-              <a:ea typeface="Noto Serif CJK JP" panose="02020400000000000000" charset="-122"/>
-            </a:endParaRPr>
-          </a:p>
-          <a:p>
-            <a:r>
-              <a:rPr lang="en-US" altLang="en-US" sz="1800">
-                <a:latin typeface="Noto Serif CJK JP" panose="02020400000000000000" charset="-122"/>
-                <a:ea typeface="Noto Serif CJK JP" panose="02020400000000000000" charset="-122"/>
-              </a:rPr>
-              <a:t>Store multiple items of the same type together</a:t>
-            </a:r>
-            <a:endParaRPr lang="en-US" altLang="en-US" sz="1800">
-              <a:latin typeface="Noto Serif CJK JP" panose="02020400000000000000" charset="-122"/>
-              <a:ea typeface="Noto Serif CJK JP" panose="02020400000000000000" charset="-122"/>
-            </a:endParaRPr>
-          </a:p>
-          <a:p>
-            <a:endParaRPr lang="en-US" altLang="en-US" sz="1800">
-              <a:latin typeface="Noto Serif CJK JP" panose="02020400000000000000" charset="-122"/>
-              <a:ea typeface="Noto Serif CJK JP" panose="02020400000000000000" charset="-122"/>
-            </a:endParaRPr>
-          </a:p>
-          <a:p>
-            <a:endParaRPr lang="en-US" altLang="en-US" sz="1800">
-              <a:latin typeface="Noto Serif CJK JP" panose="02020400000000000000" charset="-122"/>
-              <a:ea typeface="Noto Serif CJK JP" panose="02020400000000000000" charset="-122"/>
-            </a:endParaRPr>
-          </a:p>
-          <a:p>
-            <a:endParaRPr lang="en-US" altLang="en-US" sz="1800">
-              <a:latin typeface="Noto Serif CJK JP" panose="02020400000000000000" charset="-122"/>
-              <a:ea typeface="Noto Serif CJK JP" panose="02020400000000000000" charset="-122"/>
-            </a:endParaRPr>
-          </a:p>
-          <a:p>
-            <a:endParaRPr lang="en-US" altLang="en-US" sz="1800">
-              <a:latin typeface="Noto Serif CJK JP" panose="02020400000000000000" charset="-122"/>
-              <a:ea typeface="Noto Serif CJK JP" panose="02020400000000000000" charset="-122"/>
-            </a:endParaRPr>
-          </a:p>
-          <a:p>
-            <a:endParaRPr lang="en-US" altLang="en-US" sz="1800">
-              <a:latin typeface="Noto Serif CJK JP" panose="02020400000000000000" charset="-122"/>
-              <a:ea typeface="Noto Serif CJK JP" panose="02020400000000000000" charset="-122"/>
-            </a:endParaRPr>
-          </a:p>
-          <a:p>
-            <a:r>
-              <a:rPr lang="" altLang="en-US" sz="1800">
-                <a:latin typeface="Noto Serif CJK JP" panose="02020400000000000000" charset="-122"/>
-                <a:ea typeface="Noto Serif CJK JP" panose="02020400000000000000" charset="-122"/>
-              </a:rPr>
-              <a:t>Implementation :</a:t>
-            </a:r>
-            <a:endParaRPr lang="" altLang="en-US" sz="1800">
-              <a:latin typeface="Noto Serif CJK JP" panose="02020400000000000000" charset="-122"/>
-              <a:ea typeface="Noto Serif CJK JP" panose="02020400000000000000" charset="-122"/>
-            </a:endParaRPr>
-          </a:p>
-          <a:p>
-            <a:pPr marL="0" indent="0">
-              <a:buNone/>
-            </a:pPr>
-            <a:r>
-              <a:rPr lang="" altLang="en-US" sz="1800">
-                <a:latin typeface="Noto Serif CJK JP" panose="02020400000000000000" charset="-122"/>
-                <a:ea typeface="Noto Serif CJK JP" panose="02020400000000000000" charset="-122"/>
-              </a:rPr>
-              <a:t> 	int a[3 ];</a:t>
-            </a:r>
-            <a:endParaRPr lang="" altLang="en-US" sz="1800">
-              <a:latin typeface="Noto Serif CJK JP" panose="02020400000000000000" charset="-122"/>
-              <a:ea typeface="Noto Serif CJK JP" panose="02020400000000000000" charset="-122"/>
-            </a:endParaRPr>
-          </a:p>
-          <a:p>
-            <a:pPr marL="0" indent="0">
-              <a:buNone/>
-            </a:pPr>
-            <a:r>
-              <a:rPr lang="" altLang="en-US" sz="1800">
-                <a:latin typeface="Noto Serif CJK JP" panose="02020400000000000000" charset="-122"/>
-                <a:ea typeface="Noto Serif CJK JP" panose="02020400000000000000" charset="-122"/>
-              </a:rPr>
-              <a:t>	a[0] = 2; 		cout&lt;&lt;”Value is”&lt;&lt;a[0];  // </a:t>
-            </a:r>
-            <a:r>
-              <a:rPr lang="en-US" altLang="en-US" sz="1800">
-                <a:latin typeface="Noto Serif CJK JP" panose="02020400000000000000" charset="-122"/>
-                <a:ea typeface="Noto Serif CJK JP" panose="02020400000000000000" charset="-122"/>
                 <a:sym typeface="+mn-ea"/>
               </a:rPr>
               <a:t>Value is </a:t>
             </a:r>
             <a:r>
-              <a:rPr lang="" altLang="en-US" sz="1800">
-                <a:latin typeface="Noto Serif CJK JP" panose="02020400000000000000" charset="-122"/>
-                <a:ea typeface="Noto Serif CJK JP" panose="02020400000000000000" charset="-122"/>
-              </a:rPr>
+              <a:rPr lang="en-US" altLang="en-US" sz="1800"/>
               <a:t>2</a:t>
             </a:r>
-            <a:endParaRPr lang="" altLang="en-US" sz="1800">
-              <a:latin typeface="Noto Serif CJK JP" panose="02020400000000000000" charset="-122"/>
-              <a:ea typeface="Noto Serif CJK JP" panose="02020400000000000000" charset="-122"/>
-            </a:endParaRPr>
+            <a:endParaRPr lang="en-US" altLang="en-US" sz="1800"/>
           </a:p>
           <a:p>
             <a:pPr marL="0" indent="0">
               <a:buNone/>
             </a:pPr>
             <a:r>
-              <a:rPr lang="" altLang="en-US" sz="1800">
-                <a:latin typeface="Noto Serif CJK JP" panose="02020400000000000000" charset="-122"/>
-                <a:ea typeface="Noto Serif CJK JP" panose="02020400000000000000" charset="-122"/>
-              </a:rPr>
+              <a:rPr lang="en-US" altLang="en-US" sz="1800"/>
               <a:t>	a[1] = 5 ;		</a:t>
             </a:r>
             <a:r>
               <a:rPr lang="en-US" altLang="en-US" sz="1800">
-                <a:latin typeface="Noto Serif CJK JP" panose="02020400000000000000" charset="-122"/>
-                <a:ea typeface="Noto Serif CJK JP" panose="02020400000000000000" charset="-122"/>
                 <a:sym typeface="+mn-ea"/>
               </a:rPr>
-              <a:t>cout&lt;&lt;”Value is”&lt;&lt;a[</a:t>
-            </a:r>
-            <a:r>
-              <a:rPr lang="" altLang="en-US" sz="1800">
-                <a:latin typeface="Noto Serif CJK JP" panose="02020400000000000000" charset="-122"/>
-                <a:ea typeface="Noto Serif CJK JP" panose="02020400000000000000" charset="-122"/>
+              <a:t>cout&lt;&lt;”Value is”&lt;&lt;a[1];  // Value is 5</a:t>
+            </a:r>
+            <a:endParaRPr lang="en-US" altLang="en-US" sz="1800"/>
+          </a:p>
+          <a:p>
+            <a:pPr marL="0" indent="0">
+              <a:buNone/>
+            </a:pPr>
+            <a:r>
+              <a:rPr lang="en-US" altLang="en-US" sz="1800"/>
+              <a:t>	a[2] = 6;		</a:t>
+            </a:r>
+            <a:r>
+              <a:rPr lang="en-US" altLang="en-US" sz="1800">
                 <a:sym typeface="+mn-ea"/>
               </a:rPr>
-              <a:t>1</a:t>
-            </a:r>
-            <a:r>
-              <a:rPr lang="en-US" altLang="en-US" sz="1800">
-                <a:latin typeface="Noto Serif CJK JP" panose="02020400000000000000" charset="-122"/>
-                <a:ea typeface="Noto Serif CJK JP" panose="02020400000000000000" charset="-122"/>
-                <a:sym typeface="+mn-ea"/>
-              </a:rPr>
-              <a:t>];  // Value is </a:t>
-            </a:r>
-            <a:r>
-              <a:rPr lang="" altLang="en-US" sz="1800">
-                <a:latin typeface="Noto Serif CJK JP" panose="02020400000000000000" charset="-122"/>
-                <a:ea typeface="Noto Serif CJK JP" panose="02020400000000000000" charset="-122"/>
-                <a:sym typeface="+mn-ea"/>
-              </a:rPr>
-              <a:t>5</a:t>
-            </a:r>
-            <a:endParaRPr lang="" altLang="en-US" sz="1800">
-              <a:latin typeface="Noto Serif CJK JP" panose="02020400000000000000" charset="-122"/>
-              <a:ea typeface="Noto Serif CJK JP" panose="02020400000000000000" charset="-122"/>
-            </a:endParaRPr>
+              <a:t>cout&lt;&lt;”Value is”&lt;&lt;a[2];  // Value is 6</a:t>
+            </a:r>
+            <a:endParaRPr lang="en-US" altLang="en-US" sz="1800"/>
           </a:p>
           <a:p>
             <a:pPr marL="0" indent="0">
               <a:buNone/>
             </a:pPr>
-            <a:r>
-              <a:rPr lang="" altLang="en-US" sz="1800">
-                <a:latin typeface="Noto Serif CJK JP" panose="02020400000000000000" charset="-122"/>
-                <a:ea typeface="Noto Serif CJK JP" panose="02020400000000000000" charset="-122"/>
-              </a:rPr>
-              <a:t>	a[2] = 6;		</a:t>
-            </a:r>
-            <a:r>
-              <a:rPr lang="en-US" altLang="en-US" sz="1800">
-                <a:latin typeface="Noto Serif CJK JP" panose="02020400000000000000" charset="-122"/>
-                <a:ea typeface="Noto Serif CJK JP" panose="02020400000000000000" charset="-122"/>
-                <a:sym typeface="+mn-ea"/>
-              </a:rPr>
-              <a:t>cout&lt;&lt;”Value is”&lt;&lt;a[</a:t>
-            </a:r>
-            <a:r>
-              <a:rPr lang="" altLang="en-US" sz="1800">
-                <a:latin typeface="Noto Serif CJK JP" panose="02020400000000000000" charset="-122"/>
-                <a:ea typeface="Noto Serif CJK JP" panose="02020400000000000000" charset="-122"/>
-                <a:sym typeface="+mn-ea"/>
-              </a:rPr>
-              <a:t>2</a:t>
-            </a:r>
-            <a:r>
-              <a:rPr lang="en-US" altLang="en-US" sz="1800">
-                <a:latin typeface="Noto Serif CJK JP" panose="02020400000000000000" charset="-122"/>
-                <a:ea typeface="Noto Serif CJK JP" panose="02020400000000000000" charset="-122"/>
-                <a:sym typeface="+mn-ea"/>
-              </a:rPr>
-              <a:t>];  // Value is </a:t>
-            </a:r>
-            <a:r>
-              <a:rPr lang="" altLang="en-US" sz="1800">
-                <a:latin typeface="Noto Serif CJK JP" panose="02020400000000000000" charset="-122"/>
-                <a:ea typeface="Noto Serif CJK JP" panose="02020400000000000000" charset="-122"/>
-                <a:sym typeface="+mn-ea"/>
-              </a:rPr>
-              <a:t>6</a:t>
-            </a:r>
-            <a:endParaRPr lang="en-US" altLang="en-US" sz="1800">
-              <a:latin typeface="Noto Serif CJK JP" panose="02020400000000000000" charset="-122"/>
-              <a:ea typeface="Noto Serif CJK JP" panose="02020400000000000000" charset="-122"/>
-            </a:endParaRPr>
-          </a:p>
-          <a:p>
-            <a:pPr marL="0" indent="0">
-              <a:buNone/>
-            </a:pPr>
-            <a:endParaRPr lang="" altLang="en-US" sz="1800">
-              <a:latin typeface="Noto Serif CJK JP" panose="02020400000000000000" charset="-122"/>
-              <a:ea typeface="Noto Serif CJK JP" panose="02020400000000000000" charset="-122"/>
-            </a:endParaRPr>
-          </a:p>
-          <a:p>
-            <a:endParaRPr lang="" altLang="en-US" sz="1800">
-              <a:latin typeface="Noto Serif CJK JP" panose="02020400000000000000" charset="-122"/>
-              <a:ea typeface="Noto Serif CJK JP" panose="02020400000000000000" charset="-122"/>
-            </a:endParaRPr>
-          </a:p>
-          <a:p>
-            <a:endParaRPr lang="en-US" altLang="en-US" sz="1800">
-              <a:latin typeface="Noto Serif CJK JP" panose="02020400000000000000" charset="-122"/>
-              <a:ea typeface="Noto Serif CJK JP" panose="02020400000000000000" charset="-122"/>
-            </a:endParaRPr>
-          </a:p>
-          <a:p>
-            <a:endParaRPr lang="en-US" altLang="en-US" sz="1800">
-              <a:latin typeface="Noto Serif CJK JP" panose="02020400000000000000" charset="-122"/>
-              <a:ea typeface="Noto Serif CJK JP" panose="02020400000000000000" charset="-122"/>
-            </a:endParaRPr>
-          </a:p>
-          <a:p>
-            <a:endParaRPr lang="en-US" altLang="en-US" sz="1800">
-              <a:latin typeface="Noto Serif CJK JP" panose="02020400000000000000" charset="-122"/>
-              <a:ea typeface="Noto Serif CJK JP" panose="02020400000000000000" charset="-122"/>
-            </a:endParaRPr>
-          </a:p>
-          <a:p>
-            <a:endParaRPr lang="en-US" altLang="en-US" sz="1800">
-              <a:latin typeface="Noto Serif CJK JP" panose="02020400000000000000" charset="-122"/>
-              <a:ea typeface="Noto Serif CJK JP" panose="02020400000000000000" charset="-122"/>
-            </a:endParaRPr>
-          </a:p>
-          <a:p>
-            <a:endParaRPr lang="en-US" altLang="en-US" sz="1800">
-              <a:latin typeface="Noto Serif CJK JP" panose="02020400000000000000" charset="-122"/>
-              <a:ea typeface="Noto Serif CJK JP" panose="02020400000000000000" charset="-122"/>
-            </a:endParaRPr>
+            <a:endParaRPr lang="en-US" altLang="en-US" sz="1800"/>
+          </a:p>
+          <a:p>
+            <a:endParaRPr lang="en-US" altLang="en-US" sz="1800"/>
+          </a:p>
+          <a:p>
+            <a:endParaRPr lang="en-US" altLang="en-US" sz="1800"/>
+          </a:p>
+          <a:p>
+            <a:endParaRPr lang="en-US" altLang="en-US" sz="1800"/>
+          </a:p>
+          <a:p>
+            <a:endParaRPr lang="en-US" altLang="en-US" sz="1800"/>
+          </a:p>
+          <a:p>
+            <a:endParaRPr lang="en-US" altLang="en-US" sz="1800"/>
+          </a:p>
+          <a:p>
+            <a:endParaRPr lang="en-US" altLang="en-US" sz="1800"/>
           </a:p>
         </p:txBody>
       </p:sp>
@@ -7152,15 +6623,11 @@
           <a:p>
             <a:r>
               <a:rPr lang="en-US" altLang="en-US" sz="3200">
-                <a:latin typeface="Noto Serif CJK JP" panose="02020400000000000000" charset="-122"/>
-                <a:ea typeface="Noto Serif CJK JP" panose="02020400000000000000" charset="-122"/>
                 <a:sym typeface="+mn-ea"/>
               </a:rPr>
               <a:t>Strings &amp; Streams</a:t>
             </a:r>
             <a:endParaRPr lang="en-US" altLang="en-US" sz="3200">
-              <a:latin typeface="Noto Serif CJK JP" panose="02020400000000000000" charset="-122"/>
-              <a:ea typeface="Noto Serif CJK JP" panose="02020400000000000000" charset="-122"/>
               <a:sym typeface="+mn-ea"/>
             </a:endParaRPr>
           </a:p>
@@ -7191,16 +6658,10 @@
               </a:lnSpc>
             </a:pPr>
             <a:r>
-              <a:rPr lang="" altLang="en-US" sz="1800">
-                <a:latin typeface="Noto Serif CJK JP" panose="02020400000000000000" charset="-122"/>
-                <a:ea typeface="Noto Serif CJK JP" panose="02020400000000000000" charset="-122"/>
-              </a:rPr>
+              <a:rPr lang="en-US" altLang="en-US" sz="1800"/>
               <a:t>Collection of character</a:t>
             </a:r>
-            <a:endParaRPr lang="" altLang="en-US" sz="1800">
-              <a:latin typeface="Noto Serif CJK JP" panose="02020400000000000000" charset="-122"/>
-              <a:ea typeface="Noto Serif CJK JP" panose="02020400000000000000" charset="-122"/>
-            </a:endParaRPr>
+            <a:endParaRPr lang="en-US" altLang="en-US" sz="1800"/>
           </a:p>
           <a:p>
             <a:pPr>
@@ -7209,16 +6670,10 @@
               </a:lnSpc>
             </a:pPr>
             <a:r>
-              <a:rPr lang="" altLang="en-US" sz="1800">
-                <a:latin typeface="Noto Serif CJK JP" panose="02020400000000000000" charset="-122"/>
-                <a:ea typeface="Noto Serif CJK JP" panose="02020400000000000000" charset="-122"/>
-              </a:rPr>
+              <a:rPr lang="en-US" altLang="en-US" sz="1800"/>
               <a:t> Group of zero or more number of character forms a string</a:t>
             </a:r>
-            <a:endParaRPr lang="" altLang="en-US" sz="1800">
-              <a:latin typeface="Noto Serif CJK JP" panose="02020400000000000000" charset="-122"/>
-              <a:ea typeface="Noto Serif CJK JP" panose="02020400000000000000" charset="-122"/>
-            </a:endParaRPr>
+            <a:endParaRPr lang="en-US" altLang="en-US" sz="1800"/>
           </a:p>
           <a:p>
             <a:pPr>
@@ -7227,16 +6682,10 @@
               </a:lnSpc>
             </a:pPr>
             <a:r>
-              <a:rPr lang="" altLang="en-US" sz="1800">
-                <a:latin typeface="Noto Serif CJK JP" panose="02020400000000000000" charset="-122"/>
-                <a:ea typeface="Noto Serif CJK JP" panose="02020400000000000000" charset="-122"/>
-              </a:rPr>
+              <a:rPr lang="en-US" altLang="en-US" sz="1800"/>
               <a:t>Example :  “Hello world”</a:t>
             </a:r>
-            <a:endParaRPr lang="" altLang="en-US" sz="1800">
-              <a:latin typeface="Noto Serif CJK JP" panose="02020400000000000000" charset="-122"/>
-              <a:ea typeface="Noto Serif CJK JP" panose="02020400000000000000" charset="-122"/>
-            </a:endParaRPr>
+            <a:endParaRPr lang="en-US" altLang="en-US" sz="1800"/>
           </a:p>
           <a:p>
             <a:pPr>
@@ -7245,16 +6694,10 @@
               </a:lnSpc>
             </a:pPr>
             <a:r>
-              <a:rPr lang="" altLang="en-US" sz="1800">
-                <a:latin typeface="Noto Serif CJK JP" panose="02020400000000000000" charset="-122"/>
-                <a:ea typeface="Noto Serif CJK JP" panose="02020400000000000000" charset="-122"/>
-              </a:rPr>
+              <a:rPr lang="en-US" altLang="en-US" sz="1800"/>
               <a:t>Implementation in C++:</a:t>
             </a:r>
-            <a:endParaRPr lang="" altLang="en-US" sz="1800">
-              <a:latin typeface="Noto Serif CJK JP" panose="02020400000000000000" charset="-122"/>
-              <a:ea typeface="Noto Serif CJK JP" panose="02020400000000000000" charset="-122"/>
-            </a:endParaRPr>
+            <a:endParaRPr lang="en-US" altLang="en-US" sz="1800"/>
           </a:p>
           <a:p>
             <a:pPr lvl="1">
@@ -7263,16 +6706,10 @@
               </a:lnSpc>
             </a:pPr>
             <a:r>
-              <a:rPr lang="" altLang="en-US" sz="1575">
-                <a:latin typeface="Noto Serif CJK JP" panose="02020400000000000000" charset="-122"/>
-                <a:ea typeface="Noto Serif CJK JP" panose="02020400000000000000" charset="-122"/>
-              </a:rPr>
+              <a:rPr lang="en-US" altLang="en-US" sz="1575"/>
               <a:t>char str[20] = “Hello World”;</a:t>
             </a:r>
-            <a:endParaRPr lang="" altLang="en-US" sz="1575">
-              <a:latin typeface="Noto Serif CJK JP" panose="02020400000000000000" charset="-122"/>
-              <a:ea typeface="Noto Serif CJK JP" panose="02020400000000000000" charset="-122"/>
-            </a:endParaRPr>
+            <a:endParaRPr lang="en-US" altLang="en-US" sz="1575"/>
           </a:p>
         </p:txBody>
       </p:sp>
@@ -7315,15 +6752,11 @@
           <a:p>
             <a:r>
               <a:rPr lang="en-US" altLang="en-US" sz="3200">
-                <a:latin typeface="Noto Serif CJK JP" panose="02020400000000000000" charset="-122"/>
-                <a:ea typeface="Noto Serif CJK JP" panose="02020400000000000000" charset="-122"/>
                 <a:sym typeface="+mn-ea"/>
               </a:rPr>
               <a:t>Properties of Class</a:t>
             </a:r>
             <a:endParaRPr lang="en-US" altLang="en-US" sz="3200">
-              <a:latin typeface="Noto Serif CJK JP" panose="02020400000000000000" charset="-122"/>
-              <a:ea typeface="Noto Serif CJK JP" panose="02020400000000000000" charset="-122"/>
               <a:sym typeface="+mn-ea"/>
             </a:endParaRPr>
           </a:p>
@@ -7348,77 +6781,47 @@
         <p:txBody>
           <a:bodyPr/>
           <a:p>
-            <a:endParaRPr lang="en-US" sz="1800">
-              <a:latin typeface="Noto Serif CJK JP" panose="02020400000000000000" charset="-122"/>
-              <a:ea typeface="Noto Serif CJK JP" panose="02020400000000000000" charset="-122"/>
-            </a:endParaRPr>
-          </a:p>
-          <a:p>
-            <a:endParaRPr lang="en-US" sz="1800">
-              <a:latin typeface="Noto Serif CJK JP" panose="02020400000000000000" charset="-122"/>
-              <a:ea typeface="Noto Serif CJK JP" panose="02020400000000000000" charset="-122"/>
-            </a:endParaRPr>
-          </a:p>
-          <a:p>
-            <a:r>
-              <a:rPr lang="en-US" sz="1800">
-                <a:latin typeface="Noto Serif CJK JP" panose="02020400000000000000" charset="-122"/>
-                <a:ea typeface="Noto Serif CJK JP" panose="02020400000000000000" charset="-122"/>
-              </a:rPr>
+            <a:endParaRPr lang="en-US" sz="1800"/>
+          </a:p>
+          <a:p>
+            <a:endParaRPr lang="en-US" sz="1800"/>
+          </a:p>
+          <a:p>
+            <a:r>
+              <a:rPr lang="en-US" sz="1800"/>
               <a:t>Data Members </a:t>
             </a:r>
-            <a:endParaRPr lang="en-US" sz="1800">
-              <a:latin typeface="Noto Serif CJK JP" panose="02020400000000000000" charset="-122"/>
-              <a:ea typeface="Noto Serif CJK JP" panose="02020400000000000000" charset="-122"/>
-            </a:endParaRPr>
+            <a:endParaRPr lang="en-US" sz="1800"/>
           </a:p>
           <a:p>
             <a:pPr lvl="1"/>
             <a:r>
               <a:rPr lang="en-US" sz="1575">
-                <a:latin typeface="Noto Serif CJK JP" panose="02020400000000000000" charset="-122"/>
-                <a:ea typeface="Noto Serif CJK JP" panose="02020400000000000000" charset="-122"/>
                 <a:sym typeface="+mn-ea"/>
               </a:rPr>
               <a:t>data variables</a:t>
             </a:r>
-            <a:endParaRPr lang="en-US" sz="1575">
-              <a:latin typeface="Noto Serif CJK JP" panose="02020400000000000000" charset="-122"/>
-              <a:ea typeface="Noto Serif CJK JP" panose="02020400000000000000" charset="-122"/>
-            </a:endParaRPr>
-          </a:p>
-          <a:p>
-            <a:endParaRPr lang="en-US" sz="1800">
-              <a:latin typeface="Noto Serif CJK JP" panose="02020400000000000000" charset="-122"/>
-              <a:ea typeface="Noto Serif CJK JP" panose="02020400000000000000" charset="-122"/>
-            </a:endParaRPr>
-          </a:p>
-          <a:p>
-            <a:r>
-              <a:rPr lang="en-US" sz="1800">
-                <a:latin typeface="Noto Serif CJK JP" panose="02020400000000000000" charset="-122"/>
-                <a:ea typeface="Noto Serif CJK JP" panose="02020400000000000000" charset="-122"/>
-              </a:rPr>
+            <a:endParaRPr lang="en-US" sz="1575"/>
+          </a:p>
+          <a:p>
+            <a:endParaRPr lang="en-US" sz="1800"/>
+          </a:p>
+          <a:p>
+            <a:r>
+              <a:rPr lang="en-US" sz="1800"/>
               <a:t>Member Functions</a:t>
             </a:r>
-            <a:endParaRPr lang="en-US" sz="1800">
-              <a:latin typeface="Noto Serif CJK JP" panose="02020400000000000000" charset="-122"/>
-              <a:ea typeface="Noto Serif CJK JP" panose="02020400000000000000" charset="-122"/>
-            </a:endParaRPr>
+            <a:endParaRPr lang="en-US" sz="1800"/>
           </a:p>
           <a:p>
             <a:pPr lvl="1"/>
             <a:r>
               <a:rPr lang="en-US" sz="1575">
-                <a:latin typeface="Noto Serif CJK JP" panose="02020400000000000000" charset="-122"/>
-                <a:ea typeface="Noto Serif CJK JP" panose="02020400000000000000" charset="-122"/>
                 <a:sym typeface="+mn-ea"/>
               </a:rPr>
               <a:t>functions used to manipulate these variables</a:t>
             </a:r>
             <a:endParaRPr lang="en-US" sz="1575">
-              <a:latin typeface="Noto Serif CJK JP" panose="02020400000000000000" charset="-122"/>
-              <a:ea typeface="Noto Serif CJK JP" panose="02020400000000000000" charset="-122"/>
               <a:sym typeface="+mn-ea"/>
             </a:endParaRPr>
           </a:p>
@@ -7427,17 +6830,12 @@
               <a:buNone/>
             </a:pPr>
             <a:endParaRPr lang="en-US" sz="1575">
-              <a:latin typeface="Noto Serif CJK JP" panose="02020400000000000000" charset="-122"/>
-              <a:ea typeface="Noto Serif CJK JP" panose="02020400000000000000" charset="-122"/>
               <a:sym typeface="+mn-ea"/>
             </a:endParaRPr>
           </a:p>
           <a:p>
             <a:pPr lvl="0"/>
-            <a:endParaRPr lang="en-US" sz="1800">
-              <a:latin typeface="Noto Serif CJK JP" panose="02020400000000000000" charset="-122"/>
-              <a:ea typeface="Noto Serif CJK JP" panose="02020400000000000000" charset="-122"/>
-            </a:endParaRPr>
+            <a:endParaRPr lang="en-US" sz="1800"/>
           </a:p>
         </p:txBody>
       </p:sp>
@@ -7504,16 +6902,11 @@
           <a:p>
             <a:r>
               <a:rPr lang="en-US" altLang="en-US" sz="3200">
-                <a:latin typeface="Noto Serif CJK JP" panose="02020400000000000000" charset="-122"/>
-                <a:ea typeface="Noto Serif CJK JP" panose="02020400000000000000" charset="-122"/>
                 <a:sym typeface="+mn-ea"/>
               </a:rPr>
               <a:t>Access specifiers</a:t>
             </a:r>
-            <a:endParaRPr lang="en-US" sz="3200">
-              <a:latin typeface="Noto Serif CJK JP" panose="02020400000000000000" charset="-122"/>
-              <a:ea typeface="Noto Serif CJK JP" panose="02020400000000000000" charset="-122"/>
-            </a:endParaRPr>
+            <a:endParaRPr lang="en-US" sz="3200"/>
           </a:p>
         </p:txBody>
       </p:sp>
@@ -7537,22 +6930,13 @@
           <a:bodyPr/>
           <a:p>
             <a:r>
-              <a:rPr sz="1800">
-                <a:latin typeface="Noto Serif CJK JP" panose="02020400000000000000" charset="-122"/>
-                <a:ea typeface="Noto Serif CJK JP" panose="02020400000000000000" charset="-122"/>
-              </a:rPr>
+              <a:rPr sz="1800"/>
               <a:t> define how the members of the class can be accessed</a:t>
             </a:r>
-            <a:endParaRPr sz="1800">
-              <a:latin typeface="Noto Serif CJK JP" panose="02020400000000000000" charset="-122"/>
-              <a:ea typeface="Noto Serif CJK JP" panose="02020400000000000000" charset="-122"/>
-            </a:endParaRPr>
-          </a:p>
-          <a:p>
-            <a:endParaRPr sz="1800">
-              <a:latin typeface="Noto Serif CJK JP" panose="02020400000000000000" charset="-122"/>
-              <a:ea typeface="Noto Serif CJK JP" panose="02020400000000000000" charset="-122"/>
-            </a:endParaRPr>
+            <a:endParaRPr sz="1800"/>
+          </a:p>
+          <a:p>
+            <a:endParaRPr sz="1800"/>
           </a:p>
         </p:txBody>
       </p:sp>
@@ -7588,14 +6972,14 @@
                       </a:pPr>
                       <a:r>
                         <a:rPr lang="en-US" altLang="en-US">
-                          <a:latin typeface="Noto Serif CJK JP" panose="02020400000000000000" charset="-122"/>
-                          <a:ea typeface="Noto Serif CJK JP" panose="02020400000000000000" charset="-122"/>
+                          <a:latin typeface="Noto Sans CJK JP Regular" panose="020B0500000000000000" charset="-122"/>
+                          <a:ea typeface="Noto Sans CJK JP Regular" panose="020B0500000000000000" charset="-122"/>
                         </a:rPr>
                         <a:t>Specifiers</a:t>
                       </a:r>
                       <a:endParaRPr lang="en-US" altLang="en-US">
-                        <a:latin typeface="Noto Serif CJK JP" panose="02020400000000000000" charset="-122"/>
-                        <a:ea typeface="Noto Serif CJK JP" panose="02020400000000000000" charset="-122"/>
+                        <a:latin typeface="Noto Sans CJK JP Regular" panose="020B0500000000000000" charset="-122"/>
+                        <a:ea typeface="Noto Sans CJK JP Regular" panose="020B0500000000000000" charset="-122"/>
                       </a:endParaRPr>
                     </a:p>
                   </a:txBody>
@@ -7610,14 +6994,14 @@
                       </a:pPr>
                       <a:r>
                         <a:rPr lang="en-US" altLang="en-US">
-                          <a:latin typeface="Noto Serif CJK JP" panose="02020400000000000000" charset="-122"/>
-                          <a:ea typeface="Noto Serif CJK JP" panose="02020400000000000000" charset="-122"/>
+                          <a:latin typeface="Noto Sans CJK JP Regular" panose="020B0500000000000000" charset="-122"/>
+                          <a:ea typeface="Noto Sans CJK JP Regular" panose="020B0500000000000000" charset="-122"/>
                         </a:rPr>
                         <a:t>Class Boundary</a:t>
                       </a:r>
                       <a:endParaRPr lang="en-US" altLang="en-US">
-                        <a:latin typeface="Noto Serif CJK JP" panose="02020400000000000000" charset="-122"/>
-                        <a:ea typeface="Noto Serif CJK JP" panose="02020400000000000000" charset="-122"/>
+                        <a:latin typeface="Noto Sans CJK JP Regular" panose="020B0500000000000000" charset="-122"/>
+                        <a:ea typeface="Noto Sans CJK JP Regular" panose="020B0500000000000000" charset="-122"/>
                       </a:endParaRPr>
                     </a:p>
                   </a:txBody>
@@ -7632,14 +7016,14 @@
                       </a:pPr>
                       <a:r>
                         <a:rPr lang="en-US" altLang="en-US">
-                          <a:latin typeface="Noto Serif CJK JP" panose="02020400000000000000" charset="-122"/>
-                          <a:ea typeface="Noto Serif CJK JP" panose="02020400000000000000" charset="-122"/>
+                          <a:latin typeface="Noto Sans CJK JP Regular" panose="020B0500000000000000" charset="-122"/>
+                          <a:ea typeface="Noto Sans CJK JP Regular" panose="020B0500000000000000" charset="-122"/>
                         </a:rPr>
                         <a:t>Through Inhertiance</a:t>
                       </a:r>
                       <a:endParaRPr lang="en-US" altLang="en-US">
-                        <a:latin typeface="Noto Serif CJK JP" panose="02020400000000000000" charset="-122"/>
-                        <a:ea typeface="Noto Serif CJK JP" panose="02020400000000000000" charset="-122"/>
+                        <a:latin typeface="Noto Sans CJK JP Regular" panose="020B0500000000000000" charset="-122"/>
+                        <a:ea typeface="Noto Sans CJK JP Regular" panose="020B0500000000000000" charset="-122"/>
                       </a:endParaRPr>
                     </a:p>
                   </a:txBody>
@@ -7654,14 +7038,14 @@
                       </a:pPr>
                       <a:r>
                         <a:rPr lang="en-US" altLang="en-US">
-                          <a:latin typeface="Noto Serif CJK JP" panose="02020400000000000000" charset="-122"/>
-                          <a:ea typeface="Noto Serif CJK JP" panose="02020400000000000000" charset="-122"/>
+                          <a:latin typeface="Noto Sans CJK JP Regular" panose="020B0500000000000000" charset="-122"/>
+                          <a:ea typeface="Noto Sans CJK JP Regular" panose="020B0500000000000000" charset="-122"/>
                         </a:rPr>
                         <a:t>Through Objects</a:t>
                       </a:r>
                       <a:endParaRPr lang="en-US" altLang="en-US">
-                        <a:latin typeface="Noto Serif CJK JP" panose="02020400000000000000" charset="-122"/>
-                        <a:ea typeface="Noto Serif CJK JP" panose="02020400000000000000" charset="-122"/>
+                        <a:latin typeface="Noto Sans CJK JP Regular" panose="020B0500000000000000" charset="-122"/>
+                        <a:ea typeface="Noto Sans CJK JP Regular" panose="020B0500000000000000" charset="-122"/>
                       </a:endParaRPr>
                     </a:p>
                   </a:txBody>
@@ -7678,14 +7062,14 @@
                       </a:pPr>
                       <a:r>
                         <a:rPr lang="en-US" altLang="en-US">
-                          <a:latin typeface="Noto Serif CJK JP" panose="02020400000000000000" charset="-122"/>
-                          <a:ea typeface="Noto Serif CJK JP" panose="02020400000000000000" charset="-122"/>
+                          <a:latin typeface="Noto Sans CJK JP Regular" panose="020B0500000000000000" charset="-122"/>
+                          <a:ea typeface="Noto Sans CJK JP Regular" panose="020B0500000000000000" charset="-122"/>
                         </a:rPr>
                         <a:t>Private</a:t>
                       </a:r>
                       <a:endParaRPr lang="en-US" altLang="en-US">
-                        <a:latin typeface="Noto Serif CJK JP" panose="02020400000000000000" charset="-122"/>
-                        <a:ea typeface="Noto Serif CJK JP" panose="02020400000000000000" charset="-122"/>
+                        <a:latin typeface="Noto Sans CJK JP Regular" panose="020B0500000000000000" charset="-122"/>
+                        <a:ea typeface="Noto Sans CJK JP Regular" panose="020B0500000000000000" charset="-122"/>
                       </a:endParaRPr>
                     </a:p>
                   </a:txBody>
@@ -7700,14 +7084,14 @@
                       </a:pPr>
                       <a:r>
                         <a:rPr lang="en-US" altLang="en-US">
-                          <a:latin typeface="Noto Serif CJK JP" panose="02020400000000000000" charset="-122"/>
-                          <a:ea typeface="Noto Serif CJK JP" panose="02020400000000000000" charset="-122"/>
+                          <a:latin typeface="Noto Sans CJK JP Regular" panose="020B0500000000000000" charset="-122"/>
+                          <a:ea typeface="Noto Sans CJK JP Regular" panose="020B0500000000000000" charset="-122"/>
                         </a:rPr>
                         <a:t>Accessible</a:t>
                       </a:r>
                       <a:endParaRPr lang="en-US" altLang="en-US">
-                        <a:latin typeface="Noto Serif CJK JP" panose="02020400000000000000" charset="-122"/>
-                        <a:ea typeface="Noto Serif CJK JP" panose="02020400000000000000" charset="-122"/>
+                        <a:latin typeface="Noto Sans CJK JP Regular" panose="020B0500000000000000" charset="-122"/>
+                        <a:ea typeface="Noto Sans CJK JP Regular" panose="020B0500000000000000" charset="-122"/>
                       </a:endParaRPr>
                     </a:p>
                   </a:txBody>
@@ -7722,14 +7106,14 @@
                       </a:pPr>
                       <a:r>
                         <a:rPr lang="en-US" altLang="en-US">
-                          <a:latin typeface="Noto Serif CJK JP" panose="02020400000000000000" charset="-122"/>
-                          <a:ea typeface="Noto Serif CJK JP" panose="02020400000000000000" charset="-122"/>
+                          <a:latin typeface="Noto Sans CJK JP Regular" panose="020B0500000000000000" charset="-122"/>
+                          <a:ea typeface="Noto Sans CJK JP Regular" panose="020B0500000000000000" charset="-122"/>
                         </a:rPr>
                         <a:t>Not Accessible</a:t>
                       </a:r>
                       <a:endParaRPr lang="en-US" altLang="en-US">
-                        <a:latin typeface="Noto Serif CJK JP" panose="02020400000000000000" charset="-122"/>
-                        <a:ea typeface="Noto Serif CJK JP" panose="02020400000000000000" charset="-122"/>
+                        <a:latin typeface="Noto Sans CJK JP Regular" panose="020B0500000000000000" charset="-122"/>
+                        <a:ea typeface="Noto Sans CJK JP Regular" panose="020B0500000000000000" charset="-122"/>
                       </a:endParaRPr>
                     </a:p>
                   </a:txBody>
@@ -7744,15 +7128,15 @@
                       </a:pPr>
                       <a:r>
                         <a:rPr lang="en-US" altLang="en-US" sz="1800">
-                          <a:latin typeface="Noto Serif CJK JP" panose="02020400000000000000" charset="-122"/>
-                          <a:ea typeface="Noto Serif CJK JP" panose="02020400000000000000" charset="-122"/>
+                          <a:latin typeface="Noto Sans CJK JP Regular" panose="020B0500000000000000" charset="-122"/>
+                          <a:ea typeface="Noto Sans CJK JP Regular" panose="020B0500000000000000" charset="-122"/>
                           <a:sym typeface="+mn-ea"/>
                         </a:rPr>
                         <a:t>Not Accessible</a:t>
                       </a:r>
                       <a:endParaRPr lang="en-US" altLang="en-US" sz="1800">
-                        <a:latin typeface="Noto Serif CJK JP" panose="02020400000000000000" charset="-122"/>
-                        <a:ea typeface="Noto Serif CJK JP" panose="02020400000000000000" charset="-122"/>
+                        <a:latin typeface="Noto Sans CJK JP Regular" panose="020B0500000000000000" charset="-122"/>
+                        <a:ea typeface="Noto Sans CJK JP Regular" panose="020B0500000000000000" charset="-122"/>
                         <a:sym typeface="+mn-ea"/>
                       </a:endParaRPr>
                     </a:p>
@@ -7761,8 +7145,8 @@
                         <a:buNone/>
                       </a:pPr>
                       <a:endParaRPr lang="en-US">
-                        <a:latin typeface="Noto Serif CJK JP" panose="02020400000000000000" charset="-122"/>
-                        <a:ea typeface="Noto Serif CJK JP" panose="02020400000000000000" charset="-122"/>
+                        <a:latin typeface="Noto Sans CJK JP Regular" panose="020B0500000000000000" charset="-122"/>
+                        <a:ea typeface="Noto Sans CJK JP Regular" panose="020B0500000000000000" charset="-122"/>
                       </a:endParaRPr>
                     </a:p>
                   </a:txBody>
@@ -7779,14 +7163,14 @@
                       </a:pPr>
                       <a:r>
                         <a:rPr lang="en-US" altLang="en-US">
-                          <a:latin typeface="Noto Serif CJK JP" panose="02020400000000000000" charset="-122"/>
-                          <a:ea typeface="Noto Serif CJK JP" panose="02020400000000000000" charset="-122"/>
+                          <a:latin typeface="Noto Sans CJK JP Regular" panose="020B0500000000000000" charset="-122"/>
+                          <a:ea typeface="Noto Sans CJK JP Regular" panose="020B0500000000000000" charset="-122"/>
                         </a:rPr>
                         <a:t>Protected</a:t>
                       </a:r>
                       <a:endParaRPr lang="en-US" altLang="en-US">
-                        <a:latin typeface="Noto Serif CJK JP" panose="02020400000000000000" charset="-122"/>
-                        <a:ea typeface="Noto Serif CJK JP" panose="02020400000000000000" charset="-122"/>
+                        <a:latin typeface="Noto Sans CJK JP Regular" panose="020B0500000000000000" charset="-122"/>
+                        <a:ea typeface="Noto Sans CJK JP Regular" panose="020B0500000000000000" charset="-122"/>
                       </a:endParaRPr>
                     </a:p>
                   </a:txBody>
@@ -7801,14 +7185,14 @@
                       </a:pPr>
                       <a:r>
                         <a:rPr lang="en-US" altLang="en-US">
-                          <a:latin typeface="Noto Serif CJK JP" panose="02020400000000000000" charset="-122"/>
-                          <a:ea typeface="Noto Serif CJK JP" panose="02020400000000000000" charset="-122"/>
+                          <a:latin typeface="Noto Sans CJK JP Regular" panose="020B0500000000000000" charset="-122"/>
+                          <a:ea typeface="Noto Sans CJK JP Regular" panose="020B0500000000000000" charset="-122"/>
                         </a:rPr>
                         <a:t>Accessible</a:t>
                       </a:r>
                       <a:endParaRPr lang="en-US" altLang="en-US">
-                        <a:latin typeface="Noto Serif CJK JP" panose="02020400000000000000" charset="-122"/>
-                        <a:ea typeface="Noto Serif CJK JP" panose="02020400000000000000" charset="-122"/>
+                        <a:latin typeface="Noto Sans CJK JP Regular" panose="020B0500000000000000" charset="-122"/>
+                        <a:ea typeface="Noto Sans CJK JP Regular" panose="020B0500000000000000" charset="-122"/>
                       </a:endParaRPr>
                     </a:p>
                   </a:txBody>
@@ -7823,15 +7207,15 @@
                       </a:pPr>
                       <a:r>
                         <a:rPr lang="en-US" altLang="en-US" sz="1800">
-                          <a:latin typeface="Noto Serif CJK JP" panose="02020400000000000000" charset="-122"/>
-                          <a:ea typeface="Noto Serif CJK JP" panose="02020400000000000000" charset="-122"/>
+                          <a:latin typeface="Noto Sans CJK JP Regular" panose="020B0500000000000000" charset="-122"/>
+                          <a:ea typeface="Noto Sans CJK JP Regular" panose="020B0500000000000000" charset="-122"/>
                           <a:sym typeface="+mn-ea"/>
                         </a:rPr>
                         <a:t>Accessible</a:t>
                       </a:r>
                       <a:endParaRPr lang="en-US">
-                        <a:latin typeface="Noto Serif CJK JP" panose="02020400000000000000" charset="-122"/>
-                        <a:ea typeface="Noto Serif CJK JP" panose="02020400000000000000" charset="-122"/>
+                        <a:latin typeface="Noto Sans CJK JP Regular" panose="020B0500000000000000" charset="-122"/>
+                        <a:ea typeface="Noto Sans CJK JP Regular" panose="020B0500000000000000" charset="-122"/>
                       </a:endParaRPr>
                     </a:p>
                   </a:txBody>
@@ -7846,15 +7230,15 @@
                       </a:pPr>
                       <a:r>
                         <a:rPr lang="en-US" altLang="en-US" sz="1800">
-                          <a:latin typeface="Noto Serif CJK JP" panose="02020400000000000000" charset="-122"/>
-                          <a:ea typeface="Noto Serif CJK JP" panose="02020400000000000000" charset="-122"/>
+                          <a:latin typeface="Noto Sans CJK JP Regular" panose="020B0500000000000000" charset="-122"/>
+                          <a:ea typeface="Noto Sans CJK JP Regular" panose="020B0500000000000000" charset="-122"/>
                           <a:sym typeface="+mn-ea"/>
                         </a:rPr>
                         <a:t>Not Accessible</a:t>
                       </a:r>
                       <a:endParaRPr lang="en-US" altLang="en-US" sz="1800">
-                        <a:latin typeface="Noto Serif CJK JP" panose="02020400000000000000" charset="-122"/>
-                        <a:ea typeface="Noto Serif CJK JP" panose="02020400000000000000" charset="-122"/>
+                        <a:latin typeface="Noto Sans CJK JP Regular" panose="020B0500000000000000" charset="-122"/>
+                        <a:ea typeface="Noto Sans CJK JP Regular" panose="020B0500000000000000" charset="-122"/>
                         <a:sym typeface="+mn-ea"/>
                       </a:endParaRPr>
                     </a:p>
@@ -7863,8 +7247,8 @@
                         <a:buNone/>
                       </a:pPr>
                       <a:endParaRPr lang="en-US">
-                        <a:latin typeface="Noto Serif CJK JP" panose="02020400000000000000" charset="-122"/>
-                        <a:ea typeface="Noto Serif CJK JP" panose="02020400000000000000" charset="-122"/>
+                        <a:latin typeface="Noto Sans CJK JP Regular" panose="020B0500000000000000" charset="-122"/>
+                        <a:ea typeface="Noto Sans CJK JP Regular" panose="020B0500000000000000" charset="-122"/>
                       </a:endParaRPr>
                     </a:p>
                   </a:txBody>
@@ -7881,14 +7265,14 @@
                       </a:pPr>
                       <a:r>
                         <a:rPr lang="en-US" altLang="en-US">
-                          <a:latin typeface="Noto Serif CJK JP" panose="02020400000000000000" charset="-122"/>
-                          <a:ea typeface="Noto Serif CJK JP" panose="02020400000000000000" charset="-122"/>
+                          <a:latin typeface="Noto Sans CJK JP Regular" panose="020B0500000000000000" charset="-122"/>
+                          <a:ea typeface="Noto Sans CJK JP Regular" panose="020B0500000000000000" charset="-122"/>
                         </a:rPr>
                         <a:t>Public</a:t>
                       </a:r>
                       <a:endParaRPr lang="en-US" altLang="en-US">
-                        <a:latin typeface="Noto Serif CJK JP" panose="02020400000000000000" charset="-122"/>
-                        <a:ea typeface="Noto Serif CJK JP" panose="02020400000000000000" charset="-122"/>
+                        <a:latin typeface="Noto Sans CJK JP Regular" panose="020B0500000000000000" charset="-122"/>
+                        <a:ea typeface="Noto Sans CJK JP Regular" panose="020B0500000000000000" charset="-122"/>
                       </a:endParaRPr>
                     </a:p>
                   </a:txBody>
@@ -7903,21 +7287,21 @@
                       </a:pPr>
                       <a:r>
                         <a:rPr lang="en-US" altLang="en-US">
-                          <a:latin typeface="Noto Serif CJK JP" panose="02020400000000000000" charset="-122"/>
-                          <a:ea typeface="Noto Serif CJK JP" panose="02020400000000000000" charset="-122"/>
+                          <a:latin typeface="Noto Sans CJK JP Regular" panose="020B0500000000000000" charset="-122"/>
+                          <a:ea typeface="Noto Sans CJK JP Regular" panose="020B0500000000000000" charset="-122"/>
                         </a:rPr>
                         <a:t>A</a:t>
                       </a:r>
                       <a:r>
                         <a:rPr lang="en-US">
-                          <a:latin typeface="Noto Serif CJK JP" panose="02020400000000000000" charset="-122"/>
-                          <a:ea typeface="Noto Serif CJK JP" panose="02020400000000000000" charset="-122"/>
+                          <a:latin typeface="Noto Sans CJK JP Regular" panose="020B0500000000000000" charset="-122"/>
+                          <a:ea typeface="Noto Sans CJK JP Regular" panose="020B0500000000000000" charset="-122"/>
                         </a:rPr>
                         <a:t>ccessible</a:t>
                       </a:r>
                       <a:endParaRPr lang="en-US">
-                        <a:latin typeface="Noto Serif CJK JP" panose="02020400000000000000" charset="-122"/>
-                        <a:ea typeface="Noto Serif CJK JP" panose="02020400000000000000" charset="-122"/>
+                        <a:latin typeface="Noto Sans CJK JP Regular" panose="020B0500000000000000" charset="-122"/>
+                        <a:ea typeface="Noto Sans CJK JP Regular" panose="020B0500000000000000" charset="-122"/>
                       </a:endParaRPr>
                     </a:p>
                   </a:txBody>
@@ -7932,15 +7316,15 @@
                       </a:pPr>
                       <a:r>
                         <a:rPr lang="en-US" altLang="en-US" sz="1800">
-                          <a:latin typeface="Noto Serif CJK JP" panose="02020400000000000000" charset="-122"/>
-                          <a:ea typeface="Noto Serif CJK JP" panose="02020400000000000000" charset="-122"/>
+                          <a:latin typeface="Noto Sans CJK JP Regular" panose="020B0500000000000000" charset="-122"/>
+                          <a:ea typeface="Noto Sans CJK JP Regular" panose="020B0500000000000000" charset="-122"/>
                           <a:sym typeface="+mn-ea"/>
                         </a:rPr>
                         <a:t>Accessible</a:t>
                       </a:r>
                       <a:endParaRPr lang="en-US">
-                        <a:latin typeface="Noto Serif CJK JP" panose="02020400000000000000" charset="-122"/>
-                        <a:ea typeface="Noto Serif CJK JP" panose="02020400000000000000" charset="-122"/>
+                        <a:latin typeface="Noto Sans CJK JP Regular" panose="020B0500000000000000" charset="-122"/>
+                        <a:ea typeface="Noto Sans CJK JP Regular" panose="020B0500000000000000" charset="-122"/>
                       </a:endParaRPr>
                     </a:p>
                   </a:txBody>
@@ -7955,15 +7339,15 @@
                       </a:pPr>
                       <a:r>
                         <a:rPr lang="en-US" altLang="en-US" sz="1800">
-                          <a:latin typeface="Noto Serif CJK JP" panose="02020400000000000000" charset="-122"/>
-                          <a:ea typeface="Noto Serif CJK JP" panose="02020400000000000000" charset="-122"/>
+                          <a:latin typeface="Noto Sans CJK JP Regular" panose="020B0500000000000000" charset="-122"/>
+                          <a:ea typeface="Noto Sans CJK JP Regular" panose="020B0500000000000000" charset="-122"/>
                           <a:sym typeface="+mn-ea"/>
                         </a:rPr>
                         <a:t>Accessible</a:t>
                       </a:r>
                       <a:endParaRPr lang="en-US">
-                        <a:latin typeface="Noto Serif CJK JP" panose="02020400000000000000" charset="-122"/>
-                        <a:ea typeface="Noto Serif CJK JP" panose="02020400000000000000" charset="-122"/>
+                        <a:latin typeface="Noto Sans CJK JP Regular" panose="020B0500000000000000" charset="-122"/>
+                        <a:ea typeface="Noto Sans CJK JP Regular" panose="020B0500000000000000" charset="-122"/>
                       </a:endParaRPr>
                     </a:p>
                   </a:txBody>
@@ -8013,15 +7397,11 @@
           <a:p>
             <a:r>
               <a:rPr lang="en-US" altLang="en-US" sz="3200">
-                <a:latin typeface="Noto Serif CJK JP" panose="02020400000000000000" charset="-122"/>
-                <a:ea typeface="Noto Serif CJK JP" panose="02020400000000000000" charset="-122"/>
                 <a:sym typeface="+mn-ea"/>
               </a:rPr>
               <a:t>Constructors </a:t>
             </a:r>
             <a:endParaRPr lang="en-US" altLang="en-US" sz="3200">
-              <a:latin typeface="Noto Serif CJK JP" panose="02020400000000000000" charset="-122"/>
-              <a:ea typeface="Noto Serif CJK JP" panose="02020400000000000000" charset="-122"/>
               <a:sym typeface="+mn-ea"/>
             </a:endParaRPr>
           </a:p>
@@ -8052,16 +7432,10 @@
               </a:lnSpc>
             </a:pPr>
             <a:r>
-              <a:rPr lang="en-US" sz="1800">
-                <a:latin typeface="Noto Serif CJK JP" panose="02020400000000000000" charset="-122"/>
-                <a:ea typeface="Noto Serif CJK JP" panose="02020400000000000000" charset="-122"/>
-              </a:rPr>
+              <a:rPr lang="en-US" sz="1800"/>
               <a:t>Special class functions which performs initialization of every object</a:t>
             </a:r>
-            <a:endParaRPr lang="en-US" sz="1800">
-              <a:latin typeface="Noto Serif CJK JP" panose="02020400000000000000" charset="-122"/>
-              <a:ea typeface="Noto Serif CJK JP" panose="02020400000000000000" charset="-122"/>
-            </a:endParaRPr>
+            <a:endParaRPr lang="en-US" sz="1800"/>
           </a:p>
           <a:p>
             <a:pPr>
@@ -8070,16 +7444,10 @@
               </a:lnSpc>
             </a:pPr>
             <a:r>
-              <a:rPr lang="en-US" sz="1800">
-                <a:latin typeface="Noto Serif CJK JP" panose="02020400000000000000" charset="-122"/>
-                <a:ea typeface="Noto Serif CJK JP" panose="02020400000000000000" charset="-122"/>
-              </a:rPr>
+              <a:rPr lang="en-US" sz="1800"/>
               <a:t>Compiler calls the Constructor whenever an object is created.</a:t>
             </a:r>
-            <a:endParaRPr lang="en-US" sz="1800">
-              <a:latin typeface="Noto Serif CJK JP" panose="02020400000000000000" charset="-122"/>
-              <a:ea typeface="Noto Serif CJK JP" panose="02020400000000000000" charset="-122"/>
-            </a:endParaRPr>
+            <a:endParaRPr lang="en-US" sz="1800"/>
           </a:p>
           <a:p>
             <a:pPr>
@@ -8088,23 +7456,14 @@
               </a:lnSpc>
             </a:pPr>
             <a:r>
-              <a:rPr lang="en-US" altLang="en-US" sz="1800">
-                <a:latin typeface="Noto Serif CJK JP" panose="02020400000000000000" charset="-122"/>
-                <a:ea typeface="Noto Serif CJK JP" panose="02020400000000000000" charset="-122"/>
-              </a:rPr>
+              <a:rPr lang="en-US" altLang="en-US" sz="1800"/>
               <a:t>N</a:t>
             </a:r>
             <a:r>
-              <a:rPr lang="en-US" sz="1800">
-                <a:latin typeface="Noto Serif CJK JP" panose="02020400000000000000" charset="-122"/>
-                <a:ea typeface="Noto Serif CJK JP" panose="02020400000000000000" charset="-122"/>
-              </a:rPr>
+              <a:rPr lang="en-US" sz="1800"/>
               <a:t>ame of constructor will be same as the name of the class, and contructors will never have a return type.</a:t>
             </a:r>
-            <a:endParaRPr lang="en-US" sz="1800">
-              <a:latin typeface="Noto Serif CJK JP" panose="02020400000000000000" charset="-122"/>
-              <a:ea typeface="Noto Serif CJK JP" panose="02020400000000000000" charset="-122"/>
-            </a:endParaRPr>
+            <a:endParaRPr lang="en-US" sz="1800"/>
           </a:p>
         </p:txBody>
       </p:sp>
@@ -8147,15 +7506,11 @@
           <a:p>
             <a:r>
               <a:rPr lang="en-US" altLang="en-US" sz="3200">
-                <a:latin typeface="Noto Serif CJK JP" panose="02020400000000000000" charset="-122"/>
-                <a:ea typeface="Noto Serif CJK JP" panose="02020400000000000000" charset="-122"/>
                 <a:sym typeface="+mn-ea"/>
               </a:rPr>
               <a:t>Destructors</a:t>
             </a:r>
             <a:endParaRPr lang="en-US" altLang="en-US" sz="3200">
-              <a:latin typeface="Noto Serif CJK JP" panose="02020400000000000000" charset="-122"/>
-              <a:ea typeface="Noto Serif CJK JP" panose="02020400000000000000" charset="-122"/>
               <a:sym typeface="+mn-ea"/>
             </a:endParaRPr>
           </a:p>
@@ -8186,16 +7541,10 @@
               </a:lnSpc>
             </a:pPr>
             <a:r>
-              <a:rPr lang="en-US" sz="1800">
-                <a:latin typeface="Noto Serif CJK JP" panose="02020400000000000000" charset="-122"/>
-                <a:ea typeface="Noto Serif CJK JP" panose="02020400000000000000" charset="-122"/>
-              </a:rPr>
+              <a:rPr lang="en-US" sz="1800"/>
               <a:t>Special class function which destroys the object as soon as the scope of object ends. </a:t>
             </a:r>
-            <a:endParaRPr lang="en-US" sz="1800">
-              <a:latin typeface="Noto Serif CJK JP" panose="02020400000000000000" charset="-122"/>
-              <a:ea typeface="Noto Serif CJK JP" panose="02020400000000000000" charset="-122"/>
-            </a:endParaRPr>
+            <a:endParaRPr lang="en-US" sz="1800"/>
           </a:p>
           <a:p>
             <a:pPr>
@@ -8204,16 +7553,10 @@
               </a:lnSpc>
             </a:pPr>
             <a:r>
-              <a:rPr lang="en-US" sz="1800">
-                <a:latin typeface="Noto Serif CJK JP" panose="02020400000000000000" charset="-122"/>
-                <a:ea typeface="Noto Serif CJK JP" panose="02020400000000000000" charset="-122"/>
-              </a:rPr>
+              <a:rPr lang="en-US" sz="1800"/>
               <a:t>The destructor is called automatically by the compiler when the object goes out of scope.</a:t>
             </a:r>
-            <a:endParaRPr lang="en-US" sz="1800">
-              <a:latin typeface="Noto Serif CJK JP" panose="02020400000000000000" charset="-122"/>
-              <a:ea typeface="Noto Serif CJK JP" panose="02020400000000000000" charset="-122"/>
-            </a:endParaRPr>
+            <a:endParaRPr lang="en-US" sz="1800"/>
           </a:p>
         </p:txBody>
       </p:sp>

</xml_diff>